<commit_message>
Full draft of system section.
</commit_message>
<xml_diff>
--- a/paper/sigmod2016/figs/figures.pptx
+++ b/paper/sigmod2016/figs/figures.pptx
@@ -13,6 +13,7 @@
     <p:sldId id="261" r:id="rId7"/>
     <p:sldId id="262" r:id="rId8"/>
     <p:sldId id="263" r:id="rId9"/>
+    <p:sldId id="264" r:id="rId10"/>
   </p:sldIdLst>
   <p:sldSz cx="9144000" cy="6858000" type="screen4x3"/>
   <p:notesSz cx="6858000" cy="9144000"/>
@@ -295,7 +296,7 @@
           <a:p>
             <a:fld id="{2A3C5F88-9950-2441-8A51-A5268CD91903}" type="datetimeFigureOut">
               <a:rPr lang="en-US" smtClean="0"/>
-              <a:t>10/30/15</a:t>
+              <a:t>11/9/15</a:t>
             </a:fld>
             <a:endParaRPr lang="en-US"/>
           </a:p>
@@ -465,7 +466,7 @@
           <a:p>
             <a:fld id="{2A3C5F88-9950-2441-8A51-A5268CD91903}" type="datetimeFigureOut">
               <a:rPr lang="en-US" smtClean="0"/>
-              <a:t>10/30/15</a:t>
+              <a:t>11/9/15</a:t>
             </a:fld>
             <a:endParaRPr lang="en-US"/>
           </a:p>
@@ -645,7 +646,7 @@
           <a:p>
             <a:fld id="{2A3C5F88-9950-2441-8A51-A5268CD91903}" type="datetimeFigureOut">
               <a:rPr lang="en-US" smtClean="0"/>
-              <a:t>10/30/15</a:t>
+              <a:t>11/9/15</a:t>
             </a:fld>
             <a:endParaRPr lang="en-US"/>
           </a:p>
@@ -815,7 +816,7 @@
           <a:p>
             <a:fld id="{2A3C5F88-9950-2441-8A51-A5268CD91903}" type="datetimeFigureOut">
               <a:rPr lang="en-US" smtClean="0"/>
-              <a:t>10/30/15</a:t>
+              <a:t>11/9/15</a:t>
             </a:fld>
             <a:endParaRPr lang="en-US"/>
           </a:p>
@@ -1061,7 +1062,7 @@
           <a:p>
             <a:fld id="{2A3C5F88-9950-2441-8A51-A5268CD91903}" type="datetimeFigureOut">
               <a:rPr lang="en-US" smtClean="0"/>
-              <a:t>10/30/15</a:t>
+              <a:t>11/9/15</a:t>
             </a:fld>
             <a:endParaRPr lang="en-US"/>
           </a:p>
@@ -1349,7 +1350,7 @@
           <a:p>
             <a:fld id="{2A3C5F88-9950-2441-8A51-A5268CD91903}" type="datetimeFigureOut">
               <a:rPr lang="en-US" smtClean="0"/>
-              <a:t>10/30/15</a:t>
+              <a:t>11/9/15</a:t>
             </a:fld>
             <a:endParaRPr lang="en-US"/>
           </a:p>
@@ -1771,7 +1772,7 @@
           <a:p>
             <a:fld id="{2A3C5F88-9950-2441-8A51-A5268CD91903}" type="datetimeFigureOut">
               <a:rPr lang="en-US" smtClean="0"/>
-              <a:t>10/30/15</a:t>
+              <a:t>11/9/15</a:t>
             </a:fld>
             <a:endParaRPr lang="en-US"/>
           </a:p>
@@ -1889,7 +1890,7 @@
           <a:p>
             <a:fld id="{2A3C5F88-9950-2441-8A51-A5268CD91903}" type="datetimeFigureOut">
               <a:rPr lang="en-US" smtClean="0"/>
-              <a:t>10/30/15</a:t>
+              <a:t>11/9/15</a:t>
             </a:fld>
             <a:endParaRPr lang="en-US"/>
           </a:p>
@@ -1984,7 +1985,7 @@
           <a:p>
             <a:fld id="{2A3C5F88-9950-2441-8A51-A5268CD91903}" type="datetimeFigureOut">
               <a:rPr lang="en-US" smtClean="0"/>
-              <a:t>10/30/15</a:t>
+              <a:t>11/9/15</a:t>
             </a:fld>
             <a:endParaRPr lang="en-US"/>
           </a:p>
@@ -2261,7 +2262,7 @@
           <a:p>
             <a:fld id="{2A3C5F88-9950-2441-8A51-A5268CD91903}" type="datetimeFigureOut">
               <a:rPr lang="en-US" smtClean="0"/>
-              <a:t>10/30/15</a:t>
+              <a:t>11/9/15</a:t>
             </a:fld>
             <a:endParaRPr lang="en-US"/>
           </a:p>
@@ -2514,7 +2515,7 @@
           <a:p>
             <a:fld id="{2A3C5F88-9950-2441-8A51-A5268CD91903}" type="datetimeFigureOut">
               <a:rPr lang="en-US" smtClean="0"/>
-              <a:t>10/30/15</a:t>
+              <a:t>11/9/15</a:t>
             </a:fld>
             <a:endParaRPr lang="en-US"/>
           </a:p>
@@ -2727,7 +2728,7 @@
           <a:p>
             <a:fld id="{2A3C5F88-9950-2441-8A51-A5268CD91903}" type="datetimeFigureOut">
               <a:rPr lang="en-US" smtClean="0"/>
-              <a:t>10/30/15</a:t>
+              <a:t>11/9/15</a:t>
             </a:fld>
             <a:endParaRPr lang="en-US"/>
           </a:p>
@@ -13417,11 +13418,7 @@
           <a:p>
             <a:r>
               <a:rPr lang="en-US" dirty="0" smtClean="0"/>
-              <a:t>[</a:t>
-            </a:r>
-            <a:r>
-              <a:rPr lang="en-US" dirty="0" smtClean="0"/>
-              <a:t>2008, 2009)</a:t>
+              <a:t>[2008, 2009)</a:t>
             </a:r>
             <a:endParaRPr lang="en-US" dirty="0"/>
           </a:p>
@@ -13451,11 +13448,7 @@
           <a:p>
             <a:r>
               <a:rPr lang="en-US" dirty="0" smtClean="0"/>
-              <a:t>[</a:t>
-            </a:r>
-            <a:r>
-              <a:rPr lang="en-US" dirty="0" smtClean="0"/>
-              <a:t>2009, 2010)</a:t>
+              <a:t>[2009, 2010)</a:t>
             </a:r>
             <a:endParaRPr lang="en-US" dirty="0"/>
           </a:p>
@@ -13485,11 +13478,7 @@
           <a:p>
             <a:r>
               <a:rPr lang="en-US" dirty="0" smtClean="0"/>
-              <a:t>[</a:t>
-            </a:r>
-            <a:r>
-              <a:rPr lang="en-US" dirty="0" smtClean="0"/>
-              <a:t>2010, 2011)</a:t>
+              <a:t>[2010, 2011)</a:t>
             </a:r>
             <a:endParaRPr lang="en-US" dirty="0"/>
           </a:p>
@@ -14443,11 +14432,7 @@
           <a:p>
             <a:r>
               <a:rPr lang="en-US" dirty="0" smtClean="0"/>
-              <a:t>[</a:t>
-            </a:r>
-            <a:r>
-              <a:rPr lang="en-US" dirty="0" smtClean="0"/>
-              <a:t>2011, 2012)</a:t>
+              <a:t>[2011, 2012)</a:t>
             </a:r>
             <a:endParaRPr lang="en-US" dirty="0"/>
           </a:p>
@@ -14477,11 +14462,7 @@
           <a:p>
             <a:r>
               <a:rPr lang="en-US" dirty="0" smtClean="0"/>
-              <a:t>[</a:t>
-            </a:r>
-            <a:r>
-              <a:rPr lang="en-US" dirty="0" smtClean="0"/>
-              <a:t>2012, 2013)</a:t>
+              <a:t>[2012, 2013)</a:t>
             </a:r>
             <a:endParaRPr lang="en-US" dirty="0"/>
           </a:p>
@@ -14511,11 +14492,7 @@
           <a:p>
             <a:r>
               <a:rPr lang="en-US" dirty="0" smtClean="0"/>
-              <a:t>[</a:t>
-            </a:r>
-            <a:r>
-              <a:rPr lang="en-US" dirty="0" smtClean="0"/>
-              <a:t>2013, 2014)</a:t>
+              <a:t>[2013, 2014)</a:t>
             </a:r>
             <a:endParaRPr lang="en-US" dirty="0"/>
           </a:p>
@@ -19695,11 +19672,7 @@
             <a:p>
               <a:r>
                 <a:rPr lang="en-US" dirty="0" smtClean="0"/>
-                <a:t>[2010, </a:t>
-              </a:r>
-              <a:r>
-                <a:rPr lang="en-US" dirty="0" smtClean="0"/>
-                <a:t>2012)</a:t>
+                <a:t>[2010, 2012)</a:t>
               </a:r>
               <a:endParaRPr lang="en-US" dirty="0"/>
             </a:p>
@@ -21270,15 +21243,7 @@
             <a:p>
               <a:r>
                 <a:rPr lang="en-US" dirty="0" smtClean="0"/>
-                <a:t>[</a:t>
-              </a:r>
-              <a:r>
-                <a:rPr lang="en-US" dirty="0" smtClean="0"/>
-                <a:t>2012, </a:t>
-              </a:r>
-              <a:r>
-                <a:rPr lang="en-US" dirty="0" smtClean="0"/>
-                <a:t>2014)</a:t>
+                <a:t>[2012, 2014)</a:t>
               </a:r>
               <a:endParaRPr lang="en-US" dirty="0"/>
             </a:p>
@@ -21708,11 +21673,7 @@
             <a:p>
               <a:r>
                 <a:rPr lang="en-US" dirty="0" smtClean="0"/>
-                <a:t>[2010, </a:t>
-              </a:r>
-              <a:r>
-                <a:rPr lang="en-US" dirty="0" smtClean="0"/>
-                <a:t>2012)</a:t>
+                <a:t>[2010, 2012)</a:t>
               </a:r>
               <a:endParaRPr lang="en-US" dirty="0"/>
             </a:p>
@@ -23076,11 +23037,7 @@
             <a:p>
               <a:r>
                 <a:rPr lang="en-US" dirty="0" smtClean="0"/>
-                <a:t>[2012, </a:t>
-              </a:r>
-              <a:r>
-                <a:rPr lang="en-US" dirty="0" smtClean="0"/>
-                <a:t>2014)</a:t>
+                <a:t>[2012, 2014)</a:t>
               </a:r>
               <a:endParaRPr lang="en-US" dirty="0"/>
             </a:p>
@@ -23931,15 +23888,7 @@
             <a:p>
               <a:r>
                 <a:rPr lang="en-US" dirty="0" smtClean="0"/>
-                <a:t>[</a:t>
-              </a:r>
-              <a:r>
-                <a:rPr lang="en-US" dirty="0" smtClean="0"/>
-                <a:t>2012, </a:t>
-              </a:r>
-              <a:r>
-                <a:rPr lang="en-US" dirty="0" smtClean="0"/>
-                <a:t>2014)</a:t>
+                <a:t>[2012, 2014)</a:t>
               </a:r>
               <a:endParaRPr lang="en-US" dirty="0"/>
             </a:p>
@@ -24758,11 +24707,7 @@
             <a:p>
               <a:r>
                 <a:rPr lang="en-US" dirty="0" smtClean="0"/>
-                <a:t>[2012, </a:t>
-              </a:r>
-              <a:r>
-                <a:rPr lang="en-US" dirty="0" smtClean="0"/>
-                <a:t>2014)</a:t>
+                <a:t>[2012, 2014)</a:t>
               </a:r>
               <a:endParaRPr lang="en-US" dirty="0"/>
             </a:p>
@@ -24823,11 +24768,7 @@
           <a:p>
             <a:r>
               <a:rPr lang="en-US" sz="1600" dirty="0" smtClean="0"/>
-              <a:t>[</a:t>
-            </a:r>
-            <a:r>
-              <a:rPr lang="en-US" sz="1600" dirty="0" smtClean="0"/>
-              <a:t>2008, 2009)</a:t>
+              <a:t>[2008, 2009)</a:t>
             </a:r>
             <a:endParaRPr lang="en-US" sz="1600" dirty="0"/>
           </a:p>
@@ -24894,11 +24835,7 @@
           <a:p>
             <a:r>
               <a:rPr lang="en-US" sz="1600" dirty="0" smtClean="0"/>
-              <a:t>[</a:t>
-            </a:r>
-            <a:r>
-              <a:rPr lang="en-US" sz="1600" dirty="0" smtClean="0"/>
-              <a:t>2009, 2010)</a:t>
+              <a:t>[2009, 2010)</a:t>
             </a:r>
             <a:endParaRPr lang="en-US" sz="1600" dirty="0"/>
           </a:p>
@@ -24928,11 +24865,7 @@
           <a:p>
             <a:r>
               <a:rPr lang="en-US" sz="1600" dirty="0" smtClean="0"/>
-              <a:t>[</a:t>
-            </a:r>
-            <a:r>
-              <a:rPr lang="en-US" sz="1600" dirty="0" smtClean="0"/>
-              <a:t>2010, 2011)</a:t>
+              <a:t>[2010, 2011)</a:t>
             </a:r>
             <a:endParaRPr lang="en-US" sz="1600" dirty="0"/>
           </a:p>
@@ -24962,11 +24895,7 @@
           <a:p>
             <a:r>
               <a:rPr lang="en-US" sz="1600" dirty="0" smtClean="0"/>
-              <a:t>[</a:t>
-            </a:r>
-            <a:r>
-              <a:rPr lang="en-US" sz="1600" dirty="0" smtClean="0"/>
-              <a:t>2011, 2012)</a:t>
+              <a:t>[2011, 2012)</a:t>
             </a:r>
             <a:endParaRPr lang="en-US" sz="1600" dirty="0"/>
           </a:p>
@@ -25650,11 +25579,7 @@
           <a:p>
             <a:r>
               <a:rPr lang="en-US" sz="1600" dirty="0" smtClean="0"/>
-              <a:t>[</a:t>
-            </a:r>
-            <a:r>
-              <a:rPr lang="en-US" sz="1600" dirty="0" smtClean="0"/>
-              <a:t>2013, 2014)</a:t>
+              <a:t>[2013, 2014)</a:t>
             </a:r>
             <a:endParaRPr lang="en-US" sz="1600" dirty="0"/>
           </a:p>
@@ -25684,11 +25609,7 @@
           <a:p>
             <a:r>
               <a:rPr lang="en-US" sz="1600" dirty="0" smtClean="0"/>
-              <a:t>[</a:t>
-            </a:r>
-            <a:r>
-              <a:rPr lang="en-US" sz="1600" dirty="0" smtClean="0"/>
-              <a:t>2014, 2015)</a:t>
+              <a:t>[2014, 2015)</a:t>
             </a:r>
             <a:endParaRPr lang="en-US" sz="1600" dirty="0"/>
           </a:p>
@@ -25718,11 +25639,7 @@
           <a:p>
             <a:r>
               <a:rPr lang="en-US" sz="1600" dirty="0" smtClean="0"/>
-              <a:t>[</a:t>
-            </a:r>
-            <a:r>
-              <a:rPr lang="en-US" sz="1600" dirty="0" smtClean="0"/>
-              <a:t>2015, 2016)</a:t>
+              <a:t>[2015, 2016)</a:t>
             </a:r>
             <a:endParaRPr lang="en-US" sz="1600" dirty="0"/>
           </a:p>
@@ -26269,6 +26186,662 @@
   </p:cSld>
   <p:clrMapOvr>
     <a:masterClrMapping/>
+  </p:clrMapOvr>
+</p:sld>
+</file>
+
+<file path=ppt/slides/slide9.xml><?xml version="1.0" encoding="utf-8"?>
+<p:sld xmlns:a="http://schemas.openxmlformats.org/drawingml/2006/main" xmlns:r="http://schemas.openxmlformats.org/officeDocument/2006/relationships" xmlns:p="http://schemas.openxmlformats.org/presentationml/2006/main">
+  <p:cSld>
+    <p:bg>
+      <p:bgRef idx="1001">
+        <a:schemeClr val="bg1"/>
+      </p:bgRef>
+    </p:bg>
+    <p:spTree>
+      <p:nvGrpSpPr>
+        <p:cNvPr id="1" name=""/>
+        <p:cNvGrpSpPr/>
+        <p:nvPr/>
+      </p:nvGrpSpPr>
+      <p:grpSpPr>
+        <a:xfrm>
+          <a:off x="0" y="0"/>
+          <a:ext cx="0" cy="0"/>
+          <a:chOff x="0" y="0"/>
+          <a:chExt cx="0" cy="0"/>
+        </a:xfrm>
+      </p:grpSpPr>
+      <p:sp>
+        <p:nvSpPr>
+          <p:cNvPr id="2" name="Rectangle 1"/>
+          <p:cNvSpPr/>
+          <p:nvPr/>
+        </p:nvSpPr>
+        <p:spPr>
+          <a:xfrm>
+            <a:off x="517474" y="560442"/>
+            <a:ext cx="2916671" cy="2708352"/>
+          </a:xfrm>
+          <a:prstGeom prst="rect">
+            <a:avLst/>
+          </a:prstGeom>
+          <a:solidFill>
+            <a:schemeClr val="bg2"/>
+          </a:solidFill>
+          <a:ln>
+            <a:solidFill>
+              <a:schemeClr val="tx1"/>
+            </a:solidFill>
+            <a:tailEnd type="none"/>
+          </a:ln>
+          <a:effectLst/>
+        </p:spPr>
+        <p:style>
+          <a:lnRef idx="2">
+            <a:schemeClr val="accent1"/>
+          </a:lnRef>
+          <a:fillRef idx="0">
+            <a:schemeClr val="accent1"/>
+          </a:fillRef>
+          <a:effectRef idx="1">
+            <a:schemeClr val="accent1"/>
+          </a:effectRef>
+          <a:fontRef idx="minor">
+            <a:schemeClr val="tx1"/>
+          </a:fontRef>
+        </p:style>
+        <p:txBody>
+          <a:bodyPr rtlCol="0" anchor="t"/>
+          <a:lstStyle/>
+          <a:p>
+            <a:r>
+              <a:rPr lang="en-US" dirty="0" smtClean="0"/>
+              <a:t>Portal</a:t>
+            </a:r>
+            <a:endParaRPr lang="en-US" dirty="0"/>
+          </a:p>
+        </p:txBody>
+      </p:sp>
+      <p:sp>
+        <p:nvSpPr>
+          <p:cNvPr id="31" name="Rectangle 30"/>
+          <p:cNvSpPr/>
+          <p:nvPr/>
+        </p:nvSpPr>
+        <p:spPr>
+          <a:xfrm>
+            <a:off x="799733" y="1019444"/>
+            <a:ext cx="2469762" cy="430345"/>
+          </a:xfrm>
+          <a:prstGeom prst="rect">
+            <a:avLst/>
+          </a:prstGeom>
+          <a:ln>
+            <a:prstDash val="dash"/>
+          </a:ln>
+        </p:spPr>
+        <p:style>
+          <a:lnRef idx="1">
+            <a:schemeClr val="accent1"/>
+          </a:lnRef>
+          <a:fillRef idx="3">
+            <a:schemeClr val="accent1"/>
+          </a:fillRef>
+          <a:effectRef idx="2">
+            <a:schemeClr val="accent1"/>
+          </a:effectRef>
+          <a:fontRef idx="minor">
+            <a:schemeClr val="lt1"/>
+          </a:fontRef>
+        </p:style>
+        <p:txBody>
+          <a:bodyPr rtlCol="0" anchor="ctr"/>
+          <a:lstStyle/>
+          <a:p>
+            <a:pPr algn="ctr"/>
+            <a:r>
+              <a:rPr lang="en-US" dirty="0" smtClean="0">
+                <a:solidFill>
+                  <a:schemeClr val="tx1"/>
+                </a:solidFill>
+              </a:rPr>
+              <a:t>Interactive Shell</a:t>
+            </a:r>
+            <a:endParaRPr lang="en-US" dirty="0">
+              <a:solidFill>
+                <a:schemeClr val="tx1"/>
+              </a:solidFill>
+            </a:endParaRPr>
+          </a:p>
+        </p:txBody>
+      </p:sp>
+      <p:sp>
+        <p:nvSpPr>
+          <p:cNvPr id="32" name="Rectangle 31"/>
+          <p:cNvSpPr/>
+          <p:nvPr/>
+        </p:nvSpPr>
+        <p:spPr>
+          <a:xfrm>
+            <a:off x="799733" y="1560320"/>
+            <a:ext cx="2469762" cy="430345"/>
+          </a:xfrm>
+          <a:prstGeom prst="rect">
+            <a:avLst/>
+          </a:prstGeom>
+        </p:spPr>
+        <p:style>
+          <a:lnRef idx="1">
+            <a:schemeClr val="accent1"/>
+          </a:lnRef>
+          <a:fillRef idx="3">
+            <a:schemeClr val="accent1"/>
+          </a:fillRef>
+          <a:effectRef idx="2">
+            <a:schemeClr val="accent1"/>
+          </a:effectRef>
+          <a:fontRef idx="minor">
+            <a:schemeClr val="lt1"/>
+          </a:fontRef>
+        </p:style>
+        <p:txBody>
+          <a:bodyPr rtlCol="0" anchor="ctr"/>
+          <a:lstStyle/>
+          <a:p>
+            <a:pPr algn="ctr"/>
+            <a:r>
+              <a:rPr lang="en-US" dirty="0" smtClean="0">
+                <a:solidFill>
+                  <a:schemeClr val="tx1"/>
+                </a:solidFill>
+              </a:rPr>
+              <a:t>Query Parser</a:t>
+            </a:r>
+            <a:endParaRPr lang="en-US" dirty="0">
+              <a:solidFill>
+                <a:schemeClr val="tx1"/>
+              </a:solidFill>
+            </a:endParaRPr>
+          </a:p>
+        </p:txBody>
+      </p:sp>
+      <p:sp>
+        <p:nvSpPr>
+          <p:cNvPr id="33" name="Rectangle 32"/>
+          <p:cNvSpPr/>
+          <p:nvPr/>
+        </p:nvSpPr>
+        <p:spPr>
+          <a:xfrm>
+            <a:off x="799733" y="2109430"/>
+            <a:ext cx="2469762" cy="430345"/>
+          </a:xfrm>
+          <a:prstGeom prst="rect">
+            <a:avLst/>
+          </a:prstGeom>
+          <a:ln>
+            <a:solidFill>
+              <a:srgbClr val="4F81BD"/>
+            </a:solidFill>
+            <a:prstDash val="dash"/>
+          </a:ln>
+        </p:spPr>
+        <p:style>
+          <a:lnRef idx="1">
+            <a:schemeClr val="accent1"/>
+          </a:lnRef>
+          <a:fillRef idx="3">
+            <a:schemeClr val="accent1"/>
+          </a:fillRef>
+          <a:effectRef idx="2">
+            <a:schemeClr val="accent1"/>
+          </a:effectRef>
+          <a:fontRef idx="minor">
+            <a:schemeClr val="lt1"/>
+          </a:fontRef>
+        </p:style>
+        <p:txBody>
+          <a:bodyPr rtlCol="0" anchor="ctr"/>
+          <a:lstStyle/>
+          <a:p>
+            <a:pPr algn="ctr"/>
+            <a:r>
+              <a:rPr lang="en-US" dirty="0" smtClean="0">
+                <a:solidFill>
+                  <a:schemeClr val="tx1"/>
+                </a:solidFill>
+              </a:rPr>
+              <a:t>Optimizer</a:t>
+            </a:r>
+            <a:endParaRPr lang="en-US" dirty="0">
+              <a:solidFill>
+                <a:schemeClr val="tx1"/>
+              </a:solidFill>
+            </a:endParaRPr>
+          </a:p>
+        </p:txBody>
+      </p:sp>
+      <p:sp>
+        <p:nvSpPr>
+          <p:cNvPr id="34" name="Rectangle 33"/>
+          <p:cNvSpPr/>
+          <p:nvPr/>
+        </p:nvSpPr>
+        <p:spPr>
+          <a:xfrm>
+            <a:off x="799733" y="2650306"/>
+            <a:ext cx="2469762" cy="430345"/>
+          </a:xfrm>
+          <a:prstGeom prst="rect">
+            <a:avLst/>
+          </a:prstGeom>
+          <a:gradFill flip="none" rotWithShape="1">
+            <a:gsLst>
+              <a:gs pos="0">
+                <a:srgbClr val="00B601"/>
+              </a:gs>
+              <a:gs pos="100000">
+                <a:srgbClr val="FFFFFF"/>
+              </a:gs>
+            </a:gsLst>
+            <a:lin ang="16200000" scaled="0"/>
+            <a:tileRect/>
+          </a:gradFill>
+          <a:ln>
+            <a:solidFill>
+              <a:schemeClr val="tx1"/>
+            </a:solidFill>
+            <a:tailEnd type="none"/>
+          </a:ln>
+          <a:effectLst/>
+        </p:spPr>
+        <p:style>
+          <a:lnRef idx="2">
+            <a:schemeClr val="accent1"/>
+          </a:lnRef>
+          <a:fillRef idx="0">
+            <a:schemeClr val="accent1"/>
+          </a:fillRef>
+          <a:effectRef idx="1">
+            <a:schemeClr val="accent1"/>
+          </a:effectRef>
+          <a:fontRef idx="minor">
+            <a:schemeClr val="tx1"/>
+          </a:fontRef>
+        </p:style>
+        <p:txBody>
+          <a:bodyPr rtlCol="0" anchor="ctr"/>
+          <a:lstStyle/>
+          <a:p>
+            <a:pPr algn="ctr"/>
+            <a:r>
+              <a:rPr lang="en-US" dirty="0">
+                <a:solidFill>
+                  <a:schemeClr val="tx1"/>
+                </a:solidFill>
+              </a:rPr>
+              <a:t>Spark Runtime</a:t>
+            </a:r>
+          </a:p>
+        </p:txBody>
+      </p:sp>
+      <p:sp>
+        <p:nvSpPr>
+          <p:cNvPr id="35" name="Rectangle 34"/>
+          <p:cNvSpPr/>
+          <p:nvPr/>
+        </p:nvSpPr>
+        <p:spPr>
+          <a:xfrm>
+            <a:off x="517474" y="3538796"/>
+            <a:ext cx="6479695" cy="553076"/>
+          </a:xfrm>
+          <a:prstGeom prst="rect">
+            <a:avLst/>
+          </a:prstGeom>
+          <a:gradFill flip="none" rotWithShape="1">
+            <a:gsLst>
+              <a:gs pos="0">
+                <a:srgbClr val="00B601"/>
+              </a:gs>
+              <a:gs pos="100000">
+                <a:srgbClr val="FFFFFF"/>
+              </a:gs>
+            </a:gsLst>
+            <a:lin ang="16200000" scaled="0"/>
+            <a:tileRect/>
+          </a:gradFill>
+          <a:ln>
+            <a:solidFill>
+              <a:schemeClr val="tx1"/>
+            </a:solidFill>
+            <a:tailEnd type="none"/>
+          </a:ln>
+          <a:effectLst/>
+        </p:spPr>
+        <p:style>
+          <a:lnRef idx="2">
+            <a:schemeClr val="accent1"/>
+          </a:lnRef>
+          <a:fillRef idx="0">
+            <a:schemeClr val="accent1"/>
+          </a:fillRef>
+          <a:effectRef idx="1">
+            <a:schemeClr val="accent1"/>
+          </a:effectRef>
+          <a:fontRef idx="minor">
+            <a:schemeClr val="tx1"/>
+          </a:fontRef>
+        </p:style>
+        <p:txBody>
+          <a:bodyPr rtlCol="0" anchor="ctr"/>
+          <a:lstStyle/>
+          <a:p>
+            <a:pPr algn="ctr"/>
+            <a:r>
+              <a:rPr lang="en-US" dirty="0" smtClean="0"/>
+              <a:t>HDFS</a:t>
+            </a:r>
+            <a:endParaRPr lang="en-US" dirty="0"/>
+          </a:p>
+        </p:txBody>
+      </p:sp>
+      <p:grpSp>
+        <p:nvGrpSpPr>
+          <p:cNvPr id="38" name="Group 37"/>
+          <p:cNvGrpSpPr/>
+          <p:nvPr/>
+        </p:nvGrpSpPr>
+        <p:grpSpPr>
+          <a:xfrm>
+            <a:off x="4080498" y="532945"/>
+            <a:ext cx="2916671" cy="1027375"/>
+            <a:chOff x="4080498" y="532945"/>
+            <a:chExt cx="2916671" cy="1027375"/>
+          </a:xfrm>
+        </p:grpSpPr>
+        <p:sp>
+          <p:nvSpPr>
+            <p:cNvPr id="36" name="Rectangle 35"/>
+            <p:cNvSpPr/>
+            <p:nvPr/>
+          </p:nvSpPr>
+          <p:spPr>
+            <a:xfrm>
+              <a:off x="4080498" y="532945"/>
+              <a:ext cx="2916671" cy="1027375"/>
+            </a:xfrm>
+            <a:prstGeom prst="rect">
+              <a:avLst/>
+            </a:prstGeom>
+            <a:solidFill>
+              <a:srgbClr val="EEECE1"/>
+            </a:solidFill>
+            <a:ln>
+              <a:solidFill>
+                <a:schemeClr val="tx1"/>
+              </a:solidFill>
+              <a:tailEnd type="none"/>
+            </a:ln>
+            <a:effectLst/>
+          </p:spPr>
+          <p:style>
+            <a:lnRef idx="2">
+              <a:schemeClr val="accent1"/>
+            </a:lnRef>
+            <a:fillRef idx="0">
+              <a:schemeClr val="accent1"/>
+            </a:fillRef>
+            <a:effectRef idx="1">
+              <a:schemeClr val="accent1"/>
+            </a:effectRef>
+            <a:fontRef idx="minor">
+              <a:schemeClr val="tx1"/>
+            </a:fontRef>
+          </p:style>
+          <p:txBody>
+            <a:bodyPr rtlCol="0" anchor="t"/>
+            <a:lstStyle/>
+            <a:p>
+              <a:r>
+                <a:rPr lang="en-US" dirty="0" smtClean="0"/>
+                <a:t>Spark Worker</a:t>
+              </a:r>
+              <a:endParaRPr lang="en-US" dirty="0"/>
+            </a:p>
+          </p:txBody>
+        </p:sp>
+        <p:sp>
+          <p:nvSpPr>
+            <p:cNvPr id="37" name="Rectangle 36"/>
+            <p:cNvSpPr/>
+            <p:nvPr/>
+          </p:nvSpPr>
+          <p:spPr>
+            <a:xfrm>
+              <a:off x="4280920" y="957128"/>
+              <a:ext cx="2469762" cy="430345"/>
+            </a:xfrm>
+            <a:prstGeom prst="rect">
+              <a:avLst/>
+            </a:prstGeom>
+            <a:gradFill flip="none" rotWithShape="1">
+              <a:gsLst>
+                <a:gs pos="0">
+                  <a:srgbClr val="00B601"/>
+                </a:gs>
+                <a:gs pos="100000">
+                  <a:srgbClr val="FFFFFF"/>
+                </a:gs>
+              </a:gsLst>
+              <a:lin ang="16200000" scaled="0"/>
+              <a:tileRect/>
+            </a:gradFill>
+          </p:spPr>
+          <p:style>
+            <a:lnRef idx="1">
+              <a:schemeClr val="accent1"/>
+            </a:lnRef>
+            <a:fillRef idx="3">
+              <a:schemeClr val="accent1"/>
+            </a:fillRef>
+            <a:effectRef idx="2">
+              <a:schemeClr val="accent1"/>
+            </a:effectRef>
+            <a:fontRef idx="minor">
+              <a:schemeClr val="lt1"/>
+            </a:fontRef>
+          </p:style>
+          <p:txBody>
+            <a:bodyPr rtlCol="0" anchor="ctr"/>
+            <a:lstStyle/>
+            <a:p>
+              <a:pPr algn="ctr"/>
+              <a:r>
+                <a:rPr lang="en-US" dirty="0" smtClean="0">
+                  <a:solidFill>
+                    <a:schemeClr val="tx1"/>
+                  </a:solidFill>
+                </a:rPr>
+                <a:t>Spark Runtime</a:t>
+              </a:r>
+              <a:endParaRPr lang="en-US" dirty="0">
+                <a:solidFill>
+                  <a:schemeClr val="tx1"/>
+                </a:solidFill>
+              </a:endParaRPr>
+            </a:p>
+          </p:txBody>
+        </p:sp>
+      </p:grpSp>
+      <p:grpSp>
+        <p:nvGrpSpPr>
+          <p:cNvPr id="39" name="Group 38"/>
+          <p:cNvGrpSpPr/>
+          <p:nvPr/>
+        </p:nvGrpSpPr>
+        <p:grpSpPr>
+          <a:xfrm>
+            <a:off x="4091769" y="1693482"/>
+            <a:ext cx="2916671" cy="1027375"/>
+            <a:chOff x="4080498" y="532945"/>
+            <a:chExt cx="2916671" cy="1027375"/>
+          </a:xfrm>
+        </p:grpSpPr>
+        <p:sp>
+          <p:nvSpPr>
+            <p:cNvPr id="40" name="Rectangle 39"/>
+            <p:cNvSpPr/>
+            <p:nvPr/>
+          </p:nvSpPr>
+          <p:spPr>
+            <a:xfrm>
+              <a:off x="4080498" y="532945"/>
+              <a:ext cx="2916671" cy="1027375"/>
+            </a:xfrm>
+            <a:prstGeom prst="rect">
+              <a:avLst/>
+            </a:prstGeom>
+            <a:solidFill>
+              <a:srgbClr val="EEECE1"/>
+            </a:solidFill>
+            <a:ln>
+              <a:solidFill>
+                <a:schemeClr val="tx1"/>
+              </a:solidFill>
+              <a:tailEnd type="none"/>
+            </a:ln>
+            <a:effectLst/>
+          </p:spPr>
+          <p:style>
+            <a:lnRef idx="2">
+              <a:schemeClr val="accent1"/>
+            </a:lnRef>
+            <a:fillRef idx="0">
+              <a:schemeClr val="accent1"/>
+            </a:fillRef>
+            <a:effectRef idx="1">
+              <a:schemeClr val="accent1"/>
+            </a:effectRef>
+            <a:fontRef idx="minor">
+              <a:schemeClr val="tx1"/>
+            </a:fontRef>
+          </p:style>
+          <p:txBody>
+            <a:bodyPr rtlCol="0" anchor="t"/>
+            <a:lstStyle/>
+            <a:p>
+              <a:r>
+                <a:rPr lang="en-US" dirty="0" smtClean="0"/>
+                <a:t>Spark Worker</a:t>
+              </a:r>
+              <a:endParaRPr lang="en-US" dirty="0"/>
+            </a:p>
+          </p:txBody>
+        </p:sp>
+        <p:sp>
+          <p:nvSpPr>
+            <p:cNvPr id="41" name="Rectangle 40"/>
+            <p:cNvSpPr/>
+            <p:nvPr/>
+          </p:nvSpPr>
+          <p:spPr>
+            <a:xfrm>
+              <a:off x="4280920" y="957128"/>
+              <a:ext cx="2469762" cy="430345"/>
+            </a:xfrm>
+            <a:prstGeom prst="rect">
+              <a:avLst/>
+            </a:prstGeom>
+            <a:gradFill flip="none" rotWithShape="1">
+              <a:gsLst>
+                <a:gs pos="0">
+                  <a:srgbClr val="00B601"/>
+                </a:gs>
+                <a:gs pos="100000">
+                  <a:srgbClr val="FFFFFF"/>
+                </a:gs>
+              </a:gsLst>
+              <a:lin ang="16200000" scaled="0"/>
+              <a:tileRect/>
+            </a:gradFill>
+          </p:spPr>
+          <p:style>
+            <a:lnRef idx="1">
+              <a:schemeClr val="accent1"/>
+            </a:lnRef>
+            <a:fillRef idx="3">
+              <a:schemeClr val="accent1"/>
+            </a:fillRef>
+            <a:effectRef idx="2">
+              <a:schemeClr val="accent1"/>
+            </a:effectRef>
+            <a:fontRef idx="minor">
+              <a:schemeClr val="lt1"/>
+            </a:fontRef>
+          </p:style>
+          <p:txBody>
+            <a:bodyPr rtlCol="0" anchor="ctr"/>
+            <a:lstStyle/>
+            <a:p>
+              <a:pPr algn="ctr"/>
+              <a:r>
+                <a:rPr lang="en-US" dirty="0" smtClean="0">
+                  <a:solidFill>
+                    <a:schemeClr val="tx1"/>
+                  </a:solidFill>
+                </a:rPr>
+                <a:t>Spark Runtime</a:t>
+              </a:r>
+              <a:endParaRPr lang="en-US" dirty="0">
+                <a:solidFill>
+                  <a:schemeClr val="tx1"/>
+                </a:solidFill>
+              </a:endParaRPr>
+            </a:p>
+          </p:txBody>
+        </p:sp>
+      </p:grpSp>
+      <p:sp>
+        <p:nvSpPr>
+          <p:cNvPr id="42" name="TextBox 41"/>
+          <p:cNvSpPr txBox="1"/>
+          <p:nvPr/>
+        </p:nvSpPr>
+        <p:spPr>
+          <a:xfrm>
+            <a:off x="5372104" y="2720857"/>
+            <a:ext cx="432580" cy="523220"/>
+          </a:xfrm>
+          <a:prstGeom prst="rect">
+            <a:avLst/>
+          </a:prstGeom>
+          <a:noFill/>
+        </p:spPr>
+        <p:txBody>
+          <a:bodyPr wrap="none" rtlCol="0">
+            <a:spAutoFit/>
+          </a:bodyPr>
+          <a:lstStyle/>
+          <a:p>
+            <a:r>
+              <a:rPr lang="en-US" sz="2800" dirty="0" smtClean="0"/>
+              <a:t>…</a:t>
+            </a:r>
+            <a:endParaRPr lang="en-US" sz="2800" dirty="0"/>
+          </a:p>
+        </p:txBody>
+      </p:sp>
+    </p:spTree>
+    <p:extLst>
+      <p:ext uri="{BB962C8B-B14F-4D97-AF65-F5344CB8AC3E}">
+        <p14:creationId xmlns:p14="http://schemas.microsoft.com/office/powerpoint/2010/main" val="4239985456"/>
+      </p:ext>
+    </p:extLst>
+  </p:cSld>
+  <p:clrMapOvr>
+    <a:overrideClrMapping bg1="lt1" tx1="dk1" bg2="lt2" tx2="dk2" accent1="accent1" accent2="accent2" accent3="accent3" accent4="accent4" accent5="accent5" accent6="accent6" hlink="hlink" folHlink="folHlink"/>
   </p:clrMapOvr>
 </p:sld>
 </file>
@@ -26591,4 +27164,47 @@
   </a:objectDefaults>
   <a:extraClrSchemeLst/>
 </a:theme>
+</file>
+
+<file path=ppt/theme/themeOverride1.xml><?xml version="1.0" encoding="utf-8"?>
+<a:themeOverride xmlns:a="http://schemas.openxmlformats.org/drawingml/2006/main">
+  <a:clrScheme name="Office">
+    <a:dk1>
+      <a:sysClr val="windowText" lastClr="000000"/>
+    </a:dk1>
+    <a:lt1>
+      <a:sysClr val="window" lastClr="FFFFFF"/>
+    </a:lt1>
+    <a:dk2>
+      <a:srgbClr val="1F497D"/>
+    </a:dk2>
+    <a:lt2>
+      <a:srgbClr val="EEECE1"/>
+    </a:lt2>
+    <a:accent1>
+      <a:srgbClr val="4F81BD"/>
+    </a:accent1>
+    <a:accent2>
+      <a:srgbClr val="C0504D"/>
+    </a:accent2>
+    <a:accent3>
+      <a:srgbClr val="9BBB59"/>
+    </a:accent3>
+    <a:accent4>
+      <a:srgbClr val="8064A2"/>
+    </a:accent4>
+    <a:accent5>
+      <a:srgbClr val="4BACC6"/>
+    </a:accent5>
+    <a:accent6>
+      <a:srgbClr val="F79646"/>
+    </a:accent6>
+    <a:hlink>
+      <a:srgbClr val="0000FF"/>
+    </a:hlink>
+    <a:folHlink>
+      <a:srgbClr val="800080"/>
+    </a:folHlink>
+  </a:clrScheme>
+</a:themeOverride>
 </file>
</xml_diff>

<commit_message>
A revision of the system section (specifically, data structures) for clarity. Reworked figures.
</commit_message>
<xml_diff>
--- a/paper/sigmod2016/figs/figures.pptx
+++ b/paper/sigmod2016/figs/figures.pptx
@@ -296,7 +296,7 @@
           <a:p>
             <a:fld id="{2A3C5F88-9950-2441-8A51-A5268CD91903}" type="datetimeFigureOut">
               <a:rPr lang="en-US" smtClean="0"/>
-              <a:t>11/9/15</a:t>
+              <a:t>11/11/15</a:t>
             </a:fld>
             <a:endParaRPr lang="en-US"/>
           </a:p>
@@ -466,7 +466,7 @@
           <a:p>
             <a:fld id="{2A3C5F88-9950-2441-8A51-A5268CD91903}" type="datetimeFigureOut">
               <a:rPr lang="en-US" smtClean="0"/>
-              <a:t>11/9/15</a:t>
+              <a:t>11/11/15</a:t>
             </a:fld>
             <a:endParaRPr lang="en-US"/>
           </a:p>
@@ -646,7 +646,7 @@
           <a:p>
             <a:fld id="{2A3C5F88-9950-2441-8A51-A5268CD91903}" type="datetimeFigureOut">
               <a:rPr lang="en-US" smtClean="0"/>
-              <a:t>11/9/15</a:t>
+              <a:t>11/11/15</a:t>
             </a:fld>
             <a:endParaRPr lang="en-US"/>
           </a:p>
@@ -816,7 +816,7 @@
           <a:p>
             <a:fld id="{2A3C5F88-9950-2441-8A51-A5268CD91903}" type="datetimeFigureOut">
               <a:rPr lang="en-US" smtClean="0"/>
-              <a:t>11/9/15</a:t>
+              <a:t>11/11/15</a:t>
             </a:fld>
             <a:endParaRPr lang="en-US"/>
           </a:p>
@@ -1062,7 +1062,7 @@
           <a:p>
             <a:fld id="{2A3C5F88-9950-2441-8A51-A5268CD91903}" type="datetimeFigureOut">
               <a:rPr lang="en-US" smtClean="0"/>
-              <a:t>11/9/15</a:t>
+              <a:t>11/11/15</a:t>
             </a:fld>
             <a:endParaRPr lang="en-US"/>
           </a:p>
@@ -1350,7 +1350,7 @@
           <a:p>
             <a:fld id="{2A3C5F88-9950-2441-8A51-A5268CD91903}" type="datetimeFigureOut">
               <a:rPr lang="en-US" smtClean="0"/>
-              <a:t>11/9/15</a:t>
+              <a:t>11/11/15</a:t>
             </a:fld>
             <a:endParaRPr lang="en-US"/>
           </a:p>
@@ -1772,7 +1772,7 @@
           <a:p>
             <a:fld id="{2A3C5F88-9950-2441-8A51-A5268CD91903}" type="datetimeFigureOut">
               <a:rPr lang="en-US" smtClean="0"/>
-              <a:t>11/9/15</a:t>
+              <a:t>11/11/15</a:t>
             </a:fld>
             <a:endParaRPr lang="en-US"/>
           </a:p>
@@ -1890,7 +1890,7 @@
           <a:p>
             <a:fld id="{2A3C5F88-9950-2441-8A51-A5268CD91903}" type="datetimeFigureOut">
               <a:rPr lang="en-US" smtClean="0"/>
-              <a:t>11/9/15</a:t>
+              <a:t>11/11/15</a:t>
             </a:fld>
             <a:endParaRPr lang="en-US"/>
           </a:p>
@@ -1985,7 +1985,7 @@
           <a:p>
             <a:fld id="{2A3C5F88-9950-2441-8A51-A5268CD91903}" type="datetimeFigureOut">
               <a:rPr lang="en-US" smtClean="0"/>
-              <a:t>11/9/15</a:t>
+              <a:t>11/11/15</a:t>
             </a:fld>
             <a:endParaRPr lang="en-US"/>
           </a:p>
@@ -2262,7 +2262,7 @@
           <a:p>
             <a:fld id="{2A3C5F88-9950-2441-8A51-A5268CD91903}" type="datetimeFigureOut">
               <a:rPr lang="en-US" smtClean="0"/>
-              <a:t>11/9/15</a:t>
+              <a:t>11/11/15</a:t>
             </a:fld>
             <a:endParaRPr lang="en-US"/>
           </a:p>
@@ -2515,7 +2515,7 @@
           <a:p>
             <a:fld id="{2A3C5F88-9950-2441-8A51-A5268CD91903}" type="datetimeFigureOut">
               <a:rPr lang="en-US" smtClean="0"/>
-              <a:t>11/9/15</a:t>
+              <a:t>11/11/15</a:t>
             </a:fld>
             <a:endParaRPr lang="en-US"/>
           </a:p>
@@ -2728,7 +2728,7 @@
           <a:p>
             <a:fld id="{2A3C5F88-9950-2441-8A51-A5268CD91903}" type="datetimeFigureOut">
               <a:rPr lang="en-US" smtClean="0"/>
-              <a:t>11/9/15</a:t>
+              <a:t>11/11/15</a:t>
             </a:fld>
             <a:endParaRPr lang="en-US"/>
           </a:p>
@@ -26220,8 +26220,8 @@
         </p:nvSpPr>
         <p:spPr>
           <a:xfrm>
-            <a:off x="517474" y="560442"/>
-            <a:ext cx="2916671" cy="2708352"/>
+            <a:off x="651944" y="560442"/>
+            <a:ext cx="2769586" cy="3115087"/>
           </a:xfrm>
           <a:prstGeom prst="rect">
             <a:avLst/>
@@ -26271,14 +26271,14 @@
         </p:nvSpPr>
         <p:spPr>
           <a:xfrm>
-            <a:off x="799733" y="1019444"/>
-            <a:ext cx="2469762" cy="430345"/>
+            <a:off x="799733" y="989562"/>
+            <a:ext cx="2469762" cy="399967"/>
           </a:xfrm>
           <a:prstGeom prst="rect">
             <a:avLst/>
           </a:prstGeom>
           <a:ln>
-            <a:prstDash val="dash"/>
+            <a:prstDash val="solid"/>
           </a:ln>
         </p:spPr>
         <p:style>
@@ -26324,8 +26324,8 @@
         </p:nvSpPr>
         <p:spPr>
           <a:xfrm>
-            <a:off x="799733" y="1560320"/>
-            <a:ext cx="2469762" cy="430345"/>
+            <a:off x="799733" y="1425852"/>
+            <a:ext cx="2469762" cy="396972"/>
           </a:xfrm>
           <a:prstGeom prst="rect">
             <a:avLst/>
@@ -26374,8 +26374,8 @@
         </p:nvSpPr>
         <p:spPr>
           <a:xfrm>
-            <a:off x="799733" y="2109430"/>
-            <a:ext cx="2469762" cy="430345"/>
+            <a:off x="799733" y="1849433"/>
+            <a:ext cx="2469762" cy="600635"/>
           </a:xfrm>
           <a:prstGeom prst="rect">
             <a:avLst/>
@@ -26384,7 +26384,7 @@
             <a:solidFill>
               <a:srgbClr val="4F81BD"/>
             </a:solidFill>
-            <a:prstDash val="dash"/>
+            <a:prstDash val="solid"/>
           </a:ln>
         </p:spPr>
         <p:style>
@@ -26412,9 +26412,33 @@
                   <a:schemeClr val="tx1"/>
                 </a:solidFill>
               </a:rPr>
-              <a:t>Optimizer</a:t>
+              <a:t>Portal Runtime (</a:t>
             </a:r>
-            <a:endParaRPr lang="en-US" dirty="0">
+            <a:r>
+              <a:rPr lang="en-US" sz="1600" dirty="0" smtClean="0">
+                <a:solidFill>
+                  <a:schemeClr val="tx1"/>
+                </a:solidFill>
+              </a:rPr>
+              <a:t>optimizer, operators, </a:t>
+            </a:r>
+            <a:r>
+              <a:rPr lang="en-US" sz="1600" dirty="0" err="1" smtClean="0">
+                <a:solidFill>
+                  <a:schemeClr val="tx1"/>
+                </a:solidFill>
+              </a:rPr>
+              <a:t>etc</a:t>
+            </a:r>
+            <a:r>
+              <a:rPr lang="en-US" sz="1600" dirty="0" smtClean="0">
+                <a:solidFill>
+                  <a:schemeClr val="tx1"/>
+                </a:solidFill>
+              </a:rPr>
+              <a:t>)</a:t>
+            </a:r>
+            <a:endParaRPr lang="en-US" sz="1600" dirty="0">
               <a:solidFill>
                 <a:schemeClr val="tx1"/>
               </a:solidFill>
@@ -26430,24 +26454,15 @@
         </p:nvSpPr>
         <p:spPr>
           <a:xfrm>
-            <a:off x="799733" y="2650306"/>
-            <a:ext cx="2469762" cy="430345"/>
+            <a:off x="799733" y="2525058"/>
+            <a:ext cx="2469762" cy="1075765"/>
           </a:xfrm>
           <a:prstGeom prst="rect">
             <a:avLst/>
           </a:prstGeom>
-          <a:gradFill flip="none" rotWithShape="1">
-            <a:gsLst>
-              <a:gs pos="0">
-                <a:srgbClr val="00B601"/>
-              </a:gs>
-              <a:gs pos="100000">
-                <a:srgbClr val="FFFFFF"/>
-              </a:gs>
-            </a:gsLst>
-            <a:lin ang="16200000" scaled="0"/>
-            <a:tileRect/>
-          </a:gradFill>
+          <a:solidFill>
+            <a:srgbClr val="00B601"/>
+          </a:solidFill>
           <a:ln>
             <a:solidFill>
               <a:schemeClr val="tx1"/>
@@ -26471,7 +26486,7 @@
           </a:fontRef>
         </p:style>
         <p:txBody>
-          <a:bodyPr rtlCol="0" anchor="ctr"/>
+          <a:bodyPr rtlCol="0" anchor="b"/>
           <a:lstStyle/>
           <a:p>
             <a:pPr algn="ctr"/>
@@ -26488,30 +26503,21 @@
       </p:sp>
       <p:sp>
         <p:nvSpPr>
-          <p:cNvPr id="35" name="Rectangle 34"/>
+          <p:cNvPr id="16" name="Rectangle 15"/>
           <p:cNvSpPr/>
           <p:nvPr/>
         </p:nvSpPr>
         <p:spPr>
           <a:xfrm>
-            <a:off x="517474" y="3538796"/>
-            <a:ext cx="6479695" cy="553076"/>
+            <a:off x="802723" y="2528048"/>
+            <a:ext cx="1707394" cy="729128"/>
           </a:xfrm>
           <a:prstGeom prst="rect">
             <a:avLst/>
           </a:prstGeom>
-          <a:gradFill flip="none" rotWithShape="1">
-            <a:gsLst>
-              <a:gs pos="0">
-                <a:srgbClr val="00B601"/>
-              </a:gs>
-              <a:gs pos="100000">
-                <a:srgbClr val="FFFFFF"/>
-              </a:gs>
-            </a:gsLst>
-            <a:lin ang="16200000" scaled="0"/>
-            <a:tileRect/>
-          </a:gradFill>
+          <a:solidFill>
+            <a:srgbClr val="00B601"/>
+          </a:solidFill>
           <a:ln>
             <a:solidFill>
               <a:schemeClr val="tx1"/>
@@ -26535,284 +26541,424 @@
           </a:fontRef>
         </p:style>
         <p:txBody>
+          <a:bodyPr rtlCol="0" anchor="b"/>
+          <a:lstStyle/>
+          <a:p>
+            <a:pPr algn="ctr"/>
+            <a:r>
+              <a:rPr lang="en-US" dirty="0" err="1" smtClean="0">
+                <a:solidFill>
+                  <a:schemeClr val="tx1"/>
+                </a:solidFill>
+              </a:rPr>
+              <a:t>GraphX</a:t>
+            </a:r>
+            <a:endParaRPr lang="en-US" dirty="0">
+              <a:solidFill>
+                <a:schemeClr val="tx1"/>
+              </a:solidFill>
+            </a:endParaRPr>
+          </a:p>
+        </p:txBody>
+      </p:sp>
+      <p:sp>
+        <p:nvSpPr>
+          <p:cNvPr id="15" name="Rectangle 14"/>
+          <p:cNvSpPr/>
+          <p:nvPr/>
+        </p:nvSpPr>
+        <p:spPr>
+          <a:xfrm>
+            <a:off x="1023849" y="2539715"/>
+            <a:ext cx="1904620" cy="314050"/>
+          </a:xfrm>
+          <a:prstGeom prst="rect">
+            <a:avLst/>
+          </a:prstGeom>
+          <a:ln>
+            <a:solidFill>
+              <a:srgbClr val="4F81BD"/>
+            </a:solidFill>
+            <a:prstDash val="solid"/>
+          </a:ln>
+        </p:spPr>
+        <p:style>
+          <a:lnRef idx="1">
+            <a:schemeClr val="accent1"/>
+          </a:lnRef>
+          <a:fillRef idx="3">
+            <a:schemeClr val="accent1"/>
+          </a:fillRef>
+          <a:effectRef idx="2">
+            <a:schemeClr val="accent1"/>
+          </a:effectRef>
+          <a:fontRef idx="minor">
+            <a:schemeClr val="lt1"/>
+          </a:fontRef>
+        </p:style>
+        <p:txBody>
           <a:bodyPr rtlCol="0" anchor="ctr"/>
           <a:lstStyle/>
           <a:p>
             <a:pPr algn="ctr"/>
             <a:r>
+              <a:rPr lang="en-US" sz="1600" dirty="0" smtClean="0">
+                <a:solidFill>
+                  <a:schemeClr val="tx1"/>
+                </a:solidFill>
+              </a:rPr>
+              <a:t>Data Structures</a:t>
+            </a:r>
+            <a:endParaRPr lang="en-US" sz="1600" dirty="0">
+              <a:solidFill>
+                <a:schemeClr val="tx1"/>
+              </a:solidFill>
+            </a:endParaRPr>
+          </a:p>
+        </p:txBody>
+      </p:sp>
+      <p:sp>
+        <p:nvSpPr>
+          <p:cNvPr id="10" name="Rectangle 9"/>
+          <p:cNvSpPr/>
+          <p:nvPr/>
+        </p:nvSpPr>
+        <p:spPr>
+          <a:xfrm>
+            <a:off x="3716250" y="560441"/>
+            <a:ext cx="2627265" cy="1288991"/>
+          </a:xfrm>
+          <a:prstGeom prst="rect">
+            <a:avLst/>
+          </a:prstGeom>
+          <a:solidFill>
+            <a:schemeClr val="bg2"/>
+          </a:solidFill>
+          <a:ln>
+            <a:solidFill>
+              <a:schemeClr val="tx1"/>
+            </a:solidFill>
+            <a:tailEnd type="none"/>
+          </a:ln>
+          <a:effectLst/>
+        </p:spPr>
+        <p:style>
+          <a:lnRef idx="2">
+            <a:schemeClr val="accent1"/>
+          </a:lnRef>
+          <a:fillRef idx="0">
+            <a:schemeClr val="accent1"/>
+          </a:fillRef>
+          <a:effectRef idx="1">
+            <a:schemeClr val="accent1"/>
+          </a:effectRef>
+          <a:fontRef idx="minor">
+            <a:schemeClr val="tx1"/>
+          </a:fontRef>
+        </p:style>
+        <p:txBody>
+          <a:bodyPr rtlCol="0" anchor="t"/>
+          <a:lstStyle/>
+          <a:p>
+            <a:r>
               <a:rPr lang="en-US" dirty="0" smtClean="0"/>
-              <a:t>HDFS</a:t>
+              <a:t>Worker</a:t>
             </a:r>
             <a:endParaRPr lang="en-US" dirty="0"/>
           </a:p>
         </p:txBody>
       </p:sp>
-      <p:grpSp>
-        <p:nvGrpSpPr>
-          <p:cNvPr id="38" name="Group 37"/>
-          <p:cNvGrpSpPr/>
+      <p:sp>
+        <p:nvSpPr>
+          <p:cNvPr id="11" name="Rectangle 10"/>
+          <p:cNvSpPr/>
           <p:nvPr/>
-        </p:nvGrpSpPr>
-        <p:grpSpPr>
+        </p:nvSpPr>
+        <p:spPr>
           <a:xfrm>
-            <a:off x="4080498" y="532945"/>
-            <a:ext cx="2916671" cy="1027375"/>
-            <a:chOff x="4080498" y="532945"/>
-            <a:chExt cx="2916671" cy="1027375"/>
+            <a:off x="3790956" y="929798"/>
+            <a:ext cx="2469762" cy="365601"/>
           </a:xfrm>
-        </p:grpSpPr>
-        <p:sp>
-          <p:nvSpPr>
-            <p:cNvPr id="36" name="Rectangle 35"/>
-            <p:cNvSpPr/>
-            <p:nvPr/>
-          </p:nvSpPr>
-          <p:spPr>
-            <a:xfrm>
-              <a:off x="4080498" y="532945"/>
-              <a:ext cx="2916671" cy="1027375"/>
-            </a:xfrm>
-            <a:prstGeom prst="rect">
-              <a:avLst/>
-            </a:prstGeom>
+          <a:prstGeom prst="rect">
+            <a:avLst/>
+          </a:prstGeom>
+          <a:solidFill>
+            <a:srgbClr val="00B601"/>
+          </a:solidFill>
+          <a:ln>
             <a:solidFill>
-              <a:srgbClr val="EEECE1"/>
+              <a:schemeClr val="tx1"/>
             </a:solidFill>
-            <a:ln>
+            <a:tailEnd type="none"/>
+          </a:ln>
+          <a:effectLst/>
+        </p:spPr>
+        <p:style>
+          <a:lnRef idx="2">
+            <a:schemeClr val="accent1"/>
+          </a:lnRef>
+          <a:fillRef idx="0">
+            <a:schemeClr val="accent1"/>
+          </a:fillRef>
+          <a:effectRef idx="1">
+            <a:schemeClr val="accent1"/>
+          </a:effectRef>
+          <a:fontRef idx="minor">
+            <a:schemeClr val="tx1"/>
+          </a:fontRef>
+        </p:style>
+        <p:txBody>
+          <a:bodyPr rtlCol="0" anchor="b"/>
+          <a:lstStyle/>
+          <a:p>
+            <a:pPr algn="ctr"/>
+            <a:r>
+              <a:rPr lang="en-US" dirty="0">
+                <a:solidFill>
+                  <a:schemeClr val="tx1"/>
+                </a:solidFill>
+              </a:rPr>
+              <a:t>Spark Runtime</a:t>
+            </a:r>
+          </a:p>
+        </p:txBody>
+      </p:sp>
+      <p:sp>
+        <p:nvSpPr>
+          <p:cNvPr id="12" name="Rectangle 11"/>
+          <p:cNvSpPr/>
+          <p:nvPr/>
+        </p:nvSpPr>
+        <p:spPr>
+          <a:xfrm>
+            <a:off x="3790956" y="1339703"/>
+            <a:ext cx="2469762" cy="365601"/>
+          </a:xfrm>
+          <a:prstGeom prst="rect">
+            <a:avLst/>
+          </a:prstGeom>
+          <a:solidFill>
+            <a:srgbClr val="00B601"/>
+          </a:solidFill>
+          <a:ln>
+            <a:solidFill>
+              <a:schemeClr val="tx1"/>
+            </a:solidFill>
+            <a:tailEnd type="none"/>
+          </a:ln>
+          <a:effectLst/>
+        </p:spPr>
+        <p:style>
+          <a:lnRef idx="2">
+            <a:schemeClr val="accent1"/>
+          </a:lnRef>
+          <a:fillRef idx="0">
+            <a:schemeClr val="accent1"/>
+          </a:fillRef>
+          <a:effectRef idx="1">
+            <a:schemeClr val="accent1"/>
+          </a:effectRef>
+          <a:fontRef idx="minor">
+            <a:schemeClr val="tx1"/>
+          </a:fontRef>
+        </p:style>
+        <p:txBody>
+          <a:bodyPr rtlCol="0" anchor="b"/>
+          <a:lstStyle/>
+          <a:p>
+            <a:pPr algn="ctr"/>
+            <a:r>
+              <a:rPr lang="en-US" dirty="0" smtClean="0">
+                <a:solidFill>
+                  <a:schemeClr val="tx1"/>
+                </a:solidFill>
+              </a:rPr>
+              <a:t>HDFS</a:t>
+            </a:r>
+            <a:endParaRPr lang="en-US" dirty="0">
               <a:solidFill>
                 <a:schemeClr val="tx1"/>
               </a:solidFill>
-              <a:tailEnd type="none"/>
-            </a:ln>
-            <a:effectLst/>
-          </p:spPr>
-          <p:style>
-            <a:lnRef idx="2">
-              <a:schemeClr val="accent1"/>
-            </a:lnRef>
-            <a:fillRef idx="0">
-              <a:schemeClr val="accent1"/>
-            </a:fillRef>
-            <a:effectRef idx="1">
-              <a:schemeClr val="accent1"/>
-            </a:effectRef>
-            <a:fontRef idx="minor">
+            </a:endParaRPr>
+          </a:p>
+        </p:txBody>
+      </p:sp>
+      <p:sp>
+        <p:nvSpPr>
+          <p:cNvPr id="13" name="Rectangle 12"/>
+          <p:cNvSpPr/>
+          <p:nvPr/>
+        </p:nvSpPr>
+        <p:spPr>
+          <a:xfrm>
+            <a:off x="3716250" y="1938003"/>
+            <a:ext cx="2630256" cy="1288991"/>
+          </a:xfrm>
+          <a:prstGeom prst="rect">
+            <a:avLst/>
+          </a:prstGeom>
+          <a:solidFill>
+            <a:schemeClr val="bg2"/>
+          </a:solidFill>
+          <a:ln>
+            <a:solidFill>
               <a:schemeClr val="tx1"/>
-            </a:fontRef>
-          </p:style>
-          <p:txBody>
-            <a:bodyPr rtlCol="0" anchor="t"/>
-            <a:lstStyle/>
-            <a:p>
-              <a:r>
-                <a:rPr lang="en-US" dirty="0" smtClean="0"/>
-                <a:t>Spark Worker</a:t>
-              </a:r>
-              <a:endParaRPr lang="en-US" dirty="0"/>
-            </a:p>
-          </p:txBody>
-        </p:sp>
-        <p:sp>
-          <p:nvSpPr>
-            <p:cNvPr id="37" name="Rectangle 36"/>
-            <p:cNvSpPr/>
-            <p:nvPr/>
-          </p:nvSpPr>
-          <p:spPr>
-            <a:xfrm>
-              <a:off x="4280920" y="957128"/>
-              <a:ext cx="2469762" cy="430345"/>
-            </a:xfrm>
-            <a:prstGeom prst="rect">
-              <a:avLst/>
-            </a:prstGeom>
-            <a:gradFill flip="none" rotWithShape="1">
-              <a:gsLst>
-                <a:gs pos="0">
-                  <a:srgbClr val="00B601"/>
-                </a:gs>
-                <a:gs pos="100000">
-                  <a:srgbClr val="FFFFFF"/>
-                </a:gs>
-              </a:gsLst>
-              <a:lin ang="16200000" scaled="0"/>
-              <a:tileRect/>
-            </a:gradFill>
-          </p:spPr>
-          <p:style>
-            <a:lnRef idx="1">
-              <a:schemeClr val="accent1"/>
-            </a:lnRef>
-            <a:fillRef idx="3">
-              <a:schemeClr val="accent1"/>
-            </a:fillRef>
-            <a:effectRef idx="2">
-              <a:schemeClr val="accent1"/>
-            </a:effectRef>
-            <a:fontRef idx="minor">
-              <a:schemeClr val="lt1"/>
-            </a:fontRef>
-          </p:style>
-          <p:txBody>
-            <a:bodyPr rtlCol="0" anchor="ctr"/>
-            <a:lstStyle/>
-            <a:p>
-              <a:pPr algn="ctr"/>
-              <a:r>
-                <a:rPr lang="en-US" dirty="0" smtClean="0">
-                  <a:solidFill>
-                    <a:schemeClr val="tx1"/>
-                  </a:solidFill>
-                </a:rPr>
-                <a:t>Spark Runtime</a:t>
-              </a:r>
-              <a:endParaRPr lang="en-US" dirty="0">
+            </a:solidFill>
+            <a:tailEnd type="none"/>
+          </a:ln>
+          <a:effectLst/>
+        </p:spPr>
+        <p:style>
+          <a:lnRef idx="2">
+            <a:schemeClr val="accent1"/>
+          </a:lnRef>
+          <a:fillRef idx="0">
+            <a:schemeClr val="accent1"/>
+          </a:fillRef>
+          <a:effectRef idx="1">
+            <a:schemeClr val="accent1"/>
+          </a:effectRef>
+          <a:fontRef idx="minor">
+            <a:schemeClr val="tx1"/>
+          </a:fontRef>
+        </p:style>
+        <p:txBody>
+          <a:bodyPr rtlCol="0" anchor="t"/>
+          <a:lstStyle/>
+          <a:p>
+            <a:r>
+              <a:rPr lang="en-US" dirty="0" smtClean="0"/>
+              <a:t>Worker</a:t>
+            </a:r>
+            <a:endParaRPr lang="en-US" dirty="0"/>
+          </a:p>
+        </p:txBody>
+      </p:sp>
+      <p:sp>
+        <p:nvSpPr>
+          <p:cNvPr id="14" name="Rectangle 13"/>
+          <p:cNvSpPr/>
+          <p:nvPr/>
+        </p:nvSpPr>
+        <p:spPr>
+          <a:xfrm>
+            <a:off x="3793946" y="2307360"/>
+            <a:ext cx="2469762" cy="365601"/>
+          </a:xfrm>
+          <a:prstGeom prst="rect">
+            <a:avLst/>
+          </a:prstGeom>
+          <a:solidFill>
+            <a:srgbClr val="00B601"/>
+          </a:solidFill>
+          <a:ln>
+            <a:solidFill>
+              <a:schemeClr val="tx1"/>
+            </a:solidFill>
+            <a:tailEnd type="none"/>
+          </a:ln>
+          <a:effectLst/>
+        </p:spPr>
+        <p:style>
+          <a:lnRef idx="2">
+            <a:schemeClr val="accent1"/>
+          </a:lnRef>
+          <a:fillRef idx="0">
+            <a:schemeClr val="accent1"/>
+          </a:fillRef>
+          <a:effectRef idx="1">
+            <a:schemeClr val="accent1"/>
+          </a:effectRef>
+          <a:fontRef idx="minor">
+            <a:schemeClr val="tx1"/>
+          </a:fontRef>
+        </p:style>
+        <p:txBody>
+          <a:bodyPr rtlCol="0" anchor="b"/>
+          <a:lstStyle/>
+          <a:p>
+            <a:pPr algn="ctr"/>
+            <a:r>
+              <a:rPr lang="en-US" dirty="0">
                 <a:solidFill>
                   <a:schemeClr val="tx1"/>
                 </a:solidFill>
-              </a:endParaRPr>
-            </a:p>
-          </p:txBody>
-        </p:sp>
-      </p:grpSp>
-      <p:grpSp>
-        <p:nvGrpSpPr>
-          <p:cNvPr id="39" name="Group 38"/>
-          <p:cNvGrpSpPr/>
+              </a:rPr>
+              <a:t>Spark Runtime</a:t>
+            </a:r>
+          </a:p>
+        </p:txBody>
+      </p:sp>
+      <p:sp>
+        <p:nvSpPr>
+          <p:cNvPr id="17" name="Rectangle 16"/>
+          <p:cNvSpPr/>
           <p:nvPr/>
-        </p:nvGrpSpPr>
-        <p:grpSpPr>
+        </p:nvSpPr>
+        <p:spPr>
           <a:xfrm>
-            <a:off x="4091769" y="1693482"/>
-            <a:ext cx="2916671" cy="1027375"/>
-            <a:chOff x="4080498" y="532945"/>
-            <a:chExt cx="2916671" cy="1027375"/>
+            <a:off x="3793946" y="2717265"/>
+            <a:ext cx="2469762" cy="365601"/>
           </a:xfrm>
-        </p:grpSpPr>
-        <p:sp>
-          <p:nvSpPr>
-            <p:cNvPr id="40" name="Rectangle 39"/>
-            <p:cNvSpPr/>
-            <p:nvPr/>
-          </p:nvSpPr>
-          <p:spPr>
-            <a:xfrm>
-              <a:off x="4080498" y="532945"/>
-              <a:ext cx="2916671" cy="1027375"/>
-            </a:xfrm>
-            <a:prstGeom prst="rect">
-              <a:avLst/>
-            </a:prstGeom>
+          <a:prstGeom prst="rect">
+            <a:avLst/>
+          </a:prstGeom>
+          <a:solidFill>
+            <a:srgbClr val="00B601"/>
+          </a:solidFill>
+          <a:ln>
             <a:solidFill>
-              <a:srgbClr val="EEECE1"/>
+              <a:schemeClr val="tx1"/>
             </a:solidFill>
-            <a:ln>
+            <a:tailEnd type="none"/>
+          </a:ln>
+          <a:effectLst/>
+        </p:spPr>
+        <p:style>
+          <a:lnRef idx="2">
+            <a:schemeClr val="accent1"/>
+          </a:lnRef>
+          <a:fillRef idx="0">
+            <a:schemeClr val="accent1"/>
+          </a:fillRef>
+          <a:effectRef idx="1">
+            <a:schemeClr val="accent1"/>
+          </a:effectRef>
+          <a:fontRef idx="minor">
+            <a:schemeClr val="tx1"/>
+          </a:fontRef>
+        </p:style>
+        <p:txBody>
+          <a:bodyPr rtlCol="0" anchor="b"/>
+          <a:lstStyle/>
+          <a:p>
+            <a:pPr algn="ctr"/>
+            <a:r>
+              <a:rPr lang="en-US" dirty="0" smtClean="0">
+                <a:solidFill>
+                  <a:schemeClr val="tx1"/>
+                </a:solidFill>
+              </a:rPr>
+              <a:t>HDFS</a:t>
+            </a:r>
+            <a:endParaRPr lang="en-US" dirty="0">
               <a:solidFill>
                 <a:schemeClr val="tx1"/>
               </a:solidFill>
-              <a:tailEnd type="none"/>
-            </a:ln>
-            <a:effectLst/>
-          </p:spPr>
-          <p:style>
-            <a:lnRef idx="2">
-              <a:schemeClr val="accent1"/>
-            </a:lnRef>
-            <a:fillRef idx="0">
-              <a:schemeClr val="accent1"/>
-            </a:fillRef>
-            <a:effectRef idx="1">
-              <a:schemeClr val="accent1"/>
-            </a:effectRef>
-            <a:fontRef idx="minor">
-              <a:schemeClr val="tx1"/>
-            </a:fontRef>
-          </p:style>
-          <p:txBody>
-            <a:bodyPr rtlCol="0" anchor="t"/>
-            <a:lstStyle/>
-            <a:p>
-              <a:r>
-                <a:rPr lang="en-US" dirty="0" smtClean="0"/>
-                <a:t>Spark Worker</a:t>
-              </a:r>
-              <a:endParaRPr lang="en-US" dirty="0"/>
-            </a:p>
-          </p:txBody>
-        </p:sp>
-        <p:sp>
-          <p:nvSpPr>
-            <p:cNvPr id="41" name="Rectangle 40"/>
-            <p:cNvSpPr/>
-            <p:nvPr/>
-          </p:nvSpPr>
-          <p:spPr>
-            <a:xfrm>
-              <a:off x="4280920" y="957128"/>
-              <a:ext cx="2469762" cy="430345"/>
-            </a:xfrm>
-            <a:prstGeom prst="rect">
-              <a:avLst/>
-            </a:prstGeom>
-            <a:gradFill flip="none" rotWithShape="1">
-              <a:gsLst>
-                <a:gs pos="0">
-                  <a:srgbClr val="00B601"/>
-                </a:gs>
-                <a:gs pos="100000">
-                  <a:srgbClr val="FFFFFF"/>
-                </a:gs>
-              </a:gsLst>
-              <a:lin ang="16200000" scaled="0"/>
-              <a:tileRect/>
-            </a:gradFill>
-          </p:spPr>
-          <p:style>
-            <a:lnRef idx="1">
-              <a:schemeClr val="accent1"/>
-            </a:lnRef>
-            <a:fillRef idx="3">
-              <a:schemeClr val="accent1"/>
-            </a:fillRef>
-            <a:effectRef idx="2">
-              <a:schemeClr val="accent1"/>
-            </a:effectRef>
-            <a:fontRef idx="minor">
-              <a:schemeClr val="lt1"/>
-            </a:fontRef>
-          </p:style>
-          <p:txBody>
-            <a:bodyPr rtlCol="0" anchor="ctr"/>
-            <a:lstStyle/>
-            <a:p>
-              <a:pPr algn="ctr"/>
-              <a:r>
-                <a:rPr lang="en-US" dirty="0" smtClean="0">
-                  <a:solidFill>
-                    <a:schemeClr val="tx1"/>
-                  </a:solidFill>
-                </a:rPr>
-                <a:t>Spark Runtime</a:t>
-              </a:r>
-              <a:endParaRPr lang="en-US" dirty="0">
-                <a:solidFill>
-                  <a:schemeClr val="tx1"/>
-                </a:solidFill>
-              </a:endParaRPr>
-            </a:p>
-          </p:txBody>
-        </p:sp>
-      </p:grpSp>
+            </a:endParaRPr>
+          </a:p>
+        </p:txBody>
+      </p:sp>
       <p:sp>
         <p:nvSpPr>
-          <p:cNvPr id="42" name="TextBox 41"/>
+          <p:cNvPr id="3" name="TextBox 2"/>
           <p:cNvSpPr txBox="1"/>
           <p:nvPr/>
         </p:nvSpPr>
         <p:spPr>
           <a:xfrm>
-            <a:off x="5372104" y="2720857"/>
-            <a:ext cx="432580" cy="523220"/>
+            <a:off x="4721412" y="3107766"/>
+            <a:ext cx="467997" cy="584776"/>
           </a:xfrm>
           <a:prstGeom prst="rect">
             <a:avLst/>
@@ -26826,10 +26972,10 @@
           <a:lstStyle/>
           <a:p>
             <a:r>
-              <a:rPr lang="en-US" sz="2800" dirty="0" smtClean="0"/>
+              <a:rPr lang="en-US" sz="3200" dirty="0" smtClean="0"/>
               <a:t>…</a:t>
             </a:r>
-            <a:endParaRPr lang="en-US" sz="2800" dirty="0"/>
+            <a:endParaRPr lang="en-US" sz="3200" dirty="0"/>
           </a:p>
         </p:txBody>
       </p:sp>

</xml_diff>

<commit_message>
3VE figure for T1
</commit_message>
<xml_diff>
--- a/paper/sigmod2016/figs/figures.pptx
+++ b/paper/sigmod2016/figs/figures.pptx
@@ -8,12 +8,13 @@
     <p:sldId id="256" r:id="rId2"/>
     <p:sldId id="258" r:id="rId3"/>
     <p:sldId id="257" r:id="rId4"/>
-    <p:sldId id="259" r:id="rId5"/>
-    <p:sldId id="260" r:id="rId6"/>
-    <p:sldId id="261" r:id="rId7"/>
-    <p:sldId id="262" r:id="rId8"/>
-    <p:sldId id="263" r:id="rId9"/>
-    <p:sldId id="264" r:id="rId10"/>
+    <p:sldId id="265" r:id="rId5"/>
+    <p:sldId id="259" r:id="rId6"/>
+    <p:sldId id="260" r:id="rId7"/>
+    <p:sldId id="261" r:id="rId8"/>
+    <p:sldId id="262" r:id="rId9"/>
+    <p:sldId id="263" r:id="rId10"/>
+    <p:sldId id="264" r:id="rId11"/>
   </p:sldIdLst>
   <p:sldSz cx="9144000" cy="6858000" type="screen4x3"/>
   <p:notesSz cx="6858000" cy="9144000"/>
@@ -296,7 +297,7 @@
           <a:p>
             <a:fld id="{2A3C5F88-9950-2441-8A51-A5268CD91903}" type="datetimeFigureOut">
               <a:rPr lang="en-US" smtClean="0"/>
-              <a:t>11/11/15</a:t>
+              <a:t>11/12/15</a:t>
             </a:fld>
             <a:endParaRPr lang="en-US"/>
           </a:p>
@@ -466,7 +467,7 @@
           <a:p>
             <a:fld id="{2A3C5F88-9950-2441-8A51-A5268CD91903}" type="datetimeFigureOut">
               <a:rPr lang="en-US" smtClean="0"/>
-              <a:t>11/11/15</a:t>
+              <a:t>11/12/15</a:t>
             </a:fld>
             <a:endParaRPr lang="en-US"/>
           </a:p>
@@ -646,7 +647,7 @@
           <a:p>
             <a:fld id="{2A3C5F88-9950-2441-8A51-A5268CD91903}" type="datetimeFigureOut">
               <a:rPr lang="en-US" smtClean="0"/>
-              <a:t>11/11/15</a:t>
+              <a:t>11/12/15</a:t>
             </a:fld>
             <a:endParaRPr lang="en-US"/>
           </a:p>
@@ -816,7 +817,7 @@
           <a:p>
             <a:fld id="{2A3C5F88-9950-2441-8A51-A5268CD91903}" type="datetimeFigureOut">
               <a:rPr lang="en-US" smtClean="0"/>
-              <a:t>11/11/15</a:t>
+              <a:t>11/12/15</a:t>
             </a:fld>
             <a:endParaRPr lang="en-US"/>
           </a:p>
@@ -1062,7 +1063,7 @@
           <a:p>
             <a:fld id="{2A3C5F88-9950-2441-8A51-A5268CD91903}" type="datetimeFigureOut">
               <a:rPr lang="en-US" smtClean="0"/>
-              <a:t>11/11/15</a:t>
+              <a:t>11/12/15</a:t>
             </a:fld>
             <a:endParaRPr lang="en-US"/>
           </a:p>
@@ -1350,7 +1351,7 @@
           <a:p>
             <a:fld id="{2A3C5F88-9950-2441-8A51-A5268CD91903}" type="datetimeFigureOut">
               <a:rPr lang="en-US" smtClean="0"/>
-              <a:t>11/11/15</a:t>
+              <a:t>11/12/15</a:t>
             </a:fld>
             <a:endParaRPr lang="en-US"/>
           </a:p>
@@ -1772,7 +1773,7 @@
           <a:p>
             <a:fld id="{2A3C5F88-9950-2441-8A51-A5268CD91903}" type="datetimeFigureOut">
               <a:rPr lang="en-US" smtClean="0"/>
-              <a:t>11/11/15</a:t>
+              <a:t>11/12/15</a:t>
             </a:fld>
             <a:endParaRPr lang="en-US"/>
           </a:p>
@@ -1890,7 +1891,7 @@
           <a:p>
             <a:fld id="{2A3C5F88-9950-2441-8A51-A5268CD91903}" type="datetimeFigureOut">
               <a:rPr lang="en-US" smtClean="0"/>
-              <a:t>11/11/15</a:t>
+              <a:t>11/12/15</a:t>
             </a:fld>
             <a:endParaRPr lang="en-US"/>
           </a:p>
@@ -1985,7 +1986,7 @@
           <a:p>
             <a:fld id="{2A3C5F88-9950-2441-8A51-A5268CD91903}" type="datetimeFigureOut">
               <a:rPr lang="en-US" smtClean="0"/>
-              <a:t>11/11/15</a:t>
+              <a:t>11/12/15</a:t>
             </a:fld>
             <a:endParaRPr lang="en-US"/>
           </a:p>
@@ -2262,7 +2263,7 @@
           <a:p>
             <a:fld id="{2A3C5F88-9950-2441-8A51-A5268CD91903}" type="datetimeFigureOut">
               <a:rPr lang="en-US" smtClean="0"/>
-              <a:t>11/11/15</a:t>
+              <a:t>11/12/15</a:t>
             </a:fld>
             <a:endParaRPr lang="en-US"/>
           </a:p>
@@ -2515,7 +2516,7 @@
           <a:p>
             <a:fld id="{2A3C5F88-9950-2441-8A51-A5268CD91903}" type="datetimeFigureOut">
               <a:rPr lang="en-US" smtClean="0"/>
-              <a:t>11/11/15</a:t>
+              <a:t>11/12/15</a:t>
             </a:fld>
             <a:endParaRPr lang="en-US"/>
           </a:p>
@@ -2728,7 +2729,7 @@
           <a:p>
             <a:fld id="{2A3C5F88-9950-2441-8A51-A5268CD91903}" type="datetimeFigureOut">
               <a:rPr lang="en-US" smtClean="0"/>
-              <a:t>11/11/15</a:t>
+              <a:t>11/12/15</a:t>
             </a:fld>
             <a:endParaRPr lang="en-US"/>
           </a:p>
@@ -7153,6 +7154,808 @@
   </p:cSld>
   <p:clrMapOvr>
     <a:masterClrMapping/>
+  </p:clrMapOvr>
+</p:sld>
+</file>
+
+<file path=ppt/slides/slide10.xml><?xml version="1.0" encoding="utf-8"?>
+<p:sld xmlns:a="http://schemas.openxmlformats.org/drawingml/2006/main" xmlns:r="http://schemas.openxmlformats.org/officeDocument/2006/relationships" xmlns:p="http://schemas.openxmlformats.org/presentationml/2006/main">
+  <p:cSld>
+    <p:bg>
+      <p:bgRef idx="1001">
+        <a:schemeClr val="bg1"/>
+      </p:bgRef>
+    </p:bg>
+    <p:spTree>
+      <p:nvGrpSpPr>
+        <p:cNvPr id="1" name=""/>
+        <p:cNvGrpSpPr/>
+        <p:nvPr/>
+      </p:nvGrpSpPr>
+      <p:grpSpPr>
+        <a:xfrm>
+          <a:off x="0" y="0"/>
+          <a:ext cx="0" cy="0"/>
+          <a:chOff x="0" y="0"/>
+          <a:chExt cx="0" cy="0"/>
+        </a:xfrm>
+      </p:grpSpPr>
+      <p:sp>
+        <p:nvSpPr>
+          <p:cNvPr id="2" name="Rectangle 1"/>
+          <p:cNvSpPr/>
+          <p:nvPr/>
+        </p:nvSpPr>
+        <p:spPr>
+          <a:xfrm>
+            <a:off x="651944" y="560442"/>
+            <a:ext cx="2769586" cy="3115087"/>
+          </a:xfrm>
+          <a:prstGeom prst="rect">
+            <a:avLst/>
+          </a:prstGeom>
+          <a:solidFill>
+            <a:schemeClr val="bg2"/>
+          </a:solidFill>
+          <a:ln>
+            <a:solidFill>
+              <a:schemeClr val="tx1"/>
+            </a:solidFill>
+            <a:tailEnd type="none"/>
+          </a:ln>
+          <a:effectLst/>
+        </p:spPr>
+        <p:style>
+          <a:lnRef idx="2">
+            <a:schemeClr val="accent1"/>
+          </a:lnRef>
+          <a:fillRef idx="0">
+            <a:schemeClr val="accent1"/>
+          </a:fillRef>
+          <a:effectRef idx="1">
+            <a:schemeClr val="accent1"/>
+          </a:effectRef>
+          <a:fontRef idx="minor">
+            <a:schemeClr val="tx1"/>
+          </a:fontRef>
+        </p:style>
+        <p:txBody>
+          <a:bodyPr rtlCol="0" anchor="t"/>
+          <a:lstStyle/>
+          <a:p>
+            <a:r>
+              <a:rPr lang="en-US" dirty="0" smtClean="0"/>
+              <a:t>Portal</a:t>
+            </a:r>
+            <a:endParaRPr lang="en-US" dirty="0"/>
+          </a:p>
+        </p:txBody>
+      </p:sp>
+      <p:sp>
+        <p:nvSpPr>
+          <p:cNvPr id="31" name="Rectangle 30"/>
+          <p:cNvSpPr/>
+          <p:nvPr/>
+        </p:nvSpPr>
+        <p:spPr>
+          <a:xfrm>
+            <a:off x="799733" y="989562"/>
+            <a:ext cx="2469762" cy="399967"/>
+          </a:xfrm>
+          <a:prstGeom prst="rect">
+            <a:avLst/>
+          </a:prstGeom>
+          <a:ln>
+            <a:prstDash val="solid"/>
+          </a:ln>
+        </p:spPr>
+        <p:style>
+          <a:lnRef idx="1">
+            <a:schemeClr val="accent1"/>
+          </a:lnRef>
+          <a:fillRef idx="3">
+            <a:schemeClr val="accent1"/>
+          </a:fillRef>
+          <a:effectRef idx="2">
+            <a:schemeClr val="accent1"/>
+          </a:effectRef>
+          <a:fontRef idx="minor">
+            <a:schemeClr val="lt1"/>
+          </a:fontRef>
+        </p:style>
+        <p:txBody>
+          <a:bodyPr rtlCol="0" anchor="ctr"/>
+          <a:lstStyle/>
+          <a:p>
+            <a:pPr algn="ctr"/>
+            <a:r>
+              <a:rPr lang="en-US" dirty="0" smtClean="0">
+                <a:solidFill>
+                  <a:schemeClr val="tx1"/>
+                </a:solidFill>
+              </a:rPr>
+              <a:t>Interactive Shell</a:t>
+            </a:r>
+            <a:endParaRPr lang="en-US" dirty="0">
+              <a:solidFill>
+                <a:schemeClr val="tx1"/>
+              </a:solidFill>
+            </a:endParaRPr>
+          </a:p>
+        </p:txBody>
+      </p:sp>
+      <p:sp>
+        <p:nvSpPr>
+          <p:cNvPr id="32" name="Rectangle 31"/>
+          <p:cNvSpPr/>
+          <p:nvPr/>
+        </p:nvSpPr>
+        <p:spPr>
+          <a:xfrm>
+            <a:off x="799733" y="1425852"/>
+            <a:ext cx="2469762" cy="396972"/>
+          </a:xfrm>
+          <a:prstGeom prst="rect">
+            <a:avLst/>
+          </a:prstGeom>
+        </p:spPr>
+        <p:style>
+          <a:lnRef idx="1">
+            <a:schemeClr val="accent1"/>
+          </a:lnRef>
+          <a:fillRef idx="3">
+            <a:schemeClr val="accent1"/>
+          </a:fillRef>
+          <a:effectRef idx="2">
+            <a:schemeClr val="accent1"/>
+          </a:effectRef>
+          <a:fontRef idx="minor">
+            <a:schemeClr val="lt1"/>
+          </a:fontRef>
+        </p:style>
+        <p:txBody>
+          <a:bodyPr rtlCol="0" anchor="ctr"/>
+          <a:lstStyle/>
+          <a:p>
+            <a:pPr algn="ctr"/>
+            <a:r>
+              <a:rPr lang="en-US" dirty="0" smtClean="0">
+                <a:solidFill>
+                  <a:schemeClr val="tx1"/>
+                </a:solidFill>
+              </a:rPr>
+              <a:t>Query Parser</a:t>
+            </a:r>
+            <a:endParaRPr lang="en-US" dirty="0">
+              <a:solidFill>
+                <a:schemeClr val="tx1"/>
+              </a:solidFill>
+            </a:endParaRPr>
+          </a:p>
+        </p:txBody>
+      </p:sp>
+      <p:sp>
+        <p:nvSpPr>
+          <p:cNvPr id="33" name="Rectangle 32"/>
+          <p:cNvSpPr/>
+          <p:nvPr/>
+        </p:nvSpPr>
+        <p:spPr>
+          <a:xfrm>
+            <a:off x="799733" y="1849433"/>
+            <a:ext cx="2469762" cy="600635"/>
+          </a:xfrm>
+          <a:prstGeom prst="rect">
+            <a:avLst/>
+          </a:prstGeom>
+          <a:ln>
+            <a:solidFill>
+              <a:srgbClr val="4F81BD"/>
+            </a:solidFill>
+            <a:prstDash val="solid"/>
+          </a:ln>
+        </p:spPr>
+        <p:style>
+          <a:lnRef idx="1">
+            <a:schemeClr val="accent1"/>
+          </a:lnRef>
+          <a:fillRef idx="3">
+            <a:schemeClr val="accent1"/>
+          </a:fillRef>
+          <a:effectRef idx="2">
+            <a:schemeClr val="accent1"/>
+          </a:effectRef>
+          <a:fontRef idx="minor">
+            <a:schemeClr val="lt1"/>
+          </a:fontRef>
+        </p:style>
+        <p:txBody>
+          <a:bodyPr rtlCol="0" anchor="ctr"/>
+          <a:lstStyle/>
+          <a:p>
+            <a:pPr algn="ctr"/>
+            <a:r>
+              <a:rPr lang="en-US" dirty="0" smtClean="0">
+                <a:solidFill>
+                  <a:schemeClr val="tx1"/>
+                </a:solidFill>
+              </a:rPr>
+              <a:t>Portal Runtime (</a:t>
+            </a:r>
+            <a:r>
+              <a:rPr lang="en-US" sz="1600" dirty="0" smtClean="0">
+                <a:solidFill>
+                  <a:schemeClr val="tx1"/>
+                </a:solidFill>
+              </a:rPr>
+              <a:t>optimizer, operators, </a:t>
+            </a:r>
+            <a:r>
+              <a:rPr lang="en-US" sz="1600" dirty="0" err="1" smtClean="0">
+                <a:solidFill>
+                  <a:schemeClr val="tx1"/>
+                </a:solidFill>
+              </a:rPr>
+              <a:t>etc</a:t>
+            </a:r>
+            <a:r>
+              <a:rPr lang="en-US" sz="1600" dirty="0" smtClean="0">
+                <a:solidFill>
+                  <a:schemeClr val="tx1"/>
+                </a:solidFill>
+              </a:rPr>
+              <a:t>)</a:t>
+            </a:r>
+            <a:endParaRPr lang="en-US" sz="1600" dirty="0">
+              <a:solidFill>
+                <a:schemeClr val="tx1"/>
+              </a:solidFill>
+            </a:endParaRPr>
+          </a:p>
+        </p:txBody>
+      </p:sp>
+      <p:sp>
+        <p:nvSpPr>
+          <p:cNvPr id="34" name="Rectangle 33"/>
+          <p:cNvSpPr/>
+          <p:nvPr/>
+        </p:nvSpPr>
+        <p:spPr>
+          <a:xfrm>
+            <a:off x="799733" y="2525058"/>
+            <a:ext cx="2469762" cy="1075765"/>
+          </a:xfrm>
+          <a:prstGeom prst="rect">
+            <a:avLst/>
+          </a:prstGeom>
+          <a:solidFill>
+            <a:srgbClr val="00B601"/>
+          </a:solidFill>
+          <a:ln>
+            <a:solidFill>
+              <a:schemeClr val="tx1"/>
+            </a:solidFill>
+            <a:tailEnd type="none"/>
+          </a:ln>
+          <a:effectLst/>
+        </p:spPr>
+        <p:style>
+          <a:lnRef idx="2">
+            <a:schemeClr val="accent1"/>
+          </a:lnRef>
+          <a:fillRef idx="0">
+            <a:schemeClr val="accent1"/>
+          </a:fillRef>
+          <a:effectRef idx="1">
+            <a:schemeClr val="accent1"/>
+          </a:effectRef>
+          <a:fontRef idx="minor">
+            <a:schemeClr val="tx1"/>
+          </a:fontRef>
+        </p:style>
+        <p:txBody>
+          <a:bodyPr rtlCol="0" anchor="b"/>
+          <a:lstStyle/>
+          <a:p>
+            <a:pPr algn="ctr"/>
+            <a:r>
+              <a:rPr lang="en-US" dirty="0">
+                <a:solidFill>
+                  <a:schemeClr val="tx1"/>
+                </a:solidFill>
+              </a:rPr>
+              <a:t>Spark Runtime</a:t>
+            </a:r>
+          </a:p>
+        </p:txBody>
+      </p:sp>
+      <p:sp>
+        <p:nvSpPr>
+          <p:cNvPr id="16" name="Rectangle 15"/>
+          <p:cNvSpPr/>
+          <p:nvPr/>
+        </p:nvSpPr>
+        <p:spPr>
+          <a:xfrm>
+            <a:off x="802723" y="2528048"/>
+            <a:ext cx="1707394" cy="729128"/>
+          </a:xfrm>
+          <a:prstGeom prst="rect">
+            <a:avLst/>
+          </a:prstGeom>
+          <a:solidFill>
+            <a:srgbClr val="00B601"/>
+          </a:solidFill>
+          <a:ln>
+            <a:solidFill>
+              <a:schemeClr val="tx1"/>
+            </a:solidFill>
+            <a:tailEnd type="none"/>
+          </a:ln>
+          <a:effectLst/>
+        </p:spPr>
+        <p:style>
+          <a:lnRef idx="2">
+            <a:schemeClr val="accent1"/>
+          </a:lnRef>
+          <a:fillRef idx="0">
+            <a:schemeClr val="accent1"/>
+          </a:fillRef>
+          <a:effectRef idx="1">
+            <a:schemeClr val="accent1"/>
+          </a:effectRef>
+          <a:fontRef idx="minor">
+            <a:schemeClr val="tx1"/>
+          </a:fontRef>
+        </p:style>
+        <p:txBody>
+          <a:bodyPr rtlCol="0" anchor="b"/>
+          <a:lstStyle/>
+          <a:p>
+            <a:pPr algn="ctr"/>
+            <a:r>
+              <a:rPr lang="en-US" dirty="0" err="1" smtClean="0">
+                <a:solidFill>
+                  <a:schemeClr val="tx1"/>
+                </a:solidFill>
+              </a:rPr>
+              <a:t>GraphX</a:t>
+            </a:r>
+            <a:endParaRPr lang="en-US" dirty="0">
+              <a:solidFill>
+                <a:schemeClr val="tx1"/>
+              </a:solidFill>
+            </a:endParaRPr>
+          </a:p>
+        </p:txBody>
+      </p:sp>
+      <p:sp>
+        <p:nvSpPr>
+          <p:cNvPr id="15" name="Rectangle 14"/>
+          <p:cNvSpPr/>
+          <p:nvPr/>
+        </p:nvSpPr>
+        <p:spPr>
+          <a:xfrm>
+            <a:off x="1023849" y="2539715"/>
+            <a:ext cx="1904620" cy="314050"/>
+          </a:xfrm>
+          <a:prstGeom prst="rect">
+            <a:avLst/>
+          </a:prstGeom>
+          <a:ln>
+            <a:solidFill>
+              <a:srgbClr val="4F81BD"/>
+            </a:solidFill>
+            <a:prstDash val="solid"/>
+          </a:ln>
+        </p:spPr>
+        <p:style>
+          <a:lnRef idx="1">
+            <a:schemeClr val="accent1"/>
+          </a:lnRef>
+          <a:fillRef idx="3">
+            <a:schemeClr val="accent1"/>
+          </a:fillRef>
+          <a:effectRef idx="2">
+            <a:schemeClr val="accent1"/>
+          </a:effectRef>
+          <a:fontRef idx="minor">
+            <a:schemeClr val="lt1"/>
+          </a:fontRef>
+        </p:style>
+        <p:txBody>
+          <a:bodyPr rtlCol="0" anchor="ctr"/>
+          <a:lstStyle/>
+          <a:p>
+            <a:pPr algn="ctr"/>
+            <a:r>
+              <a:rPr lang="en-US" sz="1600" dirty="0" smtClean="0">
+                <a:solidFill>
+                  <a:schemeClr val="tx1"/>
+                </a:solidFill>
+              </a:rPr>
+              <a:t>Data Structures</a:t>
+            </a:r>
+            <a:endParaRPr lang="en-US" sz="1600" dirty="0">
+              <a:solidFill>
+                <a:schemeClr val="tx1"/>
+              </a:solidFill>
+            </a:endParaRPr>
+          </a:p>
+        </p:txBody>
+      </p:sp>
+      <p:sp>
+        <p:nvSpPr>
+          <p:cNvPr id="10" name="Rectangle 9"/>
+          <p:cNvSpPr/>
+          <p:nvPr/>
+        </p:nvSpPr>
+        <p:spPr>
+          <a:xfrm>
+            <a:off x="3716250" y="560441"/>
+            <a:ext cx="2627265" cy="1288991"/>
+          </a:xfrm>
+          <a:prstGeom prst="rect">
+            <a:avLst/>
+          </a:prstGeom>
+          <a:solidFill>
+            <a:schemeClr val="bg2"/>
+          </a:solidFill>
+          <a:ln>
+            <a:solidFill>
+              <a:schemeClr val="tx1"/>
+            </a:solidFill>
+            <a:tailEnd type="none"/>
+          </a:ln>
+          <a:effectLst/>
+        </p:spPr>
+        <p:style>
+          <a:lnRef idx="2">
+            <a:schemeClr val="accent1"/>
+          </a:lnRef>
+          <a:fillRef idx="0">
+            <a:schemeClr val="accent1"/>
+          </a:fillRef>
+          <a:effectRef idx="1">
+            <a:schemeClr val="accent1"/>
+          </a:effectRef>
+          <a:fontRef idx="minor">
+            <a:schemeClr val="tx1"/>
+          </a:fontRef>
+        </p:style>
+        <p:txBody>
+          <a:bodyPr rtlCol="0" anchor="t"/>
+          <a:lstStyle/>
+          <a:p>
+            <a:r>
+              <a:rPr lang="en-US" dirty="0" smtClean="0"/>
+              <a:t>Worker</a:t>
+            </a:r>
+            <a:endParaRPr lang="en-US" dirty="0"/>
+          </a:p>
+        </p:txBody>
+      </p:sp>
+      <p:sp>
+        <p:nvSpPr>
+          <p:cNvPr id="11" name="Rectangle 10"/>
+          <p:cNvSpPr/>
+          <p:nvPr/>
+        </p:nvSpPr>
+        <p:spPr>
+          <a:xfrm>
+            <a:off x="3790956" y="929798"/>
+            <a:ext cx="2469762" cy="365601"/>
+          </a:xfrm>
+          <a:prstGeom prst="rect">
+            <a:avLst/>
+          </a:prstGeom>
+          <a:solidFill>
+            <a:srgbClr val="00B601"/>
+          </a:solidFill>
+          <a:ln>
+            <a:solidFill>
+              <a:schemeClr val="tx1"/>
+            </a:solidFill>
+            <a:tailEnd type="none"/>
+          </a:ln>
+          <a:effectLst/>
+        </p:spPr>
+        <p:style>
+          <a:lnRef idx="2">
+            <a:schemeClr val="accent1"/>
+          </a:lnRef>
+          <a:fillRef idx="0">
+            <a:schemeClr val="accent1"/>
+          </a:fillRef>
+          <a:effectRef idx="1">
+            <a:schemeClr val="accent1"/>
+          </a:effectRef>
+          <a:fontRef idx="minor">
+            <a:schemeClr val="tx1"/>
+          </a:fontRef>
+        </p:style>
+        <p:txBody>
+          <a:bodyPr rtlCol="0" anchor="b"/>
+          <a:lstStyle/>
+          <a:p>
+            <a:pPr algn="ctr"/>
+            <a:r>
+              <a:rPr lang="en-US" dirty="0">
+                <a:solidFill>
+                  <a:schemeClr val="tx1"/>
+                </a:solidFill>
+              </a:rPr>
+              <a:t>Spark Runtime</a:t>
+            </a:r>
+          </a:p>
+        </p:txBody>
+      </p:sp>
+      <p:sp>
+        <p:nvSpPr>
+          <p:cNvPr id="12" name="Rectangle 11"/>
+          <p:cNvSpPr/>
+          <p:nvPr/>
+        </p:nvSpPr>
+        <p:spPr>
+          <a:xfrm>
+            <a:off x="3790956" y="1339703"/>
+            <a:ext cx="2469762" cy="365601"/>
+          </a:xfrm>
+          <a:prstGeom prst="rect">
+            <a:avLst/>
+          </a:prstGeom>
+          <a:solidFill>
+            <a:srgbClr val="00B601"/>
+          </a:solidFill>
+          <a:ln>
+            <a:solidFill>
+              <a:schemeClr val="tx1"/>
+            </a:solidFill>
+            <a:tailEnd type="none"/>
+          </a:ln>
+          <a:effectLst/>
+        </p:spPr>
+        <p:style>
+          <a:lnRef idx="2">
+            <a:schemeClr val="accent1"/>
+          </a:lnRef>
+          <a:fillRef idx="0">
+            <a:schemeClr val="accent1"/>
+          </a:fillRef>
+          <a:effectRef idx="1">
+            <a:schemeClr val="accent1"/>
+          </a:effectRef>
+          <a:fontRef idx="minor">
+            <a:schemeClr val="tx1"/>
+          </a:fontRef>
+        </p:style>
+        <p:txBody>
+          <a:bodyPr rtlCol="0" anchor="b"/>
+          <a:lstStyle/>
+          <a:p>
+            <a:pPr algn="ctr"/>
+            <a:r>
+              <a:rPr lang="en-US" dirty="0" smtClean="0">
+                <a:solidFill>
+                  <a:schemeClr val="tx1"/>
+                </a:solidFill>
+              </a:rPr>
+              <a:t>HDFS</a:t>
+            </a:r>
+            <a:endParaRPr lang="en-US" dirty="0">
+              <a:solidFill>
+                <a:schemeClr val="tx1"/>
+              </a:solidFill>
+            </a:endParaRPr>
+          </a:p>
+        </p:txBody>
+      </p:sp>
+      <p:sp>
+        <p:nvSpPr>
+          <p:cNvPr id="13" name="Rectangle 12"/>
+          <p:cNvSpPr/>
+          <p:nvPr/>
+        </p:nvSpPr>
+        <p:spPr>
+          <a:xfrm>
+            <a:off x="3716250" y="1938003"/>
+            <a:ext cx="2630256" cy="1288991"/>
+          </a:xfrm>
+          <a:prstGeom prst="rect">
+            <a:avLst/>
+          </a:prstGeom>
+          <a:solidFill>
+            <a:schemeClr val="bg2"/>
+          </a:solidFill>
+          <a:ln>
+            <a:solidFill>
+              <a:schemeClr val="tx1"/>
+            </a:solidFill>
+            <a:tailEnd type="none"/>
+          </a:ln>
+          <a:effectLst/>
+        </p:spPr>
+        <p:style>
+          <a:lnRef idx="2">
+            <a:schemeClr val="accent1"/>
+          </a:lnRef>
+          <a:fillRef idx="0">
+            <a:schemeClr val="accent1"/>
+          </a:fillRef>
+          <a:effectRef idx="1">
+            <a:schemeClr val="accent1"/>
+          </a:effectRef>
+          <a:fontRef idx="minor">
+            <a:schemeClr val="tx1"/>
+          </a:fontRef>
+        </p:style>
+        <p:txBody>
+          <a:bodyPr rtlCol="0" anchor="t"/>
+          <a:lstStyle/>
+          <a:p>
+            <a:r>
+              <a:rPr lang="en-US" dirty="0" smtClean="0"/>
+              <a:t>Worker</a:t>
+            </a:r>
+            <a:endParaRPr lang="en-US" dirty="0"/>
+          </a:p>
+        </p:txBody>
+      </p:sp>
+      <p:sp>
+        <p:nvSpPr>
+          <p:cNvPr id="14" name="Rectangle 13"/>
+          <p:cNvSpPr/>
+          <p:nvPr/>
+        </p:nvSpPr>
+        <p:spPr>
+          <a:xfrm>
+            <a:off x="3793946" y="2307360"/>
+            <a:ext cx="2469762" cy="365601"/>
+          </a:xfrm>
+          <a:prstGeom prst="rect">
+            <a:avLst/>
+          </a:prstGeom>
+          <a:solidFill>
+            <a:srgbClr val="00B601"/>
+          </a:solidFill>
+          <a:ln>
+            <a:solidFill>
+              <a:schemeClr val="tx1"/>
+            </a:solidFill>
+            <a:tailEnd type="none"/>
+          </a:ln>
+          <a:effectLst/>
+        </p:spPr>
+        <p:style>
+          <a:lnRef idx="2">
+            <a:schemeClr val="accent1"/>
+          </a:lnRef>
+          <a:fillRef idx="0">
+            <a:schemeClr val="accent1"/>
+          </a:fillRef>
+          <a:effectRef idx="1">
+            <a:schemeClr val="accent1"/>
+          </a:effectRef>
+          <a:fontRef idx="minor">
+            <a:schemeClr val="tx1"/>
+          </a:fontRef>
+        </p:style>
+        <p:txBody>
+          <a:bodyPr rtlCol="0" anchor="b"/>
+          <a:lstStyle/>
+          <a:p>
+            <a:pPr algn="ctr"/>
+            <a:r>
+              <a:rPr lang="en-US" dirty="0">
+                <a:solidFill>
+                  <a:schemeClr val="tx1"/>
+                </a:solidFill>
+              </a:rPr>
+              <a:t>Spark Runtime</a:t>
+            </a:r>
+          </a:p>
+        </p:txBody>
+      </p:sp>
+      <p:sp>
+        <p:nvSpPr>
+          <p:cNvPr id="17" name="Rectangle 16"/>
+          <p:cNvSpPr/>
+          <p:nvPr/>
+        </p:nvSpPr>
+        <p:spPr>
+          <a:xfrm>
+            <a:off x="3793946" y="2717265"/>
+            <a:ext cx="2469762" cy="365601"/>
+          </a:xfrm>
+          <a:prstGeom prst="rect">
+            <a:avLst/>
+          </a:prstGeom>
+          <a:solidFill>
+            <a:srgbClr val="00B601"/>
+          </a:solidFill>
+          <a:ln>
+            <a:solidFill>
+              <a:schemeClr val="tx1"/>
+            </a:solidFill>
+            <a:tailEnd type="none"/>
+          </a:ln>
+          <a:effectLst/>
+        </p:spPr>
+        <p:style>
+          <a:lnRef idx="2">
+            <a:schemeClr val="accent1"/>
+          </a:lnRef>
+          <a:fillRef idx="0">
+            <a:schemeClr val="accent1"/>
+          </a:fillRef>
+          <a:effectRef idx="1">
+            <a:schemeClr val="accent1"/>
+          </a:effectRef>
+          <a:fontRef idx="minor">
+            <a:schemeClr val="tx1"/>
+          </a:fontRef>
+        </p:style>
+        <p:txBody>
+          <a:bodyPr rtlCol="0" anchor="b"/>
+          <a:lstStyle/>
+          <a:p>
+            <a:pPr algn="ctr"/>
+            <a:r>
+              <a:rPr lang="en-US" dirty="0" smtClean="0">
+                <a:solidFill>
+                  <a:schemeClr val="tx1"/>
+                </a:solidFill>
+              </a:rPr>
+              <a:t>HDFS</a:t>
+            </a:r>
+            <a:endParaRPr lang="en-US" dirty="0">
+              <a:solidFill>
+                <a:schemeClr val="tx1"/>
+              </a:solidFill>
+            </a:endParaRPr>
+          </a:p>
+        </p:txBody>
+      </p:sp>
+      <p:sp>
+        <p:nvSpPr>
+          <p:cNvPr id="3" name="TextBox 2"/>
+          <p:cNvSpPr txBox="1"/>
+          <p:nvPr/>
+        </p:nvSpPr>
+        <p:spPr>
+          <a:xfrm>
+            <a:off x="4721412" y="3107766"/>
+            <a:ext cx="467997" cy="584776"/>
+          </a:xfrm>
+          <a:prstGeom prst="rect">
+            <a:avLst/>
+          </a:prstGeom>
+          <a:noFill/>
+        </p:spPr>
+        <p:txBody>
+          <a:bodyPr wrap="none" rtlCol="0">
+            <a:spAutoFit/>
+          </a:bodyPr>
+          <a:lstStyle/>
+          <a:p>
+            <a:r>
+              <a:rPr lang="en-US" sz="3200" dirty="0" smtClean="0"/>
+              <a:t>…</a:t>
+            </a:r>
+            <a:endParaRPr lang="en-US" sz="3200" dirty="0"/>
+          </a:p>
+        </p:txBody>
+      </p:sp>
+    </p:spTree>
+    <p:extLst>
+      <p:ext uri="{BB962C8B-B14F-4D97-AF65-F5344CB8AC3E}">
+        <p14:creationId xmlns:p14="http://schemas.microsoft.com/office/powerpoint/2010/main" val="4239985456"/>
+      </p:ext>
+    </p:extLst>
+  </p:cSld>
+  <p:clrMapOvr>
+    <a:overrideClrMapping bg1="lt1" tx1="dk1" bg2="lt2" tx2="dk2" accent1="accent1" accent2="accent2" accent3="accent3" accent4="accent4" accent5="accent5" accent6="accent6" hlink="hlink" folHlink="folHlink"/>
   </p:clrMapOvr>
 </p:sld>
 </file>
@@ -13191,6 +13994,2897 @@
           <a:chExt cx="0" cy="0"/>
         </a:xfrm>
       </p:grpSpPr>
+      <p:cxnSp>
+        <p:nvCxnSpPr>
+          <p:cNvPr id="136" name="Straight Connector 135"/>
+          <p:cNvCxnSpPr/>
+          <p:nvPr/>
+        </p:nvCxnSpPr>
+        <p:spPr>
+          <a:xfrm>
+            <a:off x="2404534" y="177800"/>
+            <a:ext cx="0" cy="4308809"/>
+          </a:xfrm>
+          <a:prstGeom prst="line">
+            <a:avLst/>
+          </a:prstGeom>
+          <a:ln>
+            <a:solidFill>
+              <a:schemeClr val="tx1"/>
+            </a:solidFill>
+            <a:prstDash val="dash"/>
+          </a:ln>
+          <a:effectLst/>
+        </p:spPr>
+        <p:style>
+          <a:lnRef idx="2">
+            <a:schemeClr val="accent1"/>
+          </a:lnRef>
+          <a:fillRef idx="0">
+            <a:schemeClr val="accent1"/>
+          </a:fillRef>
+          <a:effectRef idx="1">
+            <a:schemeClr val="accent1"/>
+          </a:effectRef>
+          <a:fontRef idx="minor">
+            <a:schemeClr val="tx1"/>
+          </a:fontRef>
+        </p:style>
+      </p:cxnSp>
+      <p:sp>
+        <p:nvSpPr>
+          <p:cNvPr id="76" name="TextBox 75"/>
+          <p:cNvSpPr txBox="1"/>
+          <p:nvPr/>
+        </p:nvSpPr>
+        <p:spPr>
+          <a:xfrm>
+            <a:off x="427157" y="27453"/>
+            <a:ext cx="1371176" cy="369332"/>
+          </a:xfrm>
+          <a:prstGeom prst="rect">
+            <a:avLst/>
+          </a:prstGeom>
+          <a:noFill/>
+        </p:spPr>
+        <p:txBody>
+          <a:bodyPr wrap="none" rtlCol="0">
+            <a:spAutoFit/>
+          </a:bodyPr>
+          <a:lstStyle/>
+          <a:p>
+            <a:r>
+              <a:rPr lang="en-US" dirty="0" smtClean="0"/>
+              <a:t>[2010, 2011)</a:t>
+            </a:r>
+            <a:endParaRPr lang="en-US" dirty="0"/>
+          </a:p>
+        </p:txBody>
+      </p:sp>
+      <p:graphicFrame>
+        <p:nvGraphicFramePr>
+          <p:cNvPr id="2" name="Table 1"/>
+          <p:cNvGraphicFramePr>
+            <a:graphicFrameLocks noGrp="1"/>
+          </p:cNvGraphicFramePr>
+          <p:nvPr>
+            <p:extLst>
+              <p:ext uri="{D42A27DB-BD31-4B8C-83A1-F6EECF244321}">
+                <p14:modId xmlns:p14="http://schemas.microsoft.com/office/powerpoint/2010/main" val="2994523907"/>
+              </p:ext>
+            </p:extLst>
+          </p:nvPr>
+        </p:nvGraphicFramePr>
+        <p:xfrm>
+          <a:off x="411857" y="399986"/>
+          <a:ext cx="1776371" cy="1693335"/>
+        </p:xfrm>
+        <a:graphic>
+          <a:graphicData uri="http://schemas.openxmlformats.org/drawingml/2006/table">
+            <a:tbl>
+              <a:tblPr firstRow="1" bandRow="1">
+                <a:tableStyleId>{5940675A-B579-460E-94D1-54222C63F5DA}</a:tableStyleId>
+              </a:tblPr>
+              <a:tblGrid>
+                <a:gridCol w="430171"/>
+                <a:gridCol w="702733"/>
+                <a:gridCol w="643467"/>
+              </a:tblGrid>
+              <a:tr h="338667">
+                <a:tc>
+                  <a:txBody>
+                    <a:bodyPr/>
+                    <a:lstStyle/>
+                    <a:p>
+                      <a:pPr algn="ctr"/>
+                      <a:r>
+                        <a:rPr lang="en-US" sz="1400" b="1" u="none" dirty="0" smtClean="0"/>
+                        <a:t>vid</a:t>
+                      </a:r>
+                      <a:endParaRPr lang="en-US" sz="1400" b="1" u="none" dirty="0"/>
+                    </a:p>
+                  </a:txBody>
+                  <a:tcPr>
+                    <a:lnB w="12700" cap="flat" cmpd="sng" algn="ctr">
+                      <a:solidFill>
+                        <a:scrgbClr r="0" g="0" b="0"/>
+                      </a:solidFill>
+                      <a:prstDash val="solid"/>
+                      <a:round/>
+                      <a:headEnd type="none" w="med" len="med"/>
+                      <a:tailEnd type="none" w="med" len="med"/>
+                    </a:lnB>
+                    <a:solidFill>
+                      <a:schemeClr val="bg1">
+                        <a:lumMod val="85000"/>
+                      </a:schemeClr>
+                    </a:solidFill>
+                  </a:tcPr>
+                </a:tc>
+                <a:tc>
+                  <a:txBody>
+                    <a:bodyPr/>
+                    <a:lstStyle/>
+                    <a:p>
+                      <a:pPr algn="ctr"/>
+                      <a:r>
+                        <a:rPr lang="en-US" sz="1400" b="1" dirty="0" smtClean="0"/>
+                        <a:t>name</a:t>
+                      </a:r>
+                      <a:endParaRPr lang="en-US" sz="1400" b="1" dirty="0"/>
+                    </a:p>
+                  </a:txBody>
+                  <a:tcPr>
+                    <a:lnB w="12700" cap="flat" cmpd="sng" algn="ctr">
+                      <a:solidFill>
+                        <a:scrgbClr r="0" g="0" b="0"/>
+                      </a:solidFill>
+                      <a:prstDash val="solid"/>
+                      <a:round/>
+                      <a:headEnd type="none" w="med" len="med"/>
+                      <a:tailEnd type="none" w="med" len="med"/>
+                    </a:lnB>
+                    <a:solidFill>
+                      <a:schemeClr val="bg1">
+                        <a:lumMod val="85000"/>
+                      </a:schemeClr>
+                    </a:solidFill>
+                  </a:tcPr>
+                </a:tc>
+                <a:tc>
+                  <a:txBody>
+                    <a:bodyPr/>
+                    <a:lstStyle/>
+                    <a:p>
+                      <a:pPr algn="ctr"/>
+                      <a:r>
+                        <a:rPr lang="en-US" sz="1400" b="1" dirty="0" smtClean="0"/>
+                        <a:t>salary</a:t>
+                      </a:r>
+                      <a:endParaRPr lang="en-US" sz="1400" b="1" dirty="0"/>
+                    </a:p>
+                  </a:txBody>
+                  <a:tcPr>
+                    <a:lnB w="12700" cap="flat" cmpd="sng" algn="ctr">
+                      <a:solidFill>
+                        <a:scrgbClr r="0" g="0" b="0"/>
+                      </a:solidFill>
+                      <a:prstDash val="solid"/>
+                      <a:round/>
+                      <a:headEnd type="none" w="med" len="med"/>
+                      <a:tailEnd type="none" w="med" len="med"/>
+                    </a:lnB>
+                    <a:solidFill>
+                      <a:schemeClr val="bg1">
+                        <a:lumMod val="85000"/>
+                      </a:schemeClr>
+                    </a:solidFill>
+                  </a:tcPr>
+                </a:tc>
+              </a:tr>
+              <a:tr h="338667">
+                <a:tc>
+                  <a:txBody>
+                    <a:bodyPr/>
+                    <a:lstStyle/>
+                    <a:p>
+                      <a:pPr algn="r"/>
+                      <a:r>
+                        <a:rPr lang="en-US" sz="1400" dirty="0" smtClean="0"/>
+                        <a:t>1</a:t>
+                      </a:r>
+                      <a:endParaRPr lang="en-US" sz="1400" dirty="0"/>
+                    </a:p>
+                  </a:txBody>
+                  <a:tcPr>
+                    <a:lnT w="12700" cap="flat" cmpd="sng" algn="ctr">
+                      <a:solidFill>
+                        <a:scrgbClr r="0" g="0" b="0"/>
+                      </a:solidFill>
+                      <a:prstDash val="solid"/>
+                      <a:round/>
+                      <a:headEnd type="none" w="med" len="med"/>
+                      <a:tailEnd type="none" w="med" len="med"/>
+                    </a:lnT>
+                  </a:tcPr>
+                </a:tc>
+                <a:tc>
+                  <a:txBody>
+                    <a:bodyPr/>
+                    <a:lstStyle/>
+                    <a:p>
+                      <a:pPr algn="ctr"/>
+                      <a:r>
+                        <a:rPr lang="en-US" sz="1400" dirty="0" smtClean="0"/>
+                        <a:t>Alice</a:t>
+                      </a:r>
+                      <a:endParaRPr lang="en-US" sz="1400" dirty="0"/>
+                    </a:p>
+                  </a:txBody>
+                  <a:tcPr>
+                    <a:lnT w="12700" cap="flat" cmpd="sng" algn="ctr">
+                      <a:solidFill>
+                        <a:scrgbClr r="0" g="0" b="0"/>
+                      </a:solidFill>
+                      <a:prstDash val="solid"/>
+                      <a:round/>
+                      <a:headEnd type="none" w="med" len="med"/>
+                      <a:tailEnd type="none" w="med" len="med"/>
+                    </a:lnT>
+                  </a:tcPr>
+                </a:tc>
+                <a:tc>
+                  <a:txBody>
+                    <a:bodyPr/>
+                    <a:lstStyle/>
+                    <a:p>
+                      <a:pPr algn="r"/>
+                      <a:r>
+                        <a:rPr lang="en-US" sz="1400" dirty="0" smtClean="0"/>
+                        <a:t>$150K</a:t>
+                      </a:r>
+                      <a:endParaRPr lang="en-US" sz="1400" dirty="0"/>
+                    </a:p>
+                  </a:txBody>
+                  <a:tcPr>
+                    <a:lnT w="12700" cap="flat" cmpd="sng" algn="ctr">
+                      <a:solidFill>
+                        <a:scrgbClr r="0" g="0" b="0"/>
+                      </a:solidFill>
+                      <a:prstDash val="solid"/>
+                      <a:round/>
+                      <a:headEnd type="none" w="med" len="med"/>
+                      <a:tailEnd type="none" w="med" len="med"/>
+                    </a:lnT>
+                  </a:tcPr>
+                </a:tc>
+              </a:tr>
+              <a:tr h="338667">
+                <a:tc>
+                  <a:txBody>
+                    <a:bodyPr/>
+                    <a:lstStyle/>
+                    <a:p>
+                      <a:pPr algn="r"/>
+                      <a:r>
+                        <a:rPr lang="en-US" sz="1400" dirty="0" smtClean="0"/>
+                        <a:t>2</a:t>
+                      </a:r>
+                      <a:endParaRPr lang="en-US" sz="1400" dirty="0"/>
+                    </a:p>
+                  </a:txBody>
+                  <a:tcPr/>
+                </a:tc>
+                <a:tc>
+                  <a:txBody>
+                    <a:bodyPr/>
+                    <a:lstStyle/>
+                    <a:p>
+                      <a:pPr algn="ctr"/>
+                      <a:r>
+                        <a:rPr lang="en-US" sz="1400" dirty="0" smtClean="0"/>
+                        <a:t>Bob</a:t>
+                      </a:r>
+                      <a:endParaRPr lang="en-US" sz="1400" dirty="0"/>
+                    </a:p>
+                  </a:txBody>
+                  <a:tcPr/>
+                </a:tc>
+                <a:tc>
+                  <a:txBody>
+                    <a:bodyPr/>
+                    <a:lstStyle/>
+                    <a:p>
+                      <a:pPr algn="r"/>
+                      <a:r>
+                        <a:rPr lang="en-US" sz="1400" dirty="0" smtClean="0"/>
+                        <a:t>$103K</a:t>
+                      </a:r>
+                      <a:endParaRPr lang="en-US" sz="1400" dirty="0"/>
+                    </a:p>
+                  </a:txBody>
+                  <a:tcPr/>
+                </a:tc>
+              </a:tr>
+              <a:tr h="338667">
+                <a:tc>
+                  <a:txBody>
+                    <a:bodyPr/>
+                    <a:lstStyle/>
+                    <a:p>
+                      <a:pPr algn="r"/>
+                      <a:r>
+                        <a:rPr lang="en-US" sz="1400" dirty="0" smtClean="0"/>
+                        <a:t>3</a:t>
+                      </a:r>
+                      <a:endParaRPr lang="en-US" sz="1400" dirty="0"/>
+                    </a:p>
+                  </a:txBody>
+                  <a:tcPr/>
+                </a:tc>
+                <a:tc>
+                  <a:txBody>
+                    <a:bodyPr/>
+                    <a:lstStyle/>
+                    <a:p>
+                      <a:pPr algn="ctr"/>
+                      <a:r>
+                        <a:rPr lang="en-US" sz="1400" dirty="0" smtClean="0"/>
+                        <a:t>Cathy</a:t>
+                      </a:r>
+                      <a:endParaRPr lang="en-US" sz="1400" dirty="0"/>
+                    </a:p>
+                  </a:txBody>
+                  <a:tcPr/>
+                </a:tc>
+                <a:tc>
+                  <a:txBody>
+                    <a:bodyPr/>
+                    <a:lstStyle/>
+                    <a:p>
+                      <a:pPr algn="r"/>
+                      <a:r>
+                        <a:rPr lang="en-US" sz="1400" dirty="0" smtClean="0"/>
+                        <a:t>$98K</a:t>
+                      </a:r>
+                      <a:endParaRPr lang="en-US" sz="1400" dirty="0"/>
+                    </a:p>
+                  </a:txBody>
+                  <a:tcPr/>
+                </a:tc>
+              </a:tr>
+              <a:tr h="338667">
+                <a:tc>
+                  <a:txBody>
+                    <a:bodyPr/>
+                    <a:lstStyle/>
+                    <a:p>
+                      <a:pPr algn="r"/>
+                      <a:r>
+                        <a:rPr lang="en-US" sz="1400" dirty="0" smtClean="0"/>
+                        <a:t>4</a:t>
+                      </a:r>
+                      <a:endParaRPr lang="en-US" sz="1400" dirty="0"/>
+                    </a:p>
+                  </a:txBody>
+                  <a:tcPr/>
+                </a:tc>
+                <a:tc>
+                  <a:txBody>
+                    <a:bodyPr/>
+                    <a:lstStyle/>
+                    <a:p>
+                      <a:pPr algn="ctr"/>
+                      <a:r>
+                        <a:rPr lang="en-US" sz="1400" dirty="0" smtClean="0"/>
+                        <a:t>Dave</a:t>
+                      </a:r>
+                      <a:endParaRPr lang="en-US" sz="1400" dirty="0"/>
+                    </a:p>
+                  </a:txBody>
+                  <a:tcPr/>
+                </a:tc>
+                <a:tc>
+                  <a:txBody>
+                    <a:bodyPr/>
+                    <a:lstStyle/>
+                    <a:p>
+                      <a:pPr algn="r"/>
+                      <a:r>
+                        <a:rPr lang="en-US" sz="1400" dirty="0" smtClean="0"/>
+                        <a:t>$55K</a:t>
+                      </a:r>
+                      <a:endParaRPr lang="en-US" sz="1400" dirty="0"/>
+                    </a:p>
+                  </a:txBody>
+                  <a:tcPr/>
+                </a:tc>
+              </a:tr>
+            </a:tbl>
+          </a:graphicData>
+        </a:graphic>
+      </p:graphicFrame>
+      <p:graphicFrame>
+        <p:nvGraphicFramePr>
+          <p:cNvPr id="81" name="Table 80"/>
+          <p:cNvGraphicFramePr>
+            <a:graphicFrameLocks noGrp="1"/>
+          </p:cNvGraphicFramePr>
+          <p:nvPr>
+            <p:extLst>
+              <p:ext uri="{D42A27DB-BD31-4B8C-83A1-F6EECF244321}">
+                <p14:modId xmlns:p14="http://schemas.microsoft.com/office/powerpoint/2010/main" val="2281538556"/>
+              </p:ext>
+            </p:extLst>
+          </p:nvPr>
+        </p:nvGraphicFramePr>
+        <p:xfrm>
+          <a:off x="411857" y="2623943"/>
+          <a:ext cx="1432470" cy="1862666"/>
+        </p:xfrm>
+        <a:graphic>
+          <a:graphicData uri="http://schemas.openxmlformats.org/drawingml/2006/table">
+            <a:tbl>
+              <a:tblPr firstRow="1" bandRow="1">
+                <a:tableStyleId>{5940675A-B579-460E-94D1-54222C63F5DA}</a:tableStyleId>
+              </a:tblPr>
+              <a:tblGrid>
+                <a:gridCol w="509603"/>
+                <a:gridCol w="482600"/>
+                <a:gridCol w="440267"/>
+              </a:tblGrid>
+              <a:tr h="338667">
+                <a:tc>
+                  <a:txBody>
+                    <a:bodyPr/>
+                    <a:lstStyle/>
+                    <a:p>
+                      <a:pPr algn="ctr"/>
+                      <a:r>
+                        <a:rPr lang="en-US" sz="1400" b="1" u="none" dirty="0" smtClean="0"/>
+                        <a:t>vid</a:t>
+                      </a:r>
+                      <a:r>
+                        <a:rPr lang="en-US" sz="1400" b="1" u="none" baseline="-25000" dirty="0" smtClean="0"/>
+                        <a:t>1</a:t>
+                      </a:r>
+                      <a:endParaRPr lang="en-US" sz="1400" b="1" u="none" baseline="-25000" dirty="0"/>
+                    </a:p>
+                  </a:txBody>
+                  <a:tcPr>
+                    <a:lnB w="12700" cap="flat" cmpd="sng" algn="ctr">
+                      <a:solidFill>
+                        <a:scrgbClr r="0" g="0" b="0"/>
+                      </a:solidFill>
+                      <a:prstDash val="solid"/>
+                      <a:round/>
+                      <a:headEnd type="none" w="med" len="med"/>
+                      <a:tailEnd type="none" w="med" len="med"/>
+                    </a:lnB>
+                    <a:solidFill>
+                      <a:schemeClr val="bg1">
+                        <a:lumMod val="85000"/>
+                      </a:schemeClr>
+                    </a:solidFill>
+                  </a:tcPr>
+                </a:tc>
+                <a:tc>
+                  <a:txBody>
+                    <a:bodyPr/>
+                    <a:lstStyle/>
+                    <a:p>
+                      <a:pPr algn="ctr"/>
+                      <a:r>
+                        <a:rPr lang="en-US" sz="1400" b="1" u="none" dirty="0" smtClean="0"/>
+                        <a:t>vid</a:t>
+                      </a:r>
+                      <a:r>
+                        <a:rPr lang="en-US" sz="1400" b="1" u="none" baseline="-25000" dirty="0" smtClean="0"/>
+                        <a:t>2</a:t>
+                      </a:r>
+                      <a:endParaRPr lang="en-US" sz="1400" b="1" u="none" baseline="-25000" dirty="0"/>
+                    </a:p>
+                  </a:txBody>
+                  <a:tcPr>
+                    <a:lnB w="12700" cap="flat" cmpd="sng" algn="ctr">
+                      <a:solidFill>
+                        <a:scrgbClr r="0" g="0" b="0"/>
+                      </a:solidFill>
+                      <a:prstDash val="solid"/>
+                      <a:round/>
+                      <a:headEnd type="none" w="med" len="med"/>
+                      <a:tailEnd type="none" w="med" len="med"/>
+                    </a:lnB>
+                    <a:solidFill>
+                      <a:schemeClr val="bg1">
+                        <a:lumMod val="85000"/>
+                      </a:schemeClr>
+                    </a:solidFill>
+                  </a:tcPr>
+                </a:tc>
+                <a:tc>
+                  <a:txBody>
+                    <a:bodyPr/>
+                    <a:lstStyle/>
+                    <a:p>
+                      <a:pPr algn="ctr"/>
+                      <a:r>
+                        <a:rPr lang="en-US" sz="1400" b="1" dirty="0" err="1" smtClean="0"/>
+                        <a:t>cnt</a:t>
+                      </a:r>
+                      <a:endParaRPr lang="en-US" sz="1400" b="1" dirty="0"/>
+                    </a:p>
+                  </a:txBody>
+                  <a:tcPr>
+                    <a:lnB w="12700" cap="flat" cmpd="sng" algn="ctr">
+                      <a:solidFill>
+                        <a:scrgbClr r="0" g="0" b="0"/>
+                      </a:solidFill>
+                      <a:prstDash val="solid"/>
+                      <a:round/>
+                      <a:headEnd type="none" w="med" len="med"/>
+                      <a:tailEnd type="none" w="med" len="med"/>
+                    </a:lnB>
+                    <a:solidFill>
+                      <a:schemeClr val="bg1">
+                        <a:lumMod val="85000"/>
+                      </a:schemeClr>
+                    </a:solidFill>
+                  </a:tcPr>
+                </a:tc>
+              </a:tr>
+              <a:tr h="237089">
+                <a:tc>
+                  <a:txBody>
+                    <a:bodyPr/>
+                    <a:lstStyle/>
+                    <a:p>
+                      <a:pPr algn="r"/>
+                      <a:r>
+                        <a:rPr lang="en-US" sz="1400" dirty="0" smtClean="0"/>
+                        <a:t>1</a:t>
+                      </a:r>
+                      <a:endParaRPr lang="en-US" sz="1400" dirty="0"/>
+                    </a:p>
+                  </a:txBody>
+                  <a:tcPr>
+                    <a:lnT w="12700" cap="flat" cmpd="sng" algn="ctr">
+                      <a:solidFill>
+                        <a:scrgbClr r="0" g="0" b="0"/>
+                      </a:solidFill>
+                      <a:prstDash val="solid"/>
+                      <a:round/>
+                      <a:headEnd type="none" w="med" len="med"/>
+                      <a:tailEnd type="none" w="med" len="med"/>
+                    </a:lnT>
+                  </a:tcPr>
+                </a:tc>
+                <a:tc>
+                  <a:txBody>
+                    <a:bodyPr/>
+                    <a:lstStyle/>
+                    <a:p>
+                      <a:pPr algn="r"/>
+                      <a:r>
+                        <a:rPr lang="en-US" sz="1400" dirty="0" smtClean="0"/>
+                        <a:t>2</a:t>
+                      </a:r>
+                      <a:endParaRPr lang="en-US" sz="1400" dirty="0"/>
+                    </a:p>
+                  </a:txBody>
+                  <a:tcPr>
+                    <a:lnT w="12700" cap="flat" cmpd="sng" algn="ctr">
+                      <a:solidFill>
+                        <a:scrgbClr r="0" g="0" b="0"/>
+                      </a:solidFill>
+                      <a:prstDash val="solid"/>
+                      <a:round/>
+                      <a:headEnd type="none" w="med" len="med"/>
+                      <a:tailEnd type="none" w="med" len="med"/>
+                    </a:lnT>
+                  </a:tcPr>
+                </a:tc>
+                <a:tc>
+                  <a:txBody>
+                    <a:bodyPr/>
+                    <a:lstStyle/>
+                    <a:p>
+                      <a:pPr algn="r"/>
+                      <a:r>
+                        <a:rPr lang="en-US" sz="1400" dirty="0" smtClean="0"/>
+                        <a:t>3</a:t>
+                      </a:r>
+                      <a:endParaRPr lang="en-US" sz="1400" dirty="0"/>
+                    </a:p>
+                  </a:txBody>
+                  <a:tcPr>
+                    <a:lnT w="12700" cap="flat" cmpd="sng" algn="ctr">
+                      <a:solidFill>
+                        <a:scrgbClr r="0" g="0" b="0"/>
+                      </a:solidFill>
+                      <a:prstDash val="solid"/>
+                      <a:round/>
+                      <a:headEnd type="none" w="med" len="med"/>
+                      <a:tailEnd type="none" w="med" len="med"/>
+                    </a:lnT>
+                  </a:tcPr>
+                </a:tc>
+              </a:tr>
+              <a:tr h="237089">
+                <a:tc>
+                  <a:txBody>
+                    <a:bodyPr/>
+                    <a:lstStyle/>
+                    <a:p>
+                      <a:pPr algn="r"/>
+                      <a:r>
+                        <a:rPr lang="en-US" sz="1400" dirty="0" smtClean="0"/>
+                        <a:t>1</a:t>
+                      </a:r>
+                      <a:endParaRPr lang="en-US" sz="1400" dirty="0"/>
+                    </a:p>
+                  </a:txBody>
+                  <a:tcPr/>
+                </a:tc>
+                <a:tc>
+                  <a:txBody>
+                    <a:bodyPr/>
+                    <a:lstStyle/>
+                    <a:p>
+                      <a:pPr algn="r"/>
+                      <a:r>
+                        <a:rPr lang="en-US" sz="1400" dirty="0" smtClean="0"/>
+                        <a:t>3</a:t>
+                      </a:r>
+                      <a:endParaRPr lang="en-US" sz="1400" dirty="0"/>
+                    </a:p>
+                  </a:txBody>
+                  <a:tcPr/>
+                </a:tc>
+                <a:tc>
+                  <a:txBody>
+                    <a:bodyPr/>
+                    <a:lstStyle/>
+                    <a:p>
+                      <a:pPr algn="r"/>
+                      <a:r>
+                        <a:rPr lang="en-US" sz="1400" dirty="0" smtClean="0"/>
+                        <a:t>4</a:t>
+                      </a:r>
+                      <a:endParaRPr lang="en-US" sz="1400" dirty="0"/>
+                    </a:p>
+                  </a:txBody>
+                  <a:tcPr/>
+                </a:tc>
+              </a:tr>
+              <a:tr h="254022">
+                <a:tc>
+                  <a:txBody>
+                    <a:bodyPr/>
+                    <a:lstStyle/>
+                    <a:p>
+                      <a:pPr algn="r"/>
+                      <a:r>
+                        <a:rPr lang="en-US" sz="1400" dirty="0" smtClean="0"/>
+                        <a:t>1</a:t>
+                      </a:r>
+                      <a:endParaRPr lang="en-US" sz="1400" dirty="0"/>
+                    </a:p>
+                  </a:txBody>
+                  <a:tcPr/>
+                </a:tc>
+                <a:tc>
+                  <a:txBody>
+                    <a:bodyPr/>
+                    <a:lstStyle/>
+                    <a:p>
+                      <a:pPr algn="r"/>
+                      <a:r>
+                        <a:rPr lang="en-US" sz="1400" dirty="0" smtClean="0"/>
+                        <a:t>4</a:t>
+                      </a:r>
+                      <a:endParaRPr lang="en-US" sz="1400" dirty="0"/>
+                    </a:p>
+                  </a:txBody>
+                  <a:tcPr/>
+                </a:tc>
+                <a:tc>
+                  <a:txBody>
+                    <a:bodyPr/>
+                    <a:lstStyle/>
+                    <a:p>
+                      <a:pPr algn="r"/>
+                      <a:r>
+                        <a:rPr lang="en-US" sz="1400" dirty="0" smtClean="0"/>
+                        <a:t>1</a:t>
+                      </a:r>
+                      <a:endParaRPr lang="en-US" sz="1400" dirty="0"/>
+                    </a:p>
+                  </a:txBody>
+                  <a:tcPr/>
+                </a:tc>
+              </a:tr>
+              <a:tr h="220155">
+                <a:tc>
+                  <a:txBody>
+                    <a:bodyPr/>
+                    <a:lstStyle/>
+                    <a:p>
+                      <a:pPr algn="r"/>
+                      <a:r>
+                        <a:rPr lang="en-US" sz="1400" dirty="0" smtClean="0"/>
+                        <a:t>2</a:t>
+                      </a:r>
+                      <a:endParaRPr lang="en-US" sz="1400" dirty="0"/>
+                    </a:p>
+                  </a:txBody>
+                  <a:tcPr/>
+                </a:tc>
+                <a:tc>
+                  <a:txBody>
+                    <a:bodyPr/>
+                    <a:lstStyle/>
+                    <a:p>
+                      <a:pPr algn="r"/>
+                      <a:r>
+                        <a:rPr lang="en-US" sz="1400" dirty="0" smtClean="0"/>
+                        <a:t>4</a:t>
+                      </a:r>
+                      <a:endParaRPr lang="en-US" sz="1400" dirty="0"/>
+                    </a:p>
+                  </a:txBody>
+                  <a:tcPr/>
+                </a:tc>
+                <a:tc>
+                  <a:txBody>
+                    <a:bodyPr/>
+                    <a:lstStyle/>
+                    <a:p>
+                      <a:pPr algn="r"/>
+                      <a:r>
+                        <a:rPr lang="en-US" sz="1400" dirty="0" smtClean="0"/>
+                        <a:t>8</a:t>
+                      </a:r>
+                      <a:endParaRPr lang="en-US" sz="1400" dirty="0"/>
+                    </a:p>
+                  </a:txBody>
+                  <a:tcPr/>
+                </a:tc>
+              </a:tr>
+              <a:tr h="254022">
+                <a:tc>
+                  <a:txBody>
+                    <a:bodyPr/>
+                    <a:lstStyle/>
+                    <a:p>
+                      <a:pPr algn="r"/>
+                      <a:r>
+                        <a:rPr lang="en-US" sz="1400" dirty="0" smtClean="0"/>
+                        <a:t>3</a:t>
+                      </a:r>
+                      <a:endParaRPr lang="en-US" sz="1400" dirty="0"/>
+                    </a:p>
+                  </a:txBody>
+                  <a:tcPr/>
+                </a:tc>
+                <a:tc>
+                  <a:txBody>
+                    <a:bodyPr/>
+                    <a:lstStyle/>
+                    <a:p>
+                      <a:pPr algn="r"/>
+                      <a:r>
+                        <a:rPr lang="en-US" sz="1400" dirty="0" smtClean="0"/>
+                        <a:t>4</a:t>
+                      </a:r>
+                      <a:endParaRPr lang="en-US" sz="1400" dirty="0"/>
+                    </a:p>
+                  </a:txBody>
+                  <a:tcPr/>
+                </a:tc>
+                <a:tc>
+                  <a:txBody>
+                    <a:bodyPr/>
+                    <a:lstStyle/>
+                    <a:p>
+                      <a:pPr algn="r"/>
+                      <a:r>
+                        <a:rPr lang="en-US" sz="1400" dirty="0" smtClean="0"/>
+                        <a:t>1</a:t>
+                      </a:r>
+                      <a:endParaRPr lang="en-US" sz="1400" dirty="0"/>
+                    </a:p>
+                  </a:txBody>
+                  <a:tcPr/>
+                </a:tc>
+              </a:tr>
+            </a:tbl>
+          </a:graphicData>
+        </a:graphic>
+      </p:graphicFrame>
+      <p:cxnSp>
+        <p:nvCxnSpPr>
+          <p:cNvPr id="10" name="Straight Connector 9"/>
+          <p:cNvCxnSpPr/>
+          <p:nvPr/>
+        </p:nvCxnSpPr>
+        <p:spPr>
+          <a:xfrm flipV="1">
+            <a:off x="513426" y="2890643"/>
+            <a:ext cx="231599" cy="3"/>
+          </a:xfrm>
+          <a:prstGeom prst="line">
+            <a:avLst/>
+          </a:prstGeom>
+          <a:ln>
+            <a:solidFill>
+              <a:schemeClr val="tx1"/>
+            </a:solidFill>
+          </a:ln>
+          <a:effectLst/>
+        </p:spPr>
+        <p:style>
+          <a:lnRef idx="2">
+            <a:schemeClr val="accent1"/>
+          </a:lnRef>
+          <a:fillRef idx="0">
+            <a:schemeClr val="accent1"/>
+          </a:fillRef>
+          <a:effectRef idx="1">
+            <a:schemeClr val="accent1"/>
+          </a:effectRef>
+          <a:fontRef idx="minor">
+            <a:schemeClr val="tx1"/>
+          </a:fontRef>
+        </p:style>
+      </p:cxnSp>
+      <p:cxnSp>
+        <p:nvCxnSpPr>
+          <p:cNvPr id="43" name="Straight Connector 42"/>
+          <p:cNvCxnSpPr/>
+          <p:nvPr/>
+        </p:nvCxnSpPr>
+        <p:spPr>
+          <a:xfrm flipV="1">
+            <a:off x="1012960" y="2890643"/>
+            <a:ext cx="231599" cy="3"/>
+          </a:xfrm>
+          <a:prstGeom prst="line">
+            <a:avLst/>
+          </a:prstGeom>
+          <a:ln>
+            <a:solidFill>
+              <a:schemeClr val="tx1"/>
+            </a:solidFill>
+          </a:ln>
+          <a:effectLst/>
+        </p:spPr>
+        <p:style>
+          <a:lnRef idx="2">
+            <a:schemeClr val="accent1"/>
+          </a:lnRef>
+          <a:fillRef idx="0">
+            <a:schemeClr val="accent1"/>
+          </a:fillRef>
+          <a:effectRef idx="1">
+            <a:schemeClr val="accent1"/>
+          </a:effectRef>
+          <a:fontRef idx="minor">
+            <a:schemeClr val="tx1"/>
+          </a:fontRef>
+        </p:style>
+      </p:cxnSp>
+      <p:cxnSp>
+        <p:nvCxnSpPr>
+          <p:cNvPr id="44" name="Straight Connector 43"/>
+          <p:cNvCxnSpPr/>
+          <p:nvPr/>
+        </p:nvCxnSpPr>
+        <p:spPr>
+          <a:xfrm flipV="1">
+            <a:off x="514600" y="660385"/>
+            <a:ext cx="231599" cy="3"/>
+          </a:xfrm>
+          <a:prstGeom prst="line">
+            <a:avLst/>
+          </a:prstGeom>
+          <a:ln>
+            <a:solidFill>
+              <a:schemeClr val="tx1"/>
+            </a:solidFill>
+          </a:ln>
+          <a:effectLst/>
+        </p:spPr>
+        <p:style>
+          <a:lnRef idx="2">
+            <a:schemeClr val="accent1"/>
+          </a:lnRef>
+          <a:fillRef idx="0">
+            <a:schemeClr val="accent1"/>
+          </a:fillRef>
+          <a:effectRef idx="1">
+            <a:schemeClr val="accent1"/>
+          </a:effectRef>
+          <a:fontRef idx="minor">
+            <a:schemeClr val="tx1"/>
+          </a:fontRef>
+        </p:style>
+      </p:cxnSp>
+      <p:sp>
+        <p:nvSpPr>
+          <p:cNvPr id="6" name="Rectangle 5"/>
+          <p:cNvSpPr/>
+          <p:nvPr/>
+        </p:nvSpPr>
+        <p:spPr>
+          <a:xfrm>
+            <a:off x="62425" y="305250"/>
+            <a:ext cx="366657" cy="461665"/>
+          </a:xfrm>
+          <a:prstGeom prst="rect">
+            <a:avLst/>
+          </a:prstGeom>
+        </p:spPr>
+        <p:txBody>
+          <a:bodyPr wrap="none">
+            <a:spAutoFit/>
+          </a:bodyPr>
+          <a:lstStyle/>
+          <a:p>
+            <a:r>
+              <a:rPr lang="en-US" sz="2400" b="1" dirty="0" smtClean="0"/>
+              <a:t>V</a:t>
+            </a:r>
+            <a:endParaRPr lang="en-US" sz="2400" b="1" dirty="0"/>
+          </a:p>
+        </p:txBody>
+      </p:sp>
+      <p:sp>
+        <p:nvSpPr>
+          <p:cNvPr id="47" name="Rectangle 46"/>
+          <p:cNvSpPr/>
+          <p:nvPr/>
+        </p:nvSpPr>
+        <p:spPr>
+          <a:xfrm>
+            <a:off x="83557" y="2535043"/>
+            <a:ext cx="334797" cy="461665"/>
+          </a:xfrm>
+          <a:prstGeom prst="rect">
+            <a:avLst/>
+          </a:prstGeom>
+        </p:spPr>
+        <p:txBody>
+          <a:bodyPr wrap="none">
+            <a:spAutoFit/>
+          </a:bodyPr>
+          <a:lstStyle/>
+          <a:p>
+            <a:r>
+              <a:rPr lang="en-US" sz="2400" b="1" dirty="0" smtClean="0"/>
+              <a:t>E</a:t>
+            </a:r>
+            <a:endParaRPr lang="en-US" sz="2400" b="1" dirty="0"/>
+          </a:p>
+        </p:txBody>
+      </p:sp>
+      <p:sp>
+        <p:nvSpPr>
+          <p:cNvPr id="49" name="TextBox 48"/>
+          <p:cNvSpPr txBox="1"/>
+          <p:nvPr/>
+        </p:nvSpPr>
+        <p:spPr>
+          <a:xfrm>
+            <a:off x="2603079" y="27453"/>
+            <a:ext cx="1371176" cy="369332"/>
+          </a:xfrm>
+          <a:prstGeom prst="rect">
+            <a:avLst/>
+          </a:prstGeom>
+          <a:noFill/>
+        </p:spPr>
+        <p:txBody>
+          <a:bodyPr wrap="none" rtlCol="0">
+            <a:spAutoFit/>
+          </a:bodyPr>
+          <a:lstStyle/>
+          <a:p>
+            <a:r>
+              <a:rPr lang="en-US" dirty="0" smtClean="0"/>
+              <a:t>[</a:t>
+            </a:r>
+            <a:r>
+              <a:rPr lang="en-US" dirty="0" smtClean="0"/>
+              <a:t>2011, 2012)</a:t>
+            </a:r>
+            <a:endParaRPr lang="en-US" dirty="0"/>
+          </a:p>
+        </p:txBody>
+      </p:sp>
+      <p:graphicFrame>
+        <p:nvGraphicFramePr>
+          <p:cNvPr id="50" name="Table 49"/>
+          <p:cNvGraphicFramePr>
+            <a:graphicFrameLocks noGrp="1"/>
+          </p:cNvGraphicFramePr>
+          <p:nvPr>
+            <p:extLst>
+              <p:ext uri="{D42A27DB-BD31-4B8C-83A1-F6EECF244321}">
+                <p14:modId xmlns:p14="http://schemas.microsoft.com/office/powerpoint/2010/main" val="489969971"/>
+              </p:ext>
+            </p:extLst>
+          </p:nvPr>
+        </p:nvGraphicFramePr>
+        <p:xfrm>
+          <a:off x="2628078" y="399986"/>
+          <a:ext cx="1776371" cy="2032002"/>
+        </p:xfrm>
+        <a:graphic>
+          <a:graphicData uri="http://schemas.openxmlformats.org/drawingml/2006/table">
+            <a:tbl>
+              <a:tblPr firstRow="1" bandRow="1">
+                <a:tableStyleId>{5940675A-B579-460E-94D1-54222C63F5DA}</a:tableStyleId>
+              </a:tblPr>
+              <a:tblGrid>
+                <a:gridCol w="430171"/>
+                <a:gridCol w="702733"/>
+                <a:gridCol w="643467"/>
+              </a:tblGrid>
+              <a:tr h="338667">
+                <a:tc>
+                  <a:txBody>
+                    <a:bodyPr/>
+                    <a:lstStyle/>
+                    <a:p>
+                      <a:pPr algn="ctr"/>
+                      <a:r>
+                        <a:rPr lang="en-US" sz="1400" b="1" u="none" dirty="0" smtClean="0"/>
+                        <a:t>vid</a:t>
+                      </a:r>
+                      <a:endParaRPr lang="en-US" sz="1400" b="1" u="none" dirty="0"/>
+                    </a:p>
+                  </a:txBody>
+                  <a:tcPr>
+                    <a:lnB w="12700" cap="flat" cmpd="sng" algn="ctr">
+                      <a:solidFill>
+                        <a:scrgbClr r="0" g="0" b="0"/>
+                      </a:solidFill>
+                      <a:prstDash val="solid"/>
+                      <a:round/>
+                      <a:headEnd type="none" w="med" len="med"/>
+                      <a:tailEnd type="none" w="med" len="med"/>
+                    </a:lnB>
+                    <a:solidFill>
+                      <a:schemeClr val="bg1">
+                        <a:lumMod val="85000"/>
+                      </a:schemeClr>
+                    </a:solidFill>
+                  </a:tcPr>
+                </a:tc>
+                <a:tc>
+                  <a:txBody>
+                    <a:bodyPr/>
+                    <a:lstStyle/>
+                    <a:p>
+                      <a:pPr algn="ctr"/>
+                      <a:r>
+                        <a:rPr lang="en-US" sz="1400" b="1" dirty="0" smtClean="0"/>
+                        <a:t>name</a:t>
+                      </a:r>
+                      <a:endParaRPr lang="en-US" sz="1400" b="1" dirty="0"/>
+                    </a:p>
+                  </a:txBody>
+                  <a:tcPr>
+                    <a:lnB w="12700" cap="flat" cmpd="sng" algn="ctr">
+                      <a:solidFill>
+                        <a:scrgbClr r="0" g="0" b="0"/>
+                      </a:solidFill>
+                      <a:prstDash val="solid"/>
+                      <a:round/>
+                      <a:headEnd type="none" w="med" len="med"/>
+                      <a:tailEnd type="none" w="med" len="med"/>
+                    </a:lnB>
+                    <a:solidFill>
+                      <a:schemeClr val="bg1">
+                        <a:lumMod val="85000"/>
+                      </a:schemeClr>
+                    </a:solidFill>
+                  </a:tcPr>
+                </a:tc>
+                <a:tc>
+                  <a:txBody>
+                    <a:bodyPr/>
+                    <a:lstStyle/>
+                    <a:p>
+                      <a:pPr algn="ctr"/>
+                      <a:r>
+                        <a:rPr lang="en-US" sz="1400" b="1" dirty="0" smtClean="0"/>
+                        <a:t>salary</a:t>
+                      </a:r>
+                      <a:endParaRPr lang="en-US" sz="1400" b="1" dirty="0"/>
+                    </a:p>
+                  </a:txBody>
+                  <a:tcPr>
+                    <a:lnB w="12700" cap="flat" cmpd="sng" algn="ctr">
+                      <a:solidFill>
+                        <a:scrgbClr r="0" g="0" b="0"/>
+                      </a:solidFill>
+                      <a:prstDash val="solid"/>
+                      <a:round/>
+                      <a:headEnd type="none" w="med" len="med"/>
+                      <a:tailEnd type="none" w="med" len="med"/>
+                    </a:lnB>
+                    <a:solidFill>
+                      <a:schemeClr val="bg1">
+                        <a:lumMod val="85000"/>
+                      </a:schemeClr>
+                    </a:solidFill>
+                  </a:tcPr>
+                </a:tc>
+              </a:tr>
+              <a:tr h="338667">
+                <a:tc>
+                  <a:txBody>
+                    <a:bodyPr/>
+                    <a:lstStyle/>
+                    <a:p>
+                      <a:pPr algn="r"/>
+                      <a:r>
+                        <a:rPr lang="en-US" sz="1400" dirty="0" smtClean="0"/>
+                        <a:t>1</a:t>
+                      </a:r>
+                      <a:endParaRPr lang="en-US" sz="1400" dirty="0"/>
+                    </a:p>
+                  </a:txBody>
+                  <a:tcPr>
+                    <a:lnT w="12700" cap="flat" cmpd="sng" algn="ctr">
+                      <a:solidFill>
+                        <a:scrgbClr r="0" g="0" b="0"/>
+                      </a:solidFill>
+                      <a:prstDash val="solid"/>
+                      <a:round/>
+                      <a:headEnd type="none" w="med" len="med"/>
+                      <a:tailEnd type="none" w="med" len="med"/>
+                    </a:lnT>
+                  </a:tcPr>
+                </a:tc>
+                <a:tc>
+                  <a:txBody>
+                    <a:bodyPr/>
+                    <a:lstStyle/>
+                    <a:p>
+                      <a:pPr algn="ctr"/>
+                      <a:r>
+                        <a:rPr lang="en-US" sz="1400" dirty="0" smtClean="0"/>
+                        <a:t>Alice</a:t>
+                      </a:r>
+                      <a:endParaRPr lang="en-US" sz="1400" dirty="0"/>
+                    </a:p>
+                  </a:txBody>
+                  <a:tcPr>
+                    <a:lnT w="12700" cap="flat" cmpd="sng" algn="ctr">
+                      <a:solidFill>
+                        <a:scrgbClr r="0" g="0" b="0"/>
+                      </a:solidFill>
+                      <a:prstDash val="solid"/>
+                      <a:round/>
+                      <a:headEnd type="none" w="med" len="med"/>
+                      <a:tailEnd type="none" w="med" len="med"/>
+                    </a:lnT>
+                  </a:tcPr>
+                </a:tc>
+                <a:tc>
+                  <a:txBody>
+                    <a:bodyPr/>
+                    <a:lstStyle/>
+                    <a:p>
+                      <a:pPr algn="r"/>
+                      <a:r>
+                        <a:rPr lang="en-US" sz="1400" dirty="0" smtClean="0"/>
+                        <a:t>$155K</a:t>
+                      </a:r>
+                      <a:endParaRPr lang="en-US" sz="1400" dirty="0"/>
+                    </a:p>
+                  </a:txBody>
+                  <a:tcPr>
+                    <a:lnT w="12700" cap="flat" cmpd="sng" algn="ctr">
+                      <a:solidFill>
+                        <a:scrgbClr r="0" g="0" b="0"/>
+                      </a:solidFill>
+                      <a:prstDash val="solid"/>
+                      <a:round/>
+                      <a:headEnd type="none" w="med" len="med"/>
+                      <a:tailEnd type="none" w="med" len="med"/>
+                    </a:lnT>
+                  </a:tcPr>
+                </a:tc>
+              </a:tr>
+              <a:tr h="338667">
+                <a:tc>
+                  <a:txBody>
+                    <a:bodyPr/>
+                    <a:lstStyle/>
+                    <a:p>
+                      <a:pPr algn="r"/>
+                      <a:r>
+                        <a:rPr lang="en-US" sz="1400" dirty="0" smtClean="0"/>
+                        <a:t>2</a:t>
+                      </a:r>
+                      <a:endParaRPr lang="en-US" sz="1400" dirty="0"/>
+                    </a:p>
+                  </a:txBody>
+                  <a:tcPr/>
+                </a:tc>
+                <a:tc>
+                  <a:txBody>
+                    <a:bodyPr/>
+                    <a:lstStyle/>
+                    <a:p>
+                      <a:pPr algn="ctr"/>
+                      <a:r>
+                        <a:rPr lang="en-US" sz="1400" dirty="0" smtClean="0"/>
+                        <a:t>Bob</a:t>
+                      </a:r>
+                      <a:endParaRPr lang="en-US" sz="1400" dirty="0"/>
+                    </a:p>
+                  </a:txBody>
+                  <a:tcPr/>
+                </a:tc>
+                <a:tc>
+                  <a:txBody>
+                    <a:bodyPr/>
+                    <a:lstStyle/>
+                    <a:p>
+                      <a:pPr algn="r"/>
+                      <a:r>
+                        <a:rPr lang="en-US" sz="1400" dirty="0" smtClean="0"/>
+                        <a:t>$113K</a:t>
+                      </a:r>
+                      <a:endParaRPr lang="en-US" sz="1400" dirty="0"/>
+                    </a:p>
+                  </a:txBody>
+                  <a:tcPr/>
+                </a:tc>
+              </a:tr>
+              <a:tr h="338667">
+                <a:tc>
+                  <a:txBody>
+                    <a:bodyPr/>
+                    <a:lstStyle/>
+                    <a:p>
+                      <a:pPr algn="r"/>
+                      <a:r>
+                        <a:rPr lang="en-US" sz="1400" dirty="0" smtClean="0"/>
+                        <a:t>3</a:t>
+                      </a:r>
+                      <a:endParaRPr lang="en-US" sz="1400" dirty="0"/>
+                    </a:p>
+                  </a:txBody>
+                  <a:tcPr/>
+                </a:tc>
+                <a:tc>
+                  <a:txBody>
+                    <a:bodyPr/>
+                    <a:lstStyle/>
+                    <a:p>
+                      <a:pPr algn="ctr"/>
+                      <a:r>
+                        <a:rPr lang="en-US" sz="1400" dirty="0" smtClean="0"/>
+                        <a:t>Cathy</a:t>
+                      </a:r>
+                      <a:endParaRPr lang="en-US" sz="1400" dirty="0"/>
+                    </a:p>
+                  </a:txBody>
+                  <a:tcPr/>
+                </a:tc>
+                <a:tc>
+                  <a:txBody>
+                    <a:bodyPr/>
+                    <a:lstStyle/>
+                    <a:p>
+                      <a:pPr algn="r"/>
+                      <a:r>
+                        <a:rPr lang="en-US" sz="1400" dirty="0" smtClean="0"/>
+                        <a:t>$105K</a:t>
+                      </a:r>
+                      <a:endParaRPr lang="en-US" sz="1400" dirty="0"/>
+                    </a:p>
+                  </a:txBody>
+                  <a:tcPr/>
+                </a:tc>
+              </a:tr>
+              <a:tr h="338667">
+                <a:tc>
+                  <a:txBody>
+                    <a:bodyPr/>
+                    <a:lstStyle/>
+                    <a:p>
+                      <a:pPr algn="r"/>
+                      <a:r>
+                        <a:rPr lang="en-US" sz="1400" dirty="0" smtClean="0"/>
+                        <a:t>4</a:t>
+                      </a:r>
+                      <a:endParaRPr lang="en-US" sz="1400" dirty="0"/>
+                    </a:p>
+                  </a:txBody>
+                  <a:tcPr/>
+                </a:tc>
+                <a:tc>
+                  <a:txBody>
+                    <a:bodyPr/>
+                    <a:lstStyle/>
+                    <a:p>
+                      <a:pPr algn="ctr"/>
+                      <a:r>
+                        <a:rPr lang="en-US" sz="1400" dirty="0" smtClean="0"/>
+                        <a:t>Dave</a:t>
+                      </a:r>
+                      <a:endParaRPr lang="en-US" sz="1400" dirty="0"/>
+                    </a:p>
+                  </a:txBody>
+                  <a:tcPr/>
+                </a:tc>
+                <a:tc>
+                  <a:txBody>
+                    <a:bodyPr/>
+                    <a:lstStyle/>
+                    <a:p>
+                      <a:pPr algn="r"/>
+                      <a:r>
+                        <a:rPr lang="en-US" sz="1400" dirty="0" smtClean="0"/>
+                        <a:t>$55K</a:t>
+                      </a:r>
+                      <a:endParaRPr lang="en-US" sz="1400" dirty="0"/>
+                    </a:p>
+                  </a:txBody>
+                  <a:tcPr/>
+                </a:tc>
+              </a:tr>
+              <a:tr h="338667">
+                <a:tc>
+                  <a:txBody>
+                    <a:bodyPr/>
+                    <a:lstStyle/>
+                    <a:p>
+                      <a:pPr algn="r"/>
+                      <a:r>
+                        <a:rPr lang="en-US" sz="1400" dirty="0" smtClean="0"/>
+                        <a:t>5</a:t>
+                      </a:r>
+                      <a:endParaRPr lang="en-US" sz="1400" dirty="0"/>
+                    </a:p>
+                  </a:txBody>
+                  <a:tcPr/>
+                </a:tc>
+                <a:tc>
+                  <a:txBody>
+                    <a:bodyPr/>
+                    <a:lstStyle/>
+                    <a:p>
+                      <a:pPr algn="ctr"/>
+                      <a:r>
+                        <a:rPr lang="en-US" sz="1400" dirty="0" smtClean="0"/>
+                        <a:t>Eve</a:t>
+                      </a:r>
+                      <a:endParaRPr lang="en-US" sz="1400" dirty="0"/>
+                    </a:p>
+                  </a:txBody>
+                  <a:tcPr/>
+                </a:tc>
+                <a:tc>
+                  <a:txBody>
+                    <a:bodyPr/>
+                    <a:lstStyle/>
+                    <a:p>
+                      <a:pPr algn="r"/>
+                      <a:r>
+                        <a:rPr lang="en-US" sz="1400" dirty="0" smtClean="0"/>
+                        <a:t>$80K</a:t>
+                      </a:r>
+                      <a:endParaRPr lang="en-US" sz="1400" dirty="0"/>
+                    </a:p>
+                  </a:txBody>
+                  <a:tcPr/>
+                </a:tc>
+              </a:tr>
+            </a:tbl>
+          </a:graphicData>
+        </a:graphic>
+      </p:graphicFrame>
+      <p:graphicFrame>
+        <p:nvGraphicFramePr>
+          <p:cNvPr id="51" name="Table 50"/>
+          <p:cNvGraphicFramePr>
+            <a:graphicFrameLocks noGrp="1"/>
+          </p:cNvGraphicFramePr>
+          <p:nvPr>
+            <p:extLst>
+              <p:ext uri="{D42A27DB-BD31-4B8C-83A1-F6EECF244321}">
+                <p14:modId xmlns:p14="http://schemas.microsoft.com/office/powerpoint/2010/main" val="2708325322"/>
+              </p:ext>
+            </p:extLst>
+          </p:nvPr>
+        </p:nvGraphicFramePr>
+        <p:xfrm>
+          <a:off x="2628078" y="2623943"/>
+          <a:ext cx="1432470" cy="1862666"/>
+        </p:xfrm>
+        <a:graphic>
+          <a:graphicData uri="http://schemas.openxmlformats.org/drawingml/2006/table">
+            <a:tbl>
+              <a:tblPr firstRow="1" bandRow="1">
+                <a:tableStyleId>{5940675A-B579-460E-94D1-54222C63F5DA}</a:tableStyleId>
+              </a:tblPr>
+              <a:tblGrid>
+                <a:gridCol w="509603"/>
+                <a:gridCol w="482600"/>
+                <a:gridCol w="440267"/>
+              </a:tblGrid>
+              <a:tr h="338667">
+                <a:tc>
+                  <a:txBody>
+                    <a:bodyPr/>
+                    <a:lstStyle/>
+                    <a:p>
+                      <a:pPr algn="ctr"/>
+                      <a:r>
+                        <a:rPr lang="en-US" sz="1400" b="1" u="none" dirty="0" smtClean="0"/>
+                        <a:t>vid</a:t>
+                      </a:r>
+                      <a:r>
+                        <a:rPr lang="en-US" sz="1400" b="1" u="none" baseline="-25000" dirty="0" smtClean="0"/>
+                        <a:t>1</a:t>
+                      </a:r>
+                      <a:endParaRPr lang="en-US" sz="1400" b="1" u="none" baseline="-25000" dirty="0"/>
+                    </a:p>
+                  </a:txBody>
+                  <a:tcPr>
+                    <a:lnB w="12700" cap="flat" cmpd="sng" algn="ctr">
+                      <a:solidFill>
+                        <a:scrgbClr r="0" g="0" b="0"/>
+                      </a:solidFill>
+                      <a:prstDash val="solid"/>
+                      <a:round/>
+                      <a:headEnd type="none" w="med" len="med"/>
+                      <a:tailEnd type="none" w="med" len="med"/>
+                    </a:lnB>
+                    <a:solidFill>
+                      <a:schemeClr val="bg1">
+                        <a:lumMod val="85000"/>
+                      </a:schemeClr>
+                    </a:solidFill>
+                  </a:tcPr>
+                </a:tc>
+                <a:tc>
+                  <a:txBody>
+                    <a:bodyPr/>
+                    <a:lstStyle/>
+                    <a:p>
+                      <a:pPr algn="ctr"/>
+                      <a:r>
+                        <a:rPr lang="en-US" sz="1400" b="1" u="none" dirty="0" smtClean="0"/>
+                        <a:t>vid</a:t>
+                      </a:r>
+                      <a:r>
+                        <a:rPr lang="en-US" sz="1400" b="1" u="none" baseline="-25000" dirty="0" smtClean="0"/>
+                        <a:t>2</a:t>
+                      </a:r>
+                      <a:endParaRPr lang="en-US" sz="1400" b="1" u="none" baseline="-25000" dirty="0"/>
+                    </a:p>
+                  </a:txBody>
+                  <a:tcPr>
+                    <a:lnB w="12700" cap="flat" cmpd="sng" algn="ctr">
+                      <a:solidFill>
+                        <a:scrgbClr r="0" g="0" b="0"/>
+                      </a:solidFill>
+                      <a:prstDash val="solid"/>
+                      <a:round/>
+                      <a:headEnd type="none" w="med" len="med"/>
+                      <a:tailEnd type="none" w="med" len="med"/>
+                    </a:lnB>
+                    <a:solidFill>
+                      <a:schemeClr val="bg1">
+                        <a:lumMod val="85000"/>
+                      </a:schemeClr>
+                    </a:solidFill>
+                  </a:tcPr>
+                </a:tc>
+                <a:tc>
+                  <a:txBody>
+                    <a:bodyPr/>
+                    <a:lstStyle/>
+                    <a:p>
+                      <a:pPr algn="ctr"/>
+                      <a:r>
+                        <a:rPr lang="en-US" sz="1400" b="1" dirty="0" err="1" smtClean="0"/>
+                        <a:t>cnt</a:t>
+                      </a:r>
+                      <a:endParaRPr lang="en-US" sz="1400" b="1" dirty="0"/>
+                    </a:p>
+                  </a:txBody>
+                  <a:tcPr>
+                    <a:lnB w="12700" cap="flat" cmpd="sng" algn="ctr">
+                      <a:solidFill>
+                        <a:scrgbClr r="0" g="0" b="0"/>
+                      </a:solidFill>
+                      <a:prstDash val="solid"/>
+                      <a:round/>
+                      <a:headEnd type="none" w="med" len="med"/>
+                      <a:tailEnd type="none" w="med" len="med"/>
+                    </a:lnB>
+                    <a:solidFill>
+                      <a:schemeClr val="bg1">
+                        <a:lumMod val="85000"/>
+                      </a:schemeClr>
+                    </a:solidFill>
+                  </a:tcPr>
+                </a:tc>
+              </a:tr>
+              <a:tr h="237089">
+                <a:tc>
+                  <a:txBody>
+                    <a:bodyPr/>
+                    <a:lstStyle/>
+                    <a:p>
+                      <a:pPr algn="r"/>
+                      <a:r>
+                        <a:rPr lang="en-US" sz="1400" dirty="0" smtClean="0"/>
+                        <a:t>1</a:t>
+                      </a:r>
+                      <a:endParaRPr lang="en-US" sz="1400" dirty="0"/>
+                    </a:p>
+                  </a:txBody>
+                  <a:tcPr>
+                    <a:lnT w="12700" cap="flat" cmpd="sng" algn="ctr">
+                      <a:solidFill>
+                        <a:scrgbClr r="0" g="0" b="0"/>
+                      </a:solidFill>
+                      <a:prstDash val="solid"/>
+                      <a:round/>
+                      <a:headEnd type="none" w="med" len="med"/>
+                      <a:tailEnd type="none" w="med" len="med"/>
+                    </a:lnT>
+                  </a:tcPr>
+                </a:tc>
+                <a:tc>
+                  <a:txBody>
+                    <a:bodyPr/>
+                    <a:lstStyle/>
+                    <a:p>
+                      <a:pPr algn="r"/>
+                      <a:r>
+                        <a:rPr lang="en-US" sz="1400" dirty="0" smtClean="0"/>
+                        <a:t>2</a:t>
+                      </a:r>
+                      <a:endParaRPr lang="en-US" sz="1400" dirty="0"/>
+                    </a:p>
+                  </a:txBody>
+                  <a:tcPr>
+                    <a:lnT w="12700" cap="flat" cmpd="sng" algn="ctr">
+                      <a:solidFill>
+                        <a:scrgbClr r="0" g="0" b="0"/>
+                      </a:solidFill>
+                      <a:prstDash val="solid"/>
+                      <a:round/>
+                      <a:headEnd type="none" w="med" len="med"/>
+                      <a:tailEnd type="none" w="med" len="med"/>
+                    </a:lnT>
+                  </a:tcPr>
+                </a:tc>
+                <a:tc>
+                  <a:txBody>
+                    <a:bodyPr/>
+                    <a:lstStyle/>
+                    <a:p>
+                      <a:pPr algn="r"/>
+                      <a:r>
+                        <a:rPr lang="en-US" sz="1400" dirty="0" smtClean="0"/>
+                        <a:t>3</a:t>
+                      </a:r>
+                      <a:endParaRPr lang="en-US" sz="1400" dirty="0"/>
+                    </a:p>
+                  </a:txBody>
+                  <a:tcPr>
+                    <a:lnT w="12700" cap="flat" cmpd="sng" algn="ctr">
+                      <a:solidFill>
+                        <a:scrgbClr r="0" g="0" b="0"/>
+                      </a:solidFill>
+                      <a:prstDash val="solid"/>
+                      <a:round/>
+                      <a:headEnd type="none" w="med" len="med"/>
+                      <a:tailEnd type="none" w="med" len="med"/>
+                    </a:lnT>
+                  </a:tcPr>
+                </a:tc>
+              </a:tr>
+              <a:tr h="237089">
+                <a:tc>
+                  <a:txBody>
+                    <a:bodyPr/>
+                    <a:lstStyle/>
+                    <a:p>
+                      <a:pPr algn="r"/>
+                      <a:r>
+                        <a:rPr lang="en-US" sz="1400" dirty="0" smtClean="0"/>
+                        <a:t>1</a:t>
+                      </a:r>
+                      <a:endParaRPr lang="en-US" sz="1400" dirty="0"/>
+                    </a:p>
+                  </a:txBody>
+                  <a:tcPr/>
+                </a:tc>
+                <a:tc>
+                  <a:txBody>
+                    <a:bodyPr/>
+                    <a:lstStyle/>
+                    <a:p>
+                      <a:pPr algn="r"/>
+                      <a:r>
+                        <a:rPr lang="en-US" sz="1400" dirty="0" smtClean="0"/>
+                        <a:t>3</a:t>
+                      </a:r>
+                      <a:endParaRPr lang="en-US" sz="1400" dirty="0"/>
+                    </a:p>
+                  </a:txBody>
+                  <a:tcPr/>
+                </a:tc>
+                <a:tc>
+                  <a:txBody>
+                    <a:bodyPr/>
+                    <a:lstStyle/>
+                    <a:p>
+                      <a:pPr algn="r"/>
+                      <a:r>
+                        <a:rPr lang="en-US" sz="1400" dirty="0" smtClean="0"/>
+                        <a:t>2</a:t>
+                      </a:r>
+                      <a:endParaRPr lang="en-US" sz="1400" dirty="0"/>
+                    </a:p>
+                  </a:txBody>
+                  <a:tcPr/>
+                </a:tc>
+              </a:tr>
+              <a:tr h="254022">
+                <a:tc>
+                  <a:txBody>
+                    <a:bodyPr/>
+                    <a:lstStyle/>
+                    <a:p>
+                      <a:pPr algn="r"/>
+                      <a:r>
+                        <a:rPr lang="en-US" sz="1400" dirty="0" smtClean="0"/>
+                        <a:t>2</a:t>
+                      </a:r>
+                      <a:endParaRPr lang="en-US" sz="1400" dirty="0"/>
+                    </a:p>
+                  </a:txBody>
+                  <a:tcPr/>
+                </a:tc>
+                <a:tc>
+                  <a:txBody>
+                    <a:bodyPr/>
+                    <a:lstStyle/>
+                    <a:p>
+                      <a:pPr algn="r"/>
+                      <a:r>
+                        <a:rPr lang="en-US" sz="1400" dirty="0" smtClean="0"/>
+                        <a:t>4</a:t>
+                      </a:r>
+                      <a:endParaRPr lang="en-US" sz="1400" dirty="0"/>
+                    </a:p>
+                  </a:txBody>
+                  <a:tcPr/>
+                </a:tc>
+                <a:tc>
+                  <a:txBody>
+                    <a:bodyPr/>
+                    <a:lstStyle/>
+                    <a:p>
+                      <a:pPr algn="r"/>
+                      <a:r>
+                        <a:rPr lang="en-US" sz="1400" dirty="0" smtClean="0"/>
+                        <a:t>9</a:t>
+                      </a:r>
+                      <a:endParaRPr lang="en-US" sz="1400" dirty="0"/>
+                    </a:p>
+                  </a:txBody>
+                  <a:tcPr/>
+                </a:tc>
+              </a:tr>
+              <a:tr h="220155">
+                <a:tc>
+                  <a:txBody>
+                    <a:bodyPr/>
+                    <a:lstStyle/>
+                    <a:p>
+                      <a:pPr algn="r"/>
+                      <a:r>
+                        <a:rPr lang="en-US" sz="1400" dirty="0" smtClean="0"/>
+                        <a:t>3</a:t>
+                      </a:r>
+                      <a:endParaRPr lang="en-US" sz="1400" dirty="0"/>
+                    </a:p>
+                  </a:txBody>
+                  <a:tcPr/>
+                </a:tc>
+                <a:tc>
+                  <a:txBody>
+                    <a:bodyPr/>
+                    <a:lstStyle/>
+                    <a:p>
+                      <a:pPr algn="r"/>
+                      <a:r>
+                        <a:rPr lang="en-US" sz="1400" dirty="0" smtClean="0"/>
+                        <a:t>4</a:t>
+                      </a:r>
+                      <a:endParaRPr lang="en-US" sz="1400" dirty="0"/>
+                    </a:p>
+                  </a:txBody>
+                  <a:tcPr/>
+                </a:tc>
+                <a:tc>
+                  <a:txBody>
+                    <a:bodyPr/>
+                    <a:lstStyle/>
+                    <a:p>
+                      <a:pPr algn="r"/>
+                      <a:r>
+                        <a:rPr lang="en-US" sz="1400" dirty="0" smtClean="0"/>
+                        <a:t>2</a:t>
+                      </a:r>
+                      <a:endParaRPr lang="en-US" sz="1400" dirty="0"/>
+                    </a:p>
+                  </a:txBody>
+                  <a:tcPr/>
+                </a:tc>
+              </a:tr>
+              <a:tr h="254022">
+                <a:tc>
+                  <a:txBody>
+                    <a:bodyPr/>
+                    <a:lstStyle/>
+                    <a:p>
+                      <a:pPr algn="r"/>
+                      <a:r>
+                        <a:rPr lang="en-US" sz="1400" dirty="0" smtClean="0"/>
+                        <a:t>3</a:t>
+                      </a:r>
+                      <a:endParaRPr lang="en-US" sz="1400" dirty="0"/>
+                    </a:p>
+                  </a:txBody>
+                  <a:tcPr/>
+                </a:tc>
+                <a:tc>
+                  <a:txBody>
+                    <a:bodyPr/>
+                    <a:lstStyle/>
+                    <a:p>
+                      <a:pPr algn="r"/>
+                      <a:r>
+                        <a:rPr lang="en-US" sz="1400" dirty="0" smtClean="0"/>
+                        <a:t>5</a:t>
+                      </a:r>
+                      <a:endParaRPr lang="en-US" sz="1400" dirty="0"/>
+                    </a:p>
+                  </a:txBody>
+                  <a:tcPr/>
+                </a:tc>
+                <a:tc>
+                  <a:txBody>
+                    <a:bodyPr/>
+                    <a:lstStyle/>
+                    <a:p>
+                      <a:pPr algn="r"/>
+                      <a:r>
+                        <a:rPr lang="en-US" sz="1400" dirty="0" smtClean="0"/>
+                        <a:t>1</a:t>
+                      </a:r>
+                      <a:endParaRPr lang="en-US" sz="1400" dirty="0"/>
+                    </a:p>
+                  </a:txBody>
+                  <a:tcPr/>
+                </a:tc>
+              </a:tr>
+            </a:tbl>
+          </a:graphicData>
+        </a:graphic>
+      </p:graphicFrame>
+      <p:cxnSp>
+        <p:nvCxnSpPr>
+          <p:cNvPr id="52" name="Straight Connector 51"/>
+          <p:cNvCxnSpPr/>
+          <p:nvPr/>
+        </p:nvCxnSpPr>
+        <p:spPr>
+          <a:xfrm flipV="1">
+            <a:off x="2714347" y="2890643"/>
+            <a:ext cx="231599" cy="3"/>
+          </a:xfrm>
+          <a:prstGeom prst="line">
+            <a:avLst/>
+          </a:prstGeom>
+          <a:ln>
+            <a:solidFill>
+              <a:schemeClr val="tx1"/>
+            </a:solidFill>
+          </a:ln>
+          <a:effectLst/>
+        </p:spPr>
+        <p:style>
+          <a:lnRef idx="2">
+            <a:schemeClr val="accent1"/>
+          </a:lnRef>
+          <a:fillRef idx="0">
+            <a:schemeClr val="accent1"/>
+          </a:fillRef>
+          <a:effectRef idx="1">
+            <a:schemeClr val="accent1"/>
+          </a:effectRef>
+          <a:fontRef idx="minor">
+            <a:schemeClr val="tx1"/>
+          </a:fontRef>
+        </p:style>
+      </p:cxnSp>
+      <p:cxnSp>
+        <p:nvCxnSpPr>
+          <p:cNvPr id="53" name="Straight Connector 52"/>
+          <p:cNvCxnSpPr/>
+          <p:nvPr/>
+        </p:nvCxnSpPr>
+        <p:spPr>
+          <a:xfrm flipV="1">
+            <a:off x="3213881" y="2890643"/>
+            <a:ext cx="231599" cy="3"/>
+          </a:xfrm>
+          <a:prstGeom prst="line">
+            <a:avLst/>
+          </a:prstGeom>
+          <a:ln>
+            <a:solidFill>
+              <a:schemeClr val="tx1"/>
+            </a:solidFill>
+          </a:ln>
+          <a:effectLst/>
+        </p:spPr>
+        <p:style>
+          <a:lnRef idx="2">
+            <a:schemeClr val="accent1"/>
+          </a:lnRef>
+          <a:fillRef idx="0">
+            <a:schemeClr val="accent1"/>
+          </a:fillRef>
+          <a:effectRef idx="1">
+            <a:schemeClr val="accent1"/>
+          </a:effectRef>
+          <a:fontRef idx="minor">
+            <a:schemeClr val="tx1"/>
+          </a:fontRef>
+        </p:style>
+      </p:cxnSp>
+      <p:cxnSp>
+        <p:nvCxnSpPr>
+          <p:cNvPr id="54" name="Straight Connector 53"/>
+          <p:cNvCxnSpPr/>
+          <p:nvPr/>
+        </p:nvCxnSpPr>
+        <p:spPr>
+          <a:xfrm flipV="1">
+            <a:off x="2690522" y="705571"/>
+            <a:ext cx="231599" cy="3"/>
+          </a:xfrm>
+          <a:prstGeom prst="line">
+            <a:avLst/>
+          </a:prstGeom>
+          <a:ln>
+            <a:solidFill>
+              <a:schemeClr val="tx1"/>
+            </a:solidFill>
+          </a:ln>
+          <a:effectLst/>
+        </p:spPr>
+        <p:style>
+          <a:lnRef idx="2">
+            <a:schemeClr val="accent1"/>
+          </a:lnRef>
+          <a:fillRef idx="0">
+            <a:schemeClr val="accent1"/>
+          </a:fillRef>
+          <a:effectRef idx="1">
+            <a:schemeClr val="accent1"/>
+          </a:effectRef>
+          <a:fontRef idx="minor">
+            <a:schemeClr val="tx1"/>
+          </a:fontRef>
+        </p:style>
+      </p:cxnSp>
+      <p:cxnSp>
+        <p:nvCxnSpPr>
+          <p:cNvPr id="57" name="Straight Connector 56"/>
+          <p:cNvCxnSpPr/>
+          <p:nvPr/>
+        </p:nvCxnSpPr>
+        <p:spPr>
+          <a:xfrm>
+            <a:off x="4597482" y="169327"/>
+            <a:ext cx="0" cy="4317282"/>
+          </a:xfrm>
+          <a:prstGeom prst="line">
+            <a:avLst/>
+          </a:prstGeom>
+          <a:ln>
+            <a:solidFill>
+              <a:schemeClr val="tx1"/>
+            </a:solidFill>
+            <a:prstDash val="dash"/>
+          </a:ln>
+          <a:effectLst/>
+        </p:spPr>
+        <p:style>
+          <a:lnRef idx="2">
+            <a:schemeClr val="accent1"/>
+          </a:lnRef>
+          <a:fillRef idx="0">
+            <a:schemeClr val="accent1"/>
+          </a:fillRef>
+          <a:effectRef idx="1">
+            <a:schemeClr val="accent1"/>
+          </a:effectRef>
+          <a:fontRef idx="minor">
+            <a:schemeClr val="tx1"/>
+          </a:fontRef>
+        </p:style>
+      </p:cxnSp>
+      <p:sp>
+        <p:nvSpPr>
+          <p:cNvPr id="58" name="TextBox 57"/>
+          <p:cNvSpPr txBox="1"/>
+          <p:nvPr/>
+        </p:nvSpPr>
+        <p:spPr>
+          <a:xfrm>
+            <a:off x="4838361" y="27453"/>
+            <a:ext cx="1371176" cy="369332"/>
+          </a:xfrm>
+          <a:prstGeom prst="rect">
+            <a:avLst/>
+          </a:prstGeom>
+          <a:noFill/>
+        </p:spPr>
+        <p:txBody>
+          <a:bodyPr wrap="none" rtlCol="0">
+            <a:spAutoFit/>
+          </a:bodyPr>
+          <a:lstStyle/>
+          <a:p>
+            <a:r>
+              <a:rPr lang="en-US" dirty="0" smtClean="0"/>
+              <a:t>[</a:t>
+            </a:r>
+            <a:r>
+              <a:rPr lang="en-US" dirty="0" smtClean="0"/>
+              <a:t>2012, 2013)</a:t>
+            </a:r>
+            <a:endParaRPr lang="en-US" dirty="0"/>
+          </a:p>
+        </p:txBody>
+      </p:sp>
+      <p:graphicFrame>
+        <p:nvGraphicFramePr>
+          <p:cNvPr id="59" name="Table 58"/>
+          <p:cNvGraphicFramePr>
+            <a:graphicFrameLocks noGrp="1"/>
+          </p:cNvGraphicFramePr>
+          <p:nvPr>
+            <p:extLst>
+              <p:ext uri="{D42A27DB-BD31-4B8C-83A1-F6EECF244321}">
+                <p14:modId xmlns:p14="http://schemas.microsoft.com/office/powerpoint/2010/main" val="3040524429"/>
+              </p:ext>
+            </p:extLst>
+          </p:nvPr>
+        </p:nvGraphicFramePr>
+        <p:xfrm>
+          <a:off x="4823061" y="399986"/>
+          <a:ext cx="1776371" cy="2032002"/>
+        </p:xfrm>
+        <a:graphic>
+          <a:graphicData uri="http://schemas.openxmlformats.org/drawingml/2006/table">
+            <a:tbl>
+              <a:tblPr firstRow="1" bandRow="1">
+                <a:tableStyleId>{5940675A-B579-460E-94D1-54222C63F5DA}</a:tableStyleId>
+              </a:tblPr>
+              <a:tblGrid>
+                <a:gridCol w="430171"/>
+                <a:gridCol w="702733"/>
+                <a:gridCol w="643467"/>
+              </a:tblGrid>
+              <a:tr h="338667">
+                <a:tc>
+                  <a:txBody>
+                    <a:bodyPr/>
+                    <a:lstStyle/>
+                    <a:p>
+                      <a:pPr algn="ctr"/>
+                      <a:r>
+                        <a:rPr lang="en-US" sz="1400" b="1" u="none" dirty="0" smtClean="0"/>
+                        <a:t>vid</a:t>
+                      </a:r>
+                      <a:endParaRPr lang="en-US" sz="1400" b="1" u="none" dirty="0"/>
+                    </a:p>
+                  </a:txBody>
+                  <a:tcPr>
+                    <a:lnB w="12700" cap="flat" cmpd="sng" algn="ctr">
+                      <a:solidFill>
+                        <a:scrgbClr r="0" g="0" b="0"/>
+                      </a:solidFill>
+                      <a:prstDash val="solid"/>
+                      <a:round/>
+                      <a:headEnd type="none" w="med" len="med"/>
+                      <a:tailEnd type="none" w="med" len="med"/>
+                    </a:lnB>
+                    <a:solidFill>
+                      <a:schemeClr val="bg1">
+                        <a:lumMod val="85000"/>
+                      </a:schemeClr>
+                    </a:solidFill>
+                  </a:tcPr>
+                </a:tc>
+                <a:tc>
+                  <a:txBody>
+                    <a:bodyPr/>
+                    <a:lstStyle/>
+                    <a:p>
+                      <a:pPr algn="ctr"/>
+                      <a:r>
+                        <a:rPr lang="en-US" sz="1400" b="1" dirty="0" smtClean="0"/>
+                        <a:t>name</a:t>
+                      </a:r>
+                      <a:endParaRPr lang="en-US" sz="1400" b="1" dirty="0"/>
+                    </a:p>
+                  </a:txBody>
+                  <a:tcPr>
+                    <a:lnB w="12700" cap="flat" cmpd="sng" algn="ctr">
+                      <a:solidFill>
+                        <a:scrgbClr r="0" g="0" b="0"/>
+                      </a:solidFill>
+                      <a:prstDash val="solid"/>
+                      <a:round/>
+                      <a:headEnd type="none" w="med" len="med"/>
+                      <a:tailEnd type="none" w="med" len="med"/>
+                    </a:lnB>
+                    <a:solidFill>
+                      <a:schemeClr val="bg1">
+                        <a:lumMod val="85000"/>
+                      </a:schemeClr>
+                    </a:solidFill>
+                  </a:tcPr>
+                </a:tc>
+                <a:tc>
+                  <a:txBody>
+                    <a:bodyPr/>
+                    <a:lstStyle/>
+                    <a:p>
+                      <a:pPr algn="ctr"/>
+                      <a:r>
+                        <a:rPr lang="en-US" sz="1400" b="1" dirty="0" smtClean="0"/>
+                        <a:t>salary</a:t>
+                      </a:r>
+                      <a:endParaRPr lang="en-US" sz="1400" b="1" dirty="0"/>
+                    </a:p>
+                  </a:txBody>
+                  <a:tcPr>
+                    <a:lnB w="12700" cap="flat" cmpd="sng" algn="ctr">
+                      <a:solidFill>
+                        <a:scrgbClr r="0" g="0" b="0"/>
+                      </a:solidFill>
+                      <a:prstDash val="solid"/>
+                      <a:round/>
+                      <a:headEnd type="none" w="med" len="med"/>
+                      <a:tailEnd type="none" w="med" len="med"/>
+                    </a:lnB>
+                    <a:solidFill>
+                      <a:schemeClr val="bg1">
+                        <a:lumMod val="85000"/>
+                      </a:schemeClr>
+                    </a:solidFill>
+                  </a:tcPr>
+                </a:tc>
+              </a:tr>
+              <a:tr h="338667">
+                <a:tc>
+                  <a:txBody>
+                    <a:bodyPr/>
+                    <a:lstStyle/>
+                    <a:p>
+                      <a:pPr algn="r"/>
+                      <a:r>
+                        <a:rPr lang="en-US" sz="1400" dirty="0" smtClean="0"/>
+                        <a:t>1</a:t>
+                      </a:r>
+                      <a:endParaRPr lang="en-US" sz="1400" dirty="0"/>
+                    </a:p>
+                  </a:txBody>
+                  <a:tcPr>
+                    <a:lnT w="12700" cap="flat" cmpd="sng" algn="ctr">
+                      <a:solidFill>
+                        <a:scrgbClr r="0" g="0" b="0"/>
+                      </a:solidFill>
+                      <a:prstDash val="solid"/>
+                      <a:round/>
+                      <a:headEnd type="none" w="med" len="med"/>
+                      <a:tailEnd type="none" w="med" len="med"/>
+                    </a:lnT>
+                  </a:tcPr>
+                </a:tc>
+                <a:tc>
+                  <a:txBody>
+                    <a:bodyPr/>
+                    <a:lstStyle/>
+                    <a:p>
+                      <a:pPr algn="ctr"/>
+                      <a:r>
+                        <a:rPr lang="en-US" sz="1400" dirty="0" smtClean="0"/>
+                        <a:t>Alice</a:t>
+                      </a:r>
+                      <a:endParaRPr lang="en-US" sz="1400" dirty="0"/>
+                    </a:p>
+                  </a:txBody>
+                  <a:tcPr>
+                    <a:lnT w="12700" cap="flat" cmpd="sng" algn="ctr">
+                      <a:solidFill>
+                        <a:scrgbClr r="0" g="0" b="0"/>
+                      </a:solidFill>
+                      <a:prstDash val="solid"/>
+                      <a:round/>
+                      <a:headEnd type="none" w="med" len="med"/>
+                      <a:tailEnd type="none" w="med" len="med"/>
+                    </a:lnT>
+                  </a:tcPr>
+                </a:tc>
+                <a:tc>
+                  <a:txBody>
+                    <a:bodyPr/>
+                    <a:lstStyle/>
+                    <a:p>
+                      <a:pPr algn="r"/>
+                      <a:r>
+                        <a:rPr lang="en-US" sz="1400" dirty="0" smtClean="0"/>
+                        <a:t>$</a:t>
+                      </a:r>
+                      <a:r>
+                        <a:rPr lang="en-US" sz="1400" dirty="0" smtClean="0"/>
+                        <a:t>155K</a:t>
+                      </a:r>
+                      <a:endParaRPr lang="en-US" sz="1400" dirty="0"/>
+                    </a:p>
+                  </a:txBody>
+                  <a:tcPr>
+                    <a:lnT w="12700" cap="flat" cmpd="sng" algn="ctr">
+                      <a:solidFill>
+                        <a:scrgbClr r="0" g="0" b="0"/>
+                      </a:solidFill>
+                      <a:prstDash val="solid"/>
+                      <a:round/>
+                      <a:headEnd type="none" w="med" len="med"/>
+                      <a:tailEnd type="none" w="med" len="med"/>
+                    </a:lnT>
+                  </a:tcPr>
+                </a:tc>
+              </a:tr>
+              <a:tr h="338667">
+                <a:tc>
+                  <a:txBody>
+                    <a:bodyPr/>
+                    <a:lstStyle/>
+                    <a:p>
+                      <a:pPr algn="r"/>
+                      <a:r>
+                        <a:rPr lang="en-US" sz="1400" dirty="0" smtClean="0"/>
+                        <a:t>3</a:t>
+                      </a:r>
+                      <a:endParaRPr lang="en-US" sz="1400" dirty="0"/>
+                    </a:p>
+                  </a:txBody>
+                  <a:tcPr/>
+                </a:tc>
+                <a:tc>
+                  <a:txBody>
+                    <a:bodyPr/>
+                    <a:lstStyle/>
+                    <a:p>
+                      <a:pPr algn="ctr"/>
+                      <a:r>
+                        <a:rPr lang="en-US" sz="1400" dirty="0" smtClean="0"/>
+                        <a:t>Cathy</a:t>
+                      </a:r>
+                      <a:endParaRPr lang="en-US" sz="1400" dirty="0"/>
+                    </a:p>
+                  </a:txBody>
+                  <a:tcPr/>
+                </a:tc>
+                <a:tc>
+                  <a:txBody>
+                    <a:bodyPr/>
+                    <a:lstStyle/>
+                    <a:p>
+                      <a:pPr algn="r"/>
+                      <a:r>
+                        <a:rPr lang="en-US" sz="1400" dirty="0" smtClean="0"/>
+                        <a:t>$105K</a:t>
+                      </a:r>
+                      <a:endParaRPr lang="en-US" sz="1400" dirty="0"/>
+                    </a:p>
+                  </a:txBody>
+                  <a:tcPr/>
+                </a:tc>
+              </a:tr>
+              <a:tr h="338667">
+                <a:tc>
+                  <a:txBody>
+                    <a:bodyPr/>
+                    <a:lstStyle/>
+                    <a:p>
+                      <a:pPr algn="r"/>
+                      <a:r>
+                        <a:rPr lang="en-US" sz="1400" dirty="0" smtClean="0"/>
+                        <a:t>4</a:t>
+                      </a:r>
+                      <a:endParaRPr lang="en-US" sz="1400" dirty="0"/>
+                    </a:p>
+                  </a:txBody>
+                  <a:tcPr/>
+                </a:tc>
+                <a:tc>
+                  <a:txBody>
+                    <a:bodyPr/>
+                    <a:lstStyle/>
+                    <a:p>
+                      <a:pPr algn="ctr"/>
+                      <a:r>
+                        <a:rPr lang="en-US" sz="1400" dirty="0" smtClean="0"/>
+                        <a:t>Dave</a:t>
+                      </a:r>
+                      <a:endParaRPr lang="en-US" sz="1400" dirty="0"/>
+                    </a:p>
+                  </a:txBody>
+                  <a:tcPr/>
+                </a:tc>
+                <a:tc>
+                  <a:txBody>
+                    <a:bodyPr/>
+                    <a:lstStyle/>
+                    <a:p>
+                      <a:pPr algn="r"/>
+                      <a:r>
+                        <a:rPr lang="en-US" sz="1400" dirty="0" smtClean="0"/>
+                        <a:t>$55K</a:t>
+                      </a:r>
+                      <a:endParaRPr lang="en-US" sz="1400" dirty="0"/>
+                    </a:p>
+                  </a:txBody>
+                  <a:tcPr/>
+                </a:tc>
+              </a:tr>
+              <a:tr h="338667">
+                <a:tc>
+                  <a:txBody>
+                    <a:bodyPr/>
+                    <a:lstStyle/>
+                    <a:p>
+                      <a:pPr algn="r"/>
+                      <a:r>
+                        <a:rPr lang="en-US" sz="1400" dirty="0" smtClean="0"/>
+                        <a:t>5</a:t>
+                      </a:r>
+                      <a:endParaRPr lang="en-US" sz="1400" dirty="0"/>
+                    </a:p>
+                  </a:txBody>
+                  <a:tcPr/>
+                </a:tc>
+                <a:tc>
+                  <a:txBody>
+                    <a:bodyPr/>
+                    <a:lstStyle/>
+                    <a:p>
+                      <a:pPr algn="ctr"/>
+                      <a:r>
+                        <a:rPr lang="en-US" sz="1400" dirty="0" smtClean="0"/>
+                        <a:t>Eve</a:t>
+                      </a:r>
+                      <a:endParaRPr lang="en-US" sz="1400" dirty="0"/>
+                    </a:p>
+                  </a:txBody>
+                  <a:tcPr/>
+                </a:tc>
+                <a:tc>
+                  <a:txBody>
+                    <a:bodyPr/>
+                    <a:lstStyle/>
+                    <a:p>
+                      <a:pPr algn="r"/>
+                      <a:r>
+                        <a:rPr lang="en-US" sz="1400" dirty="0" smtClean="0"/>
+                        <a:t>$</a:t>
+                      </a:r>
+                      <a:r>
+                        <a:rPr lang="en-US" sz="1400" dirty="0" smtClean="0"/>
+                        <a:t>80K</a:t>
+                      </a:r>
+                      <a:endParaRPr lang="en-US" sz="1400" dirty="0"/>
+                    </a:p>
+                  </a:txBody>
+                  <a:tcPr/>
+                </a:tc>
+              </a:tr>
+              <a:tr h="338667">
+                <a:tc>
+                  <a:txBody>
+                    <a:bodyPr/>
+                    <a:lstStyle/>
+                    <a:p>
+                      <a:pPr algn="r"/>
+                      <a:r>
+                        <a:rPr lang="en-US" sz="1400" dirty="0" smtClean="0"/>
+                        <a:t>6</a:t>
+                      </a:r>
+                      <a:endParaRPr lang="en-US" sz="1400" dirty="0"/>
+                    </a:p>
+                  </a:txBody>
+                  <a:tcPr/>
+                </a:tc>
+                <a:tc>
+                  <a:txBody>
+                    <a:bodyPr/>
+                    <a:lstStyle/>
+                    <a:p>
+                      <a:pPr algn="ctr"/>
+                      <a:r>
+                        <a:rPr lang="en-US" sz="1400" dirty="0" smtClean="0"/>
+                        <a:t>Frank</a:t>
+                      </a:r>
+                      <a:endParaRPr lang="en-US" sz="1400" dirty="0"/>
+                    </a:p>
+                  </a:txBody>
+                  <a:tcPr/>
+                </a:tc>
+                <a:tc>
+                  <a:txBody>
+                    <a:bodyPr/>
+                    <a:lstStyle/>
+                    <a:p>
+                      <a:pPr algn="r"/>
+                      <a:r>
+                        <a:rPr lang="en-US" sz="1400" dirty="0" smtClean="0"/>
+                        <a:t>$73</a:t>
+                      </a:r>
+                      <a:endParaRPr lang="en-US" sz="1400" dirty="0"/>
+                    </a:p>
+                  </a:txBody>
+                  <a:tcPr/>
+                </a:tc>
+              </a:tr>
+            </a:tbl>
+          </a:graphicData>
+        </a:graphic>
+      </p:graphicFrame>
+      <p:graphicFrame>
+        <p:nvGraphicFramePr>
+          <p:cNvPr id="60" name="Table 59"/>
+          <p:cNvGraphicFramePr>
+            <a:graphicFrameLocks noGrp="1"/>
+          </p:cNvGraphicFramePr>
+          <p:nvPr>
+            <p:extLst>
+              <p:ext uri="{D42A27DB-BD31-4B8C-83A1-F6EECF244321}">
+                <p14:modId xmlns:p14="http://schemas.microsoft.com/office/powerpoint/2010/main" val="843160326"/>
+              </p:ext>
+            </p:extLst>
+          </p:nvPr>
+        </p:nvGraphicFramePr>
+        <p:xfrm>
+          <a:off x="4823061" y="2623943"/>
+          <a:ext cx="1432470" cy="1557866"/>
+        </p:xfrm>
+        <a:graphic>
+          <a:graphicData uri="http://schemas.openxmlformats.org/drawingml/2006/table">
+            <a:tbl>
+              <a:tblPr firstRow="1" bandRow="1">
+                <a:tableStyleId>{5940675A-B579-460E-94D1-54222C63F5DA}</a:tableStyleId>
+              </a:tblPr>
+              <a:tblGrid>
+                <a:gridCol w="509603"/>
+                <a:gridCol w="482600"/>
+                <a:gridCol w="440267"/>
+              </a:tblGrid>
+              <a:tr h="338667">
+                <a:tc>
+                  <a:txBody>
+                    <a:bodyPr/>
+                    <a:lstStyle/>
+                    <a:p>
+                      <a:pPr algn="ctr"/>
+                      <a:r>
+                        <a:rPr lang="en-US" sz="1400" b="1" u="none" dirty="0" smtClean="0"/>
+                        <a:t>vid</a:t>
+                      </a:r>
+                      <a:r>
+                        <a:rPr lang="en-US" sz="1400" b="1" u="none" baseline="-25000" dirty="0" smtClean="0"/>
+                        <a:t>1</a:t>
+                      </a:r>
+                      <a:endParaRPr lang="en-US" sz="1400" b="1" u="none" baseline="-25000" dirty="0"/>
+                    </a:p>
+                  </a:txBody>
+                  <a:tcPr>
+                    <a:lnB w="12700" cap="flat" cmpd="sng" algn="ctr">
+                      <a:solidFill>
+                        <a:scrgbClr r="0" g="0" b="0"/>
+                      </a:solidFill>
+                      <a:prstDash val="solid"/>
+                      <a:round/>
+                      <a:headEnd type="none" w="med" len="med"/>
+                      <a:tailEnd type="none" w="med" len="med"/>
+                    </a:lnB>
+                    <a:solidFill>
+                      <a:schemeClr val="bg1">
+                        <a:lumMod val="85000"/>
+                      </a:schemeClr>
+                    </a:solidFill>
+                  </a:tcPr>
+                </a:tc>
+                <a:tc>
+                  <a:txBody>
+                    <a:bodyPr/>
+                    <a:lstStyle/>
+                    <a:p>
+                      <a:pPr algn="ctr"/>
+                      <a:r>
+                        <a:rPr lang="en-US" sz="1400" b="1" u="none" dirty="0" smtClean="0"/>
+                        <a:t>vid</a:t>
+                      </a:r>
+                      <a:r>
+                        <a:rPr lang="en-US" sz="1400" b="1" u="none" baseline="-25000" dirty="0" smtClean="0"/>
+                        <a:t>2</a:t>
+                      </a:r>
+                      <a:endParaRPr lang="en-US" sz="1400" b="1" u="none" baseline="-25000" dirty="0"/>
+                    </a:p>
+                  </a:txBody>
+                  <a:tcPr>
+                    <a:lnB w="12700" cap="flat" cmpd="sng" algn="ctr">
+                      <a:solidFill>
+                        <a:scrgbClr r="0" g="0" b="0"/>
+                      </a:solidFill>
+                      <a:prstDash val="solid"/>
+                      <a:round/>
+                      <a:headEnd type="none" w="med" len="med"/>
+                      <a:tailEnd type="none" w="med" len="med"/>
+                    </a:lnB>
+                    <a:solidFill>
+                      <a:schemeClr val="bg1">
+                        <a:lumMod val="85000"/>
+                      </a:schemeClr>
+                    </a:solidFill>
+                  </a:tcPr>
+                </a:tc>
+                <a:tc>
+                  <a:txBody>
+                    <a:bodyPr/>
+                    <a:lstStyle/>
+                    <a:p>
+                      <a:pPr algn="ctr"/>
+                      <a:r>
+                        <a:rPr lang="en-US" sz="1400" b="1" dirty="0" err="1" smtClean="0"/>
+                        <a:t>cnt</a:t>
+                      </a:r>
+                      <a:endParaRPr lang="en-US" sz="1400" b="1" dirty="0"/>
+                    </a:p>
+                  </a:txBody>
+                  <a:tcPr>
+                    <a:lnB w="12700" cap="flat" cmpd="sng" algn="ctr">
+                      <a:solidFill>
+                        <a:scrgbClr r="0" g="0" b="0"/>
+                      </a:solidFill>
+                      <a:prstDash val="solid"/>
+                      <a:round/>
+                      <a:headEnd type="none" w="med" len="med"/>
+                      <a:tailEnd type="none" w="med" len="med"/>
+                    </a:lnB>
+                    <a:solidFill>
+                      <a:schemeClr val="bg1">
+                        <a:lumMod val="85000"/>
+                      </a:schemeClr>
+                    </a:solidFill>
+                  </a:tcPr>
+                </a:tc>
+              </a:tr>
+              <a:tr h="237089">
+                <a:tc>
+                  <a:txBody>
+                    <a:bodyPr/>
+                    <a:lstStyle/>
+                    <a:p>
+                      <a:pPr algn="r"/>
+                      <a:r>
+                        <a:rPr lang="en-US" sz="1400" dirty="0" smtClean="0"/>
+                        <a:t>1</a:t>
+                      </a:r>
+                      <a:endParaRPr lang="en-US" sz="1400" dirty="0"/>
+                    </a:p>
+                  </a:txBody>
+                  <a:tcPr>
+                    <a:lnT w="12700" cap="flat" cmpd="sng" algn="ctr">
+                      <a:solidFill>
+                        <a:scrgbClr r="0" g="0" b="0"/>
+                      </a:solidFill>
+                      <a:prstDash val="solid"/>
+                      <a:round/>
+                      <a:headEnd type="none" w="med" len="med"/>
+                      <a:tailEnd type="none" w="med" len="med"/>
+                    </a:lnT>
+                  </a:tcPr>
+                </a:tc>
+                <a:tc>
+                  <a:txBody>
+                    <a:bodyPr/>
+                    <a:lstStyle/>
+                    <a:p>
+                      <a:pPr algn="r"/>
+                      <a:r>
+                        <a:rPr lang="en-US" sz="1400" dirty="0" smtClean="0"/>
+                        <a:t>3</a:t>
+                      </a:r>
+                      <a:endParaRPr lang="en-US" sz="1400" dirty="0"/>
+                    </a:p>
+                  </a:txBody>
+                  <a:tcPr>
+                    <a:lnT w="12700" cap="flat" cmpd="sng" algn="ctr">
+                      <a:solidFill>
+                        <a:scrgbClr r="0" g="0" b="0"/>
+                      </a:solidFill>
+                      <a:prstDash val="solid"/>
+                      <a:round/>
+                      <a:headEnd type="none" w="med" len="med"/>
+                      <a:tailEnd type="none" w="med" len="med"/>
+                    </a:lnT>
+                  </a:tcPr>
+                </a:tc>
+                <a:tc>
+                  <a:txBody>
+                    <a:bodyPr/>
+                    <a:lstStyle/>
+                    <a:p>
+                      <a:pPr algn="r"/>
+                      <a:r>
+                        <a:rPr lang="en-US" sz="1400" dirty="0" smtClean="0"/>
+                        <a:t>2 </a:t>
+                      </a:r>
+                      <a:endParaRPr lang="en-US" sz="1400" dirty="0"/>
+                    </a:p>
+                  </a:txBody>
+                  <a:tcPr>
+                    <a:lnT w="12700" cap="flat" cmpd="sng" algn="ctr">
+                      <a:solidFill>
+                        <a:scrgbClr r="0" g="0" b="0"/>
+                      </a:solidFill>
+                      <a:prstDash val="solid"/>
+                      <a:round/>
+                      <a:headEnd type="none" w="med" len="med"/>
+                      <a:tailEnd type="none" w="med" len="med"/>
+                    </a:lnT>
+                  </a:tcPr>
+                </a:tc>
+              </a:tr>
+              <a:tr h="237089">
+                <a:tc>
+                  <a:txBody>
+                    <a:bodyPr/>
+                    <a:lstStyle/>
+                    <a:p>
+                      <a:pPr algn="r"/>
+                      <a:r>
+                        <a:rPr lang="en-US" sz="1400" dirty="0" smtClean="0"/>
+                        <a:t>1</a:t>
+                      </a:r>
+                      <a:endParaRPr lang="en-US" sz="1400" dirty="0"/>
+                    </a:p>
+                  </a:txBody>
+                  <a:tcPr/>
+                </a:tc>
+                <a:tc>
+                  <a:txBody>
+                    <a:bodyPr/>
+                    <a:lstStyle/>
+                    <a:p>
+                      <a:pPr algn="r"/>
+                      <a:r>
+                        <a:rPr lang="en-US" sz="1400" dirty="0" smtClean="0"/>
+                        <a:t>4</a:t>
+                      </a:r>
+                      <a:endParaRPr lang="en-US" sz="1400" dirty="0"/>
+                    </a:p>
+                  </a:txBody>
+                  <a:tcPr/>
+                </a:tc>
+                <a:tc>
+                  <a:txBody>
+                    <a:bodyPr/>
+                    <a:lstStyle/>
+                    <a:p>
+                      <a:pPr algn="r"/>
+                      <a:r>
+                        <a:rPr lang="en-US" sz="1400" smtClean="0"/>
+                        <a:t>2 </a:t>
+                      </a:r>
+                      <a:endParaRPr lang="en-US" sz="1400" dirty="0"/>
+                    </a:p>
+                  </a:txBody>
+                  <a:tcPr/>
+                </a:tc>
+              </a:tr>
+              <a:tr h="254022">
+                <a:tc>
+                  <a:txBody>
+                    <a:bodyPr/>
+                    <a:lstStyle/>
+                    <a:p>
+                      <a:pPr algn="r"/>
+                      <a:r>
+                        <a:rPr lang="en-US" sz="1400" dirty="0" smtClean="0"/>
+                        <a:t>3</a:t>
+                      </a:r>
+                      <a:endParaRPr lang="en-US" sz="1400" dirty="0"/>
+                    </a:p>
+                  </a:txBody>
+                  <a:tcPr/>
+                </a:tc>
+                <a:tc>
+                  <a:txBody>
+                    <a:bodyPr/>
+                    <a:lstStyle/>
+                    <a:p>
+                      <a:pPr algn="r"/>
+                      <a:r>
+                        <a:rPr lang="en-US" sz="1400" dirty="0" smtClean="0"/>
+                        <a:t>4</a:t>
+                      </a:r>
+                      <a:endParaRPr lang="en-US" sz="1400" dirty="0"/>
+                    </a:p>
+                  </a:txBody>
+                  <a:tcPr/>
+                </a:tc>
+                <a:tc>
+                  <a:txBody>
+                    <a:bodyPr/>
+                    <a:lstStyle/>
+                    <a:p>
+                      <a:pPr algn="r"/>
+                      <a:r>
+                        <a:rPr lang="en-US" sz="1400" dirty="0" smtClean="0"/>
+                        <a:t>4 </a:t>
+                      </a:r>
+                      <a:endParaRPr lang="en-US" sz="1400" dirty="0"/>
+                    </a:p>
+                  </a:txBody>
+                  <a:tcPr/>
+                </a:tc>
+              </a:tr>
+              <a:tr h="220155">
+                <a:tc>
+                  <a:txBody>
+                    <a:bodyPr/>
+                    <a:lstStyle/>
+                    <a:p>
+                      <a:pPr algn="r"/>
+                      <a:r>
+                        <a:rPr lang="en-US" sz="1400" dirty="0" smtClean="0"/>
+                        <a:t>5</a:t>
+                      </a:r>
+                      <a:endParaRPr lang="en-US" sz="1400" dirty="0"/>
+                    </a:p>
+                  </a:txBody>
+                  <a:tcPr/>
+                </a:tc>
+                <a:tc>
+                  <a:txBody>
+                    <a:bodyPr/>
+                    <a:lstStyle/>
+                    <a:p>
+                      <a:pPr algn="r"/>
+                      <a:r>
+                        <a:rPr lang="en-US" sz="1400" dirty="0" smtClean="0"/>
+                        <a:t>6</a:t>
+                      </a:r>
+                      <a:endParaRPr lang="en-US" sz="1400" dirty="0"/>
+                    </a:p>
+                  </a:txBody>
+                  <a:tcPr/>
+                </a:tc>
+                <a:tc>
+                  <a:txBody>
+                    <a:bodyPr/>
+                    <a:lstStyle/>
+                    <a:p>
+                      <a:pPr algn="r"/>
+                      <a:r>
+                        <a:rPr lang="en-US" sz="1400" dirty="0" smtClean="0"/>
+                        <a:t>1</a:t>
+                      </a:r>
+                      <a:endParaRPr lang="en-US" sz="1400" dirty="0"/>
+                    </a:p>
+                  </a:txBody>
+                  <a:tcPr/>
+                </a:tc>
+              </a:tr>
+            </a:tbl>
+          </a:graphicData>
+        </a:graphic>
+      </p:graphicFrame>
+      <p:cxnSp>
+        <p:nvCxnSpPr>
+          <p:cNvPr id="61" name="Straight Connector 60"/>
+          <p:cNvCxnSpPr/>
+          <p:nvPr/>
+        </p:nvCxnSpPr>
+        <p:spPr>
+          <a:xfrm flipV="1">
+            <a:off x="5017365" y="2890643"/>
+            <a:ext cx="231599" cy="3"/>
+          </a:xfrm>
+          <a:prstGeom prst="line">
+            <a:avLst/>
+          </a:prstGeom>
+          <a:ln>
+            <a:solidFill>
+              <a:schemeClr val="tx1"/>
+            </a:solidFill>
+          </a:ln>
+          <a:effectLst/>
+        </p:spPr>
+        <p:style>
+          <a:lnRef idx="2">
+            <a:schemeClr val="accent1"/>
+          </a:lnRef>
+          <a:fillRef idx="0">
+            <a:schemeClr val="accent1"/>
+          </a:fillRef>
+          <a:effectRef idx="1">
+            <a:schemeClr val="accent1"/>
+          </a:effectRef>
+          <a:fontRef idx="minor">
+            <a:schemeClr val="tx1"/>
+          </a:fontRef>
+        </p:style>
+      </p:cxnSp>
+      <p:cxnSp>
+        <p:nvCxnSpPr>
+          <p:cNvPr id="62" name="Straight Connector 61"/>
+          <p:cNvCxnSpPr/>
+          <p:nvPr/>
+        </p:nvCxnSpPr>
+        <p:spPr>
+          <a:xfrm flipV="1">
+            <a:off x="5516899" y="2890643"/>
+            <a:ext cx="231599" cy="3"/>
+          </a:xfrm>
+          <a:prstGeom prst="line">
+            <a:avLst/>
+          </a:prstGeom>
+          <a:ln>
+            <a:solidFill>
+              <a:schemeClr val="tx1"/>
+            </a:solidFill>
+          </a:ln>
+          <a:effectLst/>
+        </p:spPr>
+        <p:style>
+          <a:lnRef idx="2">
+            <a:schemeClr val="accent1"/>
+          </a:lnRef>
+          <a:fillRef idx="0">
+            <a:schemeClr val="accent1"/>
+          </a:fillRef>
+          <a:effectRef idx="1">
+            <a:schemeClr val="accent1"/>
+          </a:effectRef>
+          <a:fontRef idx="minor">
+            <a:schemeClr val="tx1"/>
+          </a:fontRef>
+        </p:style>
+      </p:cxnSp>
+      <p:cxnSp>
+        <p:nvCxnSpPr>
+          <p:cNvPr id="63" name="Straight Connector 62"/>
+          <p:cNvCxnSpPr/>
+          <p:nvPr/>
+        </p:nvCxnSpPr>
+        <p:spPr>
+          <a:xfrm flipV="1">
+            <a:off x="4925804" y="697098"/>
+            <a:ext cx="231599" cy="3"/>
+          </a:xfrm>
+          <a:prstGeom prst="line">
+            <a:avLst/>
+          </a:prstGeom>
+          <a:ln>
+            <a:solidFill>
+              <a:schemeClr val="tx1"/>
+            </a:solidFill>
+          </a:ln>
+          <a:effectLst/>
+        </p:spPr>
+        <p:style>
+          <a:lnRef idx="2">
+            <a:schemeClr val="accent1"/>
+          </a:lnRef>
+          <a:fillRef idx="0">
+            <a:schemeClr val="accent1"/>
+          </a:fillRef>
+          <a:effectRef idx="1">
+            <a:schemeClr val="accent1"/>
+          </a:effectRef>
+          <a:fontRef idx="minor">
+            <a:schemeClr val="tx1"/>
+          </a:fontRef>
+        </p:style>
+      </p:cxnSp>
+      <p:sp>
+        <p:nvSpPr>
+          <p:cNvPr id="74" name="Rectangle 73"/>
+          <p:cNvSpPr/>
+          <p:nvPr/>
+        </p:nvSpPr>
+        <p:spPr>
+          <a:xfrm>
+            <a:off x="6599432" y="6198050"/>
+            <a:ext cx="2170336" cy="461665"/>
+          </a:xfrm>
+          <a:prstGeom prst="rect">
+            <a:avLst/>
+          </a:prstGeom>
+        </p:spPr>
+        <p:txBody>
+          <a:bodyPr wrap="none">
+            <a:spAutoFit/>
+          </a:bodyPr>
+          <a:lstStyle/>
+          <a:p>
+            <a:r>
+              <a:rPr lang="en-US" sz="2400" b="1" dirty="0" smtClean="0"/>
+              <a:t>T1- 3 snapshots</a:t>
+            </a:r>
+            <a:endParaRPr lang="en-US" sz="2400" b="1" dirty="0"/>
+          </a:p>
+        </p:txBody>
+      </p:sp>
+    </p:spTree>
+    <p:extLst>
+      <p:ext uri="{BB962C8B-B14F-4D97-AF65-F5344CB8AC3E}">
+        <p14:creationId xmlns:p14="http://schemas.microsoft.com/office/powerpoint/2010/main" val="1088856130"/>
+      </p:ext>
+    </p:extLst>
+  </p:cSld>
+  <p:clrMapOvr>
+    <a:masterClrMapping/>
+  </p:clrMapOvr>
+</p:sld>
+</file>
+
+<file path=ppt/slides/slide5.xml><?xml version="1.0" encoding="utf-8"?>
+<p:sld xmlns:a="http://schemas.openxmlformats.org/drawingml/2006/main" xmlns:r="http://schemas.openxmlformats.org/officeDocument/2006/relationships" xmlns:p="http://schemas.openxmlformats.org/presentationml/2006/main">
+  <p:cSld>
+    <p:spTree>
+      <p:nvGrpSpPr>
+        <p:cNvPr id="1" name=""/>
+        <p:cNvGrpSpPr/>
+        <p:nvPr/>
+      </p:nvGrpSpPr>
+      <p:grpSpPr>
+        <a:xfrm>
+          <a:off x="0" y="0"/>
+          <a:ext cx="0" cy="0"/>
+          <a:chOff x="0" y="0"/>
+          <a:chExt cx="0" cy="0"/>
+        </a:xfrm>
+      </p:grpSpPr>
       <p:grpSp>
         <p:nvGrpSpPr>
           <p:cNvPr id="4" name="Group 3"/>
@@ -16187,7 +19881,7 @@
 </p:sld>
 </file>
 
-<file path=ppt/slides/slide5.xml><?xml version="1.0" encoding="utf-8"?>
+<file path=ppt/slides/slide6.xml><?xml version="1.0" encoding="utf-8"?>
 <p:sld xmlns:a="http://schemas.openxmlformats.org/drawingml/2006/main" xmlns:r="http://schemas.openxmlformats.org/officeDocument/2006/relationships" xmlns:p="http://schemas.openxmlformats.org/presentationml/2006/main">
   <p:cSld>
     <p:spTree>
@@ -19553,7 +23247,7 @@
 </p:sld>
 </file>
 
-<file path=ppt/slides/slide6.xml><?xml version="1.0" encoding="utf-8"?>
+<file path=ppt/slides/slide7.xml><?xml version="1.0" encoding="utf-8"?>
 <p:sld xmlns:a="http://schemas.openxmlformats.org/drawingml/2006/main" xmlns:r="http://schemas.openxmlformats.org/officeDocument/2006/relationships" xmlns:p="http://schemas.openxmlformats.org/presentationml/2006/main">
   <p:cSld>
     <p:spTree>
@@ -23057,7 +26751,7 @@
 </p:sld>
 </file>
 
-<file path=ppt/slides/slide7.xml><?xml version="1.0" encoding="utf-8"?>
+<file path=ppt/slides/slide8.xml><?xml version="1.0" encoding="utf-8"?>
 <p:sld xmlns:a="http://schemas.openxmlformats.org/drawingml/2006/main" xmlns:r="http://schemas.openxmlformats.org/officeDocument/2006/relationships" xmlns:p="http://schemas.openxmlformats.org/presentationml/2006/main">
   <p:cSld>
     <p:spTree>
@@ -24727,7 +28421,7 @@
 </p:sld>
 </file>
 
-<file path=ppt/slides/slide8.xml><?xml version="1.0" encoding="utf-8"?>
+<file path=ppt/slides/slide9.xml><?xml version="1.0" encoding="utf-8"?>
 <p:sld xmlns:a="http://schemas.openxmlformats.org/drawingml/2006/main" xmlns:r="http://schemas.openxmlformats.org/officeDocument/2006/relationships" xmlns:p="http://schemas.openxmlformats.org/presentationml/2006/main">
   <p:cSld>
     <p:spTree>
@@ -26190,808 +29884,6 @@
 </p:sld>
 </file>
 
-<file path=ppt/slides/slide9.xml><?xml version="1.0" encoding="utf-8"?>
-<p:sld xmlns:a="http://schemas.openxmlformats.org/drawingml/2006/main" xmlns:r="http://schemas.openxmlformats.org/officeDocument/2006/relationships" xmlns:p="http://schemas.openxmlformats.org/presentationml/2006/main">
-  <p:cSld>
-    <p:bg>
-      <p:bgRef idx="1001">
-        <a:schemeClr val="bg1"/>
-      </p:bgRef>
-    </p:bg>
-    <p:spTree>
-      <p:nvGrpSpPr>
-        <p:cNvPr id="1" name=""/>
-        <p:cNvGrpSpPr/>
-        <p:nvPr/>
-      </p:nvGrpSpPr>
-      <p:grpSpPr>
-        <a:xfrm>
-          <a:off x="0" y="0"/>
-          <a:ext cx="0" cy="0"/>
-          <a:chOff x="0" y="0"/>
-          <a:chExt cx="0" cy="0"/>
-        </a:xfrm>
-      </p:grpSpPr>
-      <p:sp>
-        <p:nvSpPr>
-          <p:cNvPr id="2" name="Rectangle 1"/>
-          <p:cNvSpPr/>
-          <p:nvPr/>
-        </p:nvSpPr>
-        <p:spPr>
-          <a:xfrm>
-            <a:off x="651944" y="560442"/>
-            <a:ext cx="2769586" cy="3115087"/>
-          </a:xfrm>
-          <a:prstGeom prst="rect">
-            <a:avLst/>
-          </a:prstGeom>
-          <a:solidFill>
-            <a:schemeClr val="bg2"/>
-          </a:solidFill>
-          <a:ln>
-            <a:solidFill>
-              <a:schemeClr val="tx1"/>
-            </a:solidFill>
-            <a:tailEnd type="none"/>
-          </a:ln>
-          <a:effectLst/>
-        </p:spPr>
-        <p:style>
-          <a:lnRef idx="2">
-            <a:schemeClr val="accent1"/>
-          </a:lnRef>
-          <a:fillRef idx="0">
-            <a:schemeClr val="accent1"/>
-          </a:fillRef>
-          <a:effectRef idx="1">
-            <a:schemeClr val="accent1"/>
-          </a:effectRef>
-          <a:fontRef idx="minor">
-            <a:schemeClr val="tx1"/>
-          </a:fontRef>
-        </p:style>
-        <p:txBody>
-          <a:bodyPr rtlCol="0" anchor="t"/>
-          <a:lstStyle/>
-          <a:p>
-            <a:r>
-              <a:rPr lang="en-US" dirty="0" smtClean="0"/>
-              <a:t>Portal</a:t>
-            </a:r>
-            <a:endParaRPr lang="en-US" dirty="0"/>
-          </a:p>
-        </p:txBody>
-      </p:sp>
-      <p:sp>
-        <p:nvSpPr>
-          <p:cNvPr id="31" name="Rectangle 30"/>
-          <p:cNvSpPr/>
-          <p:nvPr/>
-        </p:nvSpPr>
-        <p:spPr>
-          <a:xfrm>
-            <a:off x="799733" y="989562"/>
-            <a:ext cx="2469762" cy="399967"/>
-          </a:xfrm>
-          <a:prstGeom prst="rect">
-            <a:avLst/>
-          </a:prstGeom>
-          <a:ln>
-            <a:prstDash val="solid"/>
-          </a:ln>
-        </p:spPr>
-        <p:style>
-          <a:lnRef idx="1">
-            <a:schemeClr val="accent1"/>
-          </a:lnRef>
-          <a:fillRef idx="3">
-            <a:schemeClr val="accent1"/>
-          </a:fillRef>
-          <a:effectRef idx="2">
-            <a:schemeClr val="accent1"/>
-          </a:effectRef>
-          <a:fontRef idx="minor">
-            <a:schemeClr val="lt1"/>
-          </a:fontRef>
-        </p:style>
-        <p:txBody>
-          <a:bodyPr rtlCol="0" anchor="ctr"/>
-          <a:lstStyle/>
-          <a:p>
-            <a:pPr algn="ctr"/>
-            <a:r>
-              <a:rPr lang="en-US" dirty="0" smtClean="0">
-                <a:solidFill>
-                  <a:schemeClr val="tx1"/>
-                </a:solidFill>
-              </a:rPr>
-              <a:t>Interactive Shell</a:t>
-            </a:r>
-            <a:endParaRPr lang="en-US" dirty="0">
-              <a:solidFill>
-                <a:schemeClr val="tx1"/>
-              </a:solidFill>
-            </a:endParaRPr>
-          </a:p>
-        </p:txBody>
-      </p:sp>
-      <p:sp>
-        <p:nvSpPr>
-          <p:cNvPr id="32" name="Rectangle 31"/>
-          <p:cNvSpPr/>
-          <p:nvPr/>
-        </p:nvSpPr>
-        <p:spPr>
-          <a:xfrm>
-            <a:off x="799733" y="1425852"/>
-            <a:ext cx="2469762" cy="396972"/>
-          </a:xfrm>
-          <a:prstGeom prst="rect">
-            <a:avLst/>
-          </a:prstGeom>
-        </p:spPr>
-        <p:style>
-          <a:lnRef idx="1">
-            <a:schemeClr val="accent1"/>
-          </a:lnRef>
-          <a:fillRef idx="3">
-            <a:schemeClr val="accent1"/>
-          </a:fillRef>
-          <a:effectRef idx="2">
-            <a:schemeClr val="accent1"/>
-          </a:effectRef>
-          <a:fontRef idx="minor">
-            <a:schemeClr val="lt1"/>
-          </a:fontRef>
-        </p:style>
-        <p:txBody>
-          <a:bodyPr rtlCol="0" anchor="ctr"/>
-          <a:lstStyle/>
-          <a:p>
-            <a:pPr algn="ctr"/>
-            <a:r>
-              <a:rPr lang="en-US" dirty="0" smtClean="0">
-                <a:solidFill>
-                  <a:schemeClr val="tx1"/>
-                </a:solidFill>
-              </a:rPr>
-              <a:t>Query Parser</a:t>
-            </a:r>
-            <a:endParaRPr lang="en-US" dirty="0">
-              <a:solidFill>
-                <a:schemeClr val="tx1"/>
-              </a:solidFill>
-            </a:endParaRPr>
-          </a:p>
-        </p:txBody>
-      </p:sp>
-      <p:sp>
-        <p:nvSpPr>
-          <p:cNvPr id="33" name="Rectangle 32"/>
-          <p:cNvSpPr/>
-          <p:nvPr/>
-        </p:nvSpPr>
-        <p:spPr>
-          <a:xfrm>
-            <a:off x="799733" y="1849433"/>
-            <a:ext cx="2469762" cy="600635"/>
-          </a:xfrm>
-          <a:prstGeom prst="rect">
-            <a:avLst/>
-          </a:prstGeom>
-          <a:ln>
-            <a:solidFill>
-              <a:srgbClr val="4F81BD"/>
-            </a:solidFill>
-            <a:prstDash val="solid"/>
-          </a:ln>
-        </p:spPr>
-        <p:style>
-          <a:lnRef idx="1">
-            <a:schemeClr val="accent1"/>
-          </a:lnRef>
-          <a:fillRef idx="3">
-            <a:schemeClr val="accent1"/>
-          </a:fillRef>
-          <a:effectRef idx="2">
-            <a:schemeClr val="accent1"/>
-          </a:effectRef>
-          <a:fontRef idx="minor">
-            <a:schemeClr val="lt1"/>
-          </a:fontRef>
-        </p:style>
-        <p:txBody>
-          <a:bodyPr rtlCol="0" anchor="ctr"/>
-          <a:lstStyle/>
-          <a:p>
-            <a:pPr algn="ctr"/>
-            <a:r>
-              <a:rPr lang="en-US" dirty="0" smtClean="0">
-                <a:solidFill>
-                  <a:schemeClr val="tx1"/>
-                </a:solidFill>
-              </a:rPr>
-              <a:t>Portal Runtime (</a:t>
-            </a:r>
-            <a:r>
-              <a:rPr lang="en-US" sz="1600" dirty="0" smtClean="0">
-                <a:solidFill>
-                  <a:schemeClr val="tx1"/>
-                </a:solidFill>
-              </a:rPr>
-              <a:t>optimizer, operators, </a:t>
-            </a:r>
-            <a:r>
-              <a:rPr lang="en-US" sz="1600" dirty="0" err="1" smtClean="0">
-                <a:solidFill>
-                  <a:schemeClr val="tx1"/>
-                </a:solidFill>
-              </a:rPr>
-              <a:t>etc</a:t>
-            </a:r>
-            <a:r>
-              <a:rPr lang="en-US" sz="1600" dirty="0" smtClean="0">
-                <a:solidFill>
-                  <a:schemeClr val="tx1"/>
-                </a:solidFill>
-              </a:rPr>
-              <a:t>)</a:t>
-            </a:r>
-            <a:endParaRPr lang="en-US" sz="1600" dirty="0">
-              <a:solidFill>
-                <a:schemeClr val="tx1"/>
-              </a:solidFill>
-            </a:endParaRPr>
-          </a:p>
-        </p:txBody>
-      </p:sp>
-      <p:sp>
-        <p:nvSpPr>
-          <p:cNvPr id="34" name="Rectangle 33"/>
-          <p:cNvSpPr/>
-          <p:nvPr/>
-        </p:nvSpPr>
-        <p:spPr>
-          <a:xfrm>
-            <a:off x="799733" y="2525058"/>
-            <a:ext cx="2469762" cy="1075765"/>
-          </a:xfrm>
-          <a:prstGeom prst="rect">
-            <a:avLst/>
-          </a:prstGeom>
-          <a:solidFill>
-            <a:srgbClr val="00B601"/>
-          </a:solidFill>
-          <a:ln>
-            <a:solidFill>
-              <a:schemeClr val="tx1"/>
-            </a:solidFill>
-            <a:tailEnd type="none"/>
-          </a:ln>
-          <a:effectLst/>
-        </p:spPr>
-        <p:style>
-          <a:lnRef idx="2">
-            <a:schemeClr val="accent1"/>
-          </a:lnRef>
-          <a:fillRef idx="0">
-            <a:schemeClr val="accent1"/>
-          </a:fillRef>
-          <a:effectRef idx="1">
-            <a:schemeClr val="accent1"/>
-          </a:effectRef>
-          <a:fontRef idx="minor">
-            <a:schemeClr val="tx1"/>
-          </a:fontRef>
-        </p:style>
-        <p:txBody>
-          <a:bodyPr rtlCol="0" anchor="b"/>
-          <a:lstStyle/>
-          <a:p>
-            <a:pPr algn="ctr"/>
-            <a:r>
-              <a:rPr lang="en-US" dirty="0">
-                <a:solidFill>
-                  <a:schemeClr val="tx1"/>
-                </a:solidFill>
-              </a:rPr>
-              <a:t>Spark Runtime</a:t>
-            </a:r>
-          </a:p>
-        </p:txBody>
-      </p:sp>
-      <p:sp>
-        <p:nvSpPr>
-          <p:cNvPr id="16" name="Rectangle 15"/>
-          <p:cNvSpPr/>
-          <p:nvPr/>
-        </p:nvSpPr>
-        <p:spPr>
-          <a:xfrm>
-            <a:off x="802723" y="2528048"/>
-            <a:ext cx="1707394" cy="729128"/>
-          </a:xfrm>
-          <a:prstGeom prst="rect">
-            <a:avLst/>
-          </a:prstGeom>
-          <a:solidFill>
-            <a:srgbClr val="00B601"/>
-          </a:solidFill>
-          <a:ln>
-            <a:solidFill>
-              <a:schemeClr val="tx1"/>
-            </a:solidFill>
-            <a:tailEnd type="none"/>
-          </a:ln>
-          <a:effectLst/>
-        </p:spPr>
-        <p:style>
-          <a:lnRef idx="2">
-            <a:schemeClr val="accent1"/>
-          </a:lnRef>
-          <a:fillRef idx="0">
-            <a:schemeClr val="accent1"/>
-          </a:fillRef>
-          <a:effectRef idx="1">
-            <a:schemeClr val="accent1"/>
-          </a:effectRef>
-          <a:fontRef idx="minor">
-            <a:schemeClr val="tx1"/>
-          </a:fontRef>
-        </p:style>
-        <p:txBody>
-          <a:bodyPr rtlCol="0" anchor="b"/>
-          <a:lstStyle/>
-          <a:p>
-            <a:pPr algn="ctr"/>
-            <a:r>
-              <a:rPr lang="en-US" dirty="0" err="1" smtClean="0">
-                <a:solidFill>
-                  <a:schemeClr val="tx1"/>
-                </a:solidFill>
-              </a:rPr>
-              <a:t>GraphX</a:t>
-            </a:r>
-            <a:endParaRPr lang="en-US" dirty="0">
-              <a:solidFill>
-                <a:schemeClr val="tx1"/>
-              </a:solidFill>
-            </a:endParaRPr>
-          </a:p>
-        </p:txBody>
-      </p:sp>
-      <p:sp>
-        <p:nvSpPr>
-          <p:cNvPr id="15" name="Rectangle 14"/>
-          <p:cNvSpPr/>
-          <p:nvPr/>
-        </p:nvSpPr>
-        <p:spPr>
-          <a:xfrm>
-            <a:off x="1023849" y="2539715"/>
-            <a:ext cx="1904620" cy="314050"/>
-          </a:xfrm>
-          <a:prstGeom prst="rect">
-            <a:avLst/>
-          </a:prstGeom>
-          <a:ln>
-            <a:solidFill>
-              <a:srgbClr val="4F81BD"/>
-            </a:solidFill>
-            <a:prstDash val="solid"/>
-          </a:ln>
-        </p:spPr>
-        <p:style>
-          <a:lnRef idx="1">
-            <a:schemeClr val="accent1"/>
-          </a:lnRef>
-          <a:fillRef idx="3">
-            <a:schemeClr val="accent1"/>
-          </a:fillRef>
-          <a:effectRef idx="2">
-            <a:schemeClr val="accent1"/>
-          </a:effectRef>
-          <a:fontRef idx="minor">
-            <a:schemeClr val="lt1"/>
-          </a:fontRef>
-        </p:style>
-        <p:txBody>
-          <a:bodyPr rtlCol="0" anchor="ctr"/>
-          <a:lstStyle/>
-          <a:p>
-            <a:pPr algn="ctr"/>
-            <a:r>
-              <a:rPr lang="en-US" sz="1600" dirty="0" smtClean="0">
-                <a:solidFill>
-                  <a:schemeClr val="tx1"/>
-                </a:solidFill>
-              </a:rPr>
-              <a:t>Data Structures</a:t>
-            </a:r>
-            <a:endParaRPr lang="en-US" sz="1600" dirty="0">
-              <a:solidFill>
-                <a:schemeClr val="tx1"/>
-              </a:solidFill>
-            </a:endParaRPr>
-          </a:p>
-        </p:txBody>
-      </p:sp>
-      <p:sp>
-        <p:nvSpPr>
-          <p:cNvPr id="10" name="Rectangle 9"/>
-          <p:cNvSpPr/>
-          <p:nvPr/>
-        </p:nvSpPr>
-        <p:spPr>
-          <a:xfrm>
-            <a:off x="3716250" y="560441"/>
-            <a:ext cx="2627265" cy="1288991"/>
-          </a:xfrm>
-          <a:prstGeom prst="rect">
-            <a:avLst/>
-          </a:prstGeom>
-          <a:solidFill>
-            <a:schemeClr val="bg2"/>
-          </a:solidFill>
-          <a:ln>
-            <a:solidFill>
-              <a:schemeClr val="tx1"/>
-            </a:solidFill>
-            <a:tailEnd type="none"/>
-          </a:ln>
-          <a:effectLst/>
-        </p:spPr>
-        <p:style>
-          <a:lnRef idx="2">
-            <a:schemeClr val="accent1"/>
-          </a:lnRef>
-          <a:fillRef idx="0">
-            <a:schemeClr val="accent1"/>
-          </a:fillRef>
-          <a:effectRef idx="1">
-            <a:schemeClr val="accent1"/>
-          </a:effectRef>
-          <a:fontRef idx="minor">
-            <a:schemeClr val="tx1"/>
-          </a:fontRef>
-        </p:style>
-        <p:txBody>
-          <a:bodyPr rtlCol="0" anchor="t"/>
-          <a:lstStyle/>
-          <a:p>
-            <a:r>
-              <a:rPr lang="en-US" dirty="0" smtClean="0"/>
-              <a:t>Worker</a:t>
-            </a:r>
-            <a:endParaRPr lang="en-US" dirty="0"/>
-          </a:p>
-        </p:txBody>
-      </p:sp>
-      <p:sp>
-        <p:nvSpPr>
-          <p:cNvPr id="11" name="Rectangle 10"/>
-          <p:cNvSpPr/>
-          <p:nvPr/>
-        </p:nvSpPr>
-        <p:spPr>
-          <a:xfrm>
-            <a:off x="3790956" y="929798"/>
-            <a:ext cx="2469762" cy="365601"/>
-          </a:xfrm>
-          <a:prstGeom prst="rect">
-            <a:avLst/>
-          </a:prstGeom>
-          <a:solidFill>
-            <a:srgbClr val="00B601"/>
-          </a:solidFill>
-          <a:ln>
-            <a:solidFill>
-              <a:schemeClr val="tx1"/>
-            </a:solidFill>
-            <a:tailEnd type="none"/>
-          </a:ln>
-          <a:effectLst/>
-        </p:spPr>
-        <p:style>
-          <a:lnRef idx="2">
-            <a:schemeClr val="accent1"/>
-          </a:lnRef>
-          <a:fillRef idx="0">
-            <a:schemeClr val="accent1"/>
-          </a:fillRef>
-          <a:effectRef idx="1">
-            <a:schemeClr val="accent1"/>
-          </a:effectRef>
-          <a:fontRef idx="minor">
-            <a:schemeClr val="tx1"/>
-          </a:fontRef>
-        </p:style>
-        <p:txBody>
-          <a:bodyPr rtlCol="0" anchor="b"/>
-          <a:lstStyle/>
-          <a:p>
-            <a:pPr algn="ctr"/>
-            <a:r>
-              <a:rPr lang="en-US" dirty="0">
-                <a:solidFill>
-                  <a:schemeClr val="tx1"/>
-                </a:solidFill>
-              </a:rPr>
-              <a:t>Spark Runtime</a:t>
-            </a:r>
-          </a:p>
-        </p:txBody>
-      </p:sp>
-      <p:sp>
-        <p:nvSpPr>
-          <p:cNvPr id="12" name="Rectangle 11"/>
-          <p:cNvSpPr/>
-          <p:nvPr/>
-        </p:nvSpPr>
-        <p:spPr>
-          <a:xfrm>
-            <a:off x="3790956" y="1339703"/>
-            <a:ext cx="2469762" cy="365601"/>
-          </a:xfrm>
-          <a:prstGeom prst="rect">
-            <a:avLst/>
-          </a:prstGeom>
-          <a:solidFill>
-            <a:srgbClr val="00B601"/>
-          </a:solidFill>
-          <a:ln>
-            <a:solidFill>
-              <a:schemeClr val="tx1"/>
-            </a:solidFill>
-            <a:tailEnd type="none"/>
-          </a:ln>
-          <a:effectLst/>
-        </p:spPr>
-        <p:style>
-          <a:lnRef idx="2">
-            <a:schemeClr val="accent1"/>
-          </a:lnRef>
-          <a:fillRef idx="0">
-            <a:schemeClr val="accent1"/>
-          </a:fillRef>
-          <a:effectRef idx="1">
-            <a:schemeClr val="accent1"/>
-          </a:effectRef>
-          <a:fontRef idx="minor">
-            <a:schemeClr val="tx1"/>
-          </a:fontRef>
-        </p:style>
-        <p:txBody>
-          <a:bodyPr rtlCol="0" anchor="b"/>
-          <a:lstStyle/>
-          <a:p>
-            <a:pPr algn="ctr"/>
-            <a:r>
-              <a:rPr lang="en-US" dirty="0" smtClean="0">
-                <a:solidFill>
-                  <a:schemeClr val="tx1"/>
-                </a:solidFill>
-              </a:rPr>
-              <a:t>HDFS</a:t>
-            </a:r>
-            <a:endParaRPr lang="en-US" dirty="0">
-              <a:solidFill>
-                <a:schemeClr val="tx1"/>
-              </a:solidFill>
-            </a:endParaRPr>
-          </a:p>
-        </p:txBody>
-      </p:sp>
-      <p:sp>
-        <p:nvSpPr>
-          <p:cNvPr id="13" name="Rectangle 12"/>
-          <p:cNvSpPr/>
-          <p:nvPr/>
-        </p:nvSpPr>
-        <p:spPr>
-          <a:xfrm>
-            <a:off x="3716250" y="1938003"/>
-            <a:ext cx="2630256" cy="1288991"/>
-          </a:xfrm>
-          <a:prstGeom prst="rect">
-            <a:avLst/>
-          </a:prstGeom>
-          <a:solidFill>
-            <a:schemeClr val="bg2"/>
-          </a:solidFill>
-          <a:ln>
-            <a:solidFill>
-              <a:schemeClr val="tx1"/>
-            </a:solidFill>
-            <a:tailEnd type="none"/>
-          </a:ln>
-          <a:effectLst/>
-        </p:spPr>
-        <p:style>
-          <a:lnRef idx="2">
-            <a:schemeClr val="accent1"/>
-          </a:lnRef>
-          <a:fillRef idx="0">
-            <a:schemeClr val="accent1"/>
-          </a:fillRef>
-          <a:effectRef idx="1">
-            <a:schemeClr val="accent1"/>
-          </a:effectRef>
-          <a:fontRef idx="minor">
-            <a:schemeClr val="tx1"/>
-          </a:fontRef>
-        </p:style>
-        <p:txBody>
-          <a:bodyPr rtlCol="0" anchor="t"/>
-          <a:lstStyle/>
-          <a:p>
-            <a:r>
-              <a:rPr lang="en-US" dirty="0" smtClean="0"/>
-              <a:t>Worker</a:t>
-            </a:r>
-            <a:endParaRPr lang="en-US" dirty="0"/>
-          </a:p>
-        </p:txBody>
-      </p:sp>
-      <p:sp>
-        <p:nvSpPr>
-          <p:cNvPr id="14" name="Rectangle 13"/>
-          <p:cNvSpPr/>
-          <p:nvPr/>
-        </p:nvSpPr>
-        <p:spPr>
-          <a:xfrm>
-            <a:off x="3793946" y="2307360"/>
-            <a:ext cx="2469762" cy="365601"/>
-          </a:xfrm>
-          <a:prstGeom prst="rect">
-            <a:avLst/>
-          </a:prstGeom>
-          <a:solidFill>
-            <a:srgbClr val="00B601"/>
-          </a:solidFill>
-          <a:ln>
-            <a:solidFill>
-              <a:schemeClr val="tx1"/>
-            </a:solidFill>
-            <a:tailEnd type="none"/>
-          </a:ln>
-          <a:effectLst/>
-        </p:spPr>
-        <p:style>
-          <a:lnRef idx="2">
-            <a:schemeClr val="accent1"/>
-          </a:lnRef>
-          <a:fillRef idx="0">
-            <a:schemeClr val="accent1"/>
-          </a:fillRef>
-          <a:effectRef idx="1">
-            <a:schemeClr val="accent1"/>
-          </a:effectRef>
-          <a:fontRef idx="minor">
-            <a:schemeClr val="tx1"/>
-          </a:fontRef>
-        </p:style>
-        <p:txBody>
-          <a:bodyPr rtlCol="0" anchor="b"/>
-          <a:lstStyle/>
-          <a:p>
-            <a:pPr algn="ctr"/>
-            <a:r>
-              <a:rPr lang="en-US" dirty="0">
-                <a:solidFill>
-                  <a:schemeClr val="tx1"/>
-                </a:solidFill>
-              </a:rPr>
-              <a:t>Spark Runtime</a:t>
-            </a:r>
-          </a:p>
-        </p:txBody>
-      </p:sp>
-      <p:sp>
-        <p:nvSpPr>
-          <p:cNvPr id="17" name="Rectangle 16"/>
-          <p:cNvSpPr/>
-          <p:nvPr/>
-        </p:nvSpPr>
-        <p:spPr>
-          <a:xfrm>
-            <a:off x="3793946" y="2717265"/>
-            <a:ext cx="2469762" cy="365601"/>
-          </a:xfrm>
-          <a:prstGeom prst="rect">
-            <a:avLst/>
-          </a:prstGeom>
-          <a:solidFill>
-            <a:srgbClr val="00B601"/>
-          </a:solidFill>
-          <a:ln>
-            <a:solidFill>
-              <a:schemeClr val="tx1"/>
-            </a:solidFill>
-            <a:tailEnd type="none"/>
-          </a:ln>
-          <a:effectLst/>
-        </p:spPr>
-        <p:style>
-          <a:lnRef idx="2">
-            <a:schemeClr val="accent1"/>
-          </a:lnRef>
-          <a:fillRef idx="0">
-            <a:schemeClr val="accent1"/>
-          </a:fillRef>
-          <a:effectRef idx="1">
-            <a:schemeClr val="accent1"/>
-          </a:effectRef>
-          <a:fontRef idx="minor">
-            <a:schemeClr val="tx1"/>
-          </a:fontRef>
-        </p:style>
-        <p:txBody>
-          <a:bodyPr rtlCol="0" anchor="b"/>
-          <a:lstStyle/>
-          <a:p>
-            <a:pPr algn="ctr"/>
-            <a:r>
-              <a:rPr lang="en-US" dirty="0" smtClean="0">
-                <a:solidFill>
-                  <a:schemeClr val="tx1"/>
-                </a:solidFill>
-              </a:rPr>
-              <a:t>HDFS</a:t>
-            </a:r>
-            <a:endParaRPr lang="en-US" dirty="0">
-              <a:solidFill>
-                <a:schemeClr val="tx1"/>
-              </a:solidFill>
-            </a:endParaRPr>
-          </a:p>
-        </p:txBody>
-      </p:sp>
-      <p:sp>
-        <p:nvSpPr>
-          <p:cNvPr id="3" name="TextBox 2"/>
-          <p:cNvSpPr txBox="1"/>
-          <p:nvPr/>
-        </p:nvSpPr>
-        <p:spPr>
-          <a:xfrm>
-            <a:off x="4721412" y="3107766"/>
-            <a:ext cx="467997" cy="584776"/>
-          </a:xfrm>
-          <a:prstGeom prst="rect">
-            <a:avLst/>
-          </a:prstGeom>
-          <a:noFill/>
-        </p:spPr>
-        <p:txBody>
-          <a:bodyPr wrap="none" rtlCol="0">
-            <a:spAutoFit/>
-          </a:bodyPr>
-          <a:lstStyle/>
-          <a:p>
-            <a:r>
-              <a:rPr lang="en-US" sz="3200" dirty="0" smtClean="0"/>
-              <a:t>…</a:t>
-            </a:r>
-            <a:endParaRPr lang="en-US" sz="3200" dirty="0"/>
-          </a:p>
-        </p:txBody>
-      </p:sp>
-    </p:spTree>
-    <p:extLst>
-      <p:ext uri="{BB962C8B-B14F-4D97-AF65-F5344CB8AC3E}">
-        <p14:creationId xmlns:p14="http://schemas.microsoft.com/office/powerpoint/2010/main" val="4239985456"/>
-      </p:ext>
-    </p:extLst>
-  </p:cSld>
-  <p:clrMapOvr>
-    <a:overrideClrMapping bg1="lt1" tx1="dk1" bg2="lt2" tx2="dk2" accent1="accent1" accent2="accent2" accent3="accent3" accent4="accent4" accent5="accent5" accent6="accent6" hlink="hlink" folHlink="folHlink"/>
-  </p:clrMapOvr>
-</p:sld>
-</file>
-
 <file path=ppt/theme/theme1.xml><?xml version="1.0" encoding="utf-8"?>
 <a:theme xmlns:a="http://schemas.openxmlformats.org/drawingml/2006/main" name="Office Theme">
   <a:themeElements>

</xml_diff>

<commit_message>
formatting + new optimization section
</commit_message>
<xml_diff>
--- a/paper/sigmod2016/figs/figures.pptx
+++ b/paper/sigmod2016/figs/figures.pptx
@@ -297,7 +297,7 @@
           <a:p>
             <a:fld id="{2A3C5F88-9950-2441-8A51-A5268CD91903}" type="datetimeFigureOut">
               <a:rPr lang="en-US" smtClean="0"/>
-              <a:t>11/12/15</a:t>
+              <a:t>11/18/15</a:t>
             </a:fld>
             <a:endParaRPr lang="en-US"/>
           </a:p>
@@ -467,7 +467,7 @@
           <a:p>
             <a:fld id="{2A3C5F88-9950-2441-8A51-A5268CD91903}" type="datetimeFigureOut">
               <a:rPr lang="en-US" smtClean="0"/>
-              <a:t>11/12/15</a:t>
+              <a:t>11/18/15</a:t>
             </a:fld>
             <a:endParaRPr lang="en-US"/>
           </a:p>
@@ -647,7 +647,7 @@
           <a:p>
             <a:fld id="{2A3C5F88-9950-2441-8A51-A5268CD91903}" type="datetimeFigureOut">
               <a:rPr lang="en-US" smtClean="0"/>
-              <a:t>11/12/15</a:t>
+              <a:t>11/18/15</a:t>
             </a:fld>
             <a:endParaRPr lang="en-US"/>
           </a:p>
@@ -817,7 +817,7 @@
           <a:p>
             <a:fld id="{2A3C5F88-9950-2441-8A51-A5268CD91903}" type="datetimeFigureOut">
               <a:rPr lang="en-US" smtClean="0"/>
-              <a:t>11/12/15</a:t>
+              <a:t>11/18/15</a:t>
             </a:fld>
             <a:endParaRPr lang="en-US"/>
           </a:p>
@@ -1063,7 +1063,7 @@
           <a:p>
             <a:fld id="{2A3C5F88-9950-2441-8A51-A5268CD91903}" type="datetimeFigureOut">
               <a:rPr lang="en-US" smtClean="0"/>
-              <a:t>11/12/15</a:t>
+              <a:t>11/18/15</a:t>
             </a:fld>
             <a:endParaRPr lang="en-US"/>
           </a:p>
@@ -1351,7 +1351,7 @@
           <a:p>
             <a:fld id="{2A3C5F88-9950-2441-8A51-A5268CD91903}" type="datetimeFigureOut">
               <a:rPr lang="en-US" smtClean="0"/>
-              <a:t>11/12/15</a:t>
+              <a:t>11/18/15</a:t>
             </a:fld>
             <a:endParaRPr lang="en-US"/>
           </a:p>
@@ -1773,7 +1773,7 @@
           <a:p>
             <a:fld id="{2A3C5F88-9950-2441-8A51-A5268CD91903}" type="datetimeFigureOut">
               <a:rPr lang="en-US" smtClean="0"/>
-              <a:t>11/12/15</a:t>
+              <a:t>11/18/15</a:t>
             </a:fld>
             <a:endParaRPr lang="en-US"/>
           </a:p>
@@ -1891,7 +1891,7 @@
           <a:p>
             <a:fld id="{2A3C5F88-9950-2441-8A51-A5268CD91903}" type="datetimeFigureOut">
               <a:rPr lang="en-US" smtClean="0"/>
-              <a:t>11/12/15</a:t>
+              <a:t>11/18/15</a:t>
             </a:fld>
             <a:endParaRPr lang="en-US"/>
           </a:p>
@@ -1986,7 +1986,7 @@
           <a:p>
             <a:fld id="{2A3C5F88-9950-2441-8A51-A5268CD91903}" type="datetimeFigureOut">
               <a:rPr lang="en-US" smtClean="0"/>
-              <a:t>11/12/15</a:t>
+              <a:t>11/18/15</a:t>
             </a:fld>
             <a:endParaRPr lang="en-US"/>
           </a:p>
@@ -2263,7 +2263,7 @@
           <a:p>
             <a:fld id="{2A3C5F88-9950-2441-8A51-A5268CD91903}" type="datetimeFigureOut">
               <a:rPr lang="en-US" smtClean="0"/>
-              <a:t>11/12/15</a:t>
+              <a:t>11/18/15</a:t>
             </a:fld>
             <a:endParaRPr lang="en-US"/>
           </a:p>
@@ -2516,7 +2516,7 @@
           <a:p>
             <a:fld id="{2A3C5F88-9950-2441-8A51-A5268CD91903}" type="datetimeFigureOut">
               <a:rPr lang="en-US" smtClean="0"/>
-              <a:t>11/12/15</a:t>
+              <a:t>11/18/15</a:t>
             </a:fld>
             <a:endParaRPr lang="en-US"/>
           </a:p>
@@ -2729,7 +2729,7 @@
           <a:p>
             <a:fld id="{2A3C5F88-9950-2441-8A51-A5268CD91903}" type="datetimeFigureOut">
               <a:rPr lang="en-US" smtClean="0"/>
-              <a:t>11/12/15</a:t>
+              <a:t>11/18/15</a:t>
             </a:fld>
             <a:endParaRPr lang="en-US"/>
           </a:p>
@@ -14992,11 +14992,7 @@
           <a:p>
             <a:r>
               <a:rPr lang="en-US" dirty="0" smtClean="0"/>
-              <a:t>[</a:t>
-            </a:r>
-            <a:r>
-              <a:rPr lang="en-US" dirty="0" smtClean="0"/>
-              <a:t>2011, 2012)</a:t>
+              <a:t>[2011, 2012)</a:t>
             </a:r>
             <a:endParaRPr lang="en-US" dirty="0"/>
           </a:p>
@@ -15959,11 +15955,7 @@
           <a:p>
             <a:r>
               <a:rPr lang="en-US" dirty="0" smtClean="0"/>
-              <a:t>[</a:t>
-            </a:r>
-            <a:r>
-              <a:rPr lang="en-US" dirty="0" smtClean="0"/>
-              <a:t>2012, 2013)</a:t>
+              <a:t>[2012, 2013)</a:t>
             </a:r>
             <a:endParaRPr lang="en-US" dirty="0"/>
           </a:p>
@@ -16149,11 +16141,7 @@
                       <a:pPr algn="r"/>
                       <a:r>
                         <a:rPr lang="en-US" sz="1400" dirty="0" smtClean="0"/>
-                        <a:t>$</a:t>
-                      </a:r>
-                      <a:r>
-                        <a:rPr lang="en-US" sz="1400" dirty="0" smtClean="0"/>
-                        <a:t>155K</a:t>
+                        <a:t>$155K</a:t>
                       </a:r>
                       <a:endParaRPr lang="en-US" sz="1400" dirty="0"/>
                     </a:p>
@@ -16304,11 +16292,7 @@
                       <a:pPr algn="r"/>
                       <a:r>
                         <a:rPr lang="en-US" sz="1400" dirty="0" smtClean="0"/>
-                        <a:t>$</a:t>
-                      </a:r>
-                      <a:r>
-                        <a:rPr lang="en-US" sz="1400" dirty="0" smtClean="0"/>
-                        <a:t>80K</a:t>
+                        <a:t>$80K</a:t>
                       </a:r>
                       <a:endParaRPr lang="en-US" sz="1400" dirty="0"/>
                     </a:p>
@@ -19906,45 +19890,8 @@
         </p:nvCxnSpPr>
         <p:spPr>
           <a:xfrm>
-            <a:off x="3176243" y="3060085"/>
-            <a:ext cx="0" cy="2267306"/>
-          </a:xfrm>
-          <a:prstGeom prst="line">
-            <a:avLst/>
-          </a:prstGeom>
-          <a:ln>
-            <a:solidFill>
-              <a:schemeClr val="tx1"/>
-            </a:solidFill>
-            <a:prstDash val="dash"/>
-          </a:ln>
-          <a:effectLst/>
-        </p:spPr>
-        <p:style>
-          <a:lnRef idx="2">
-            <a:schemeClr val="accent1"/>
-          </a:lnRef>
-          <a:fillRef idx="0">
-            <a:schemeClr val="accent1"/>
-          </a:fillRef>
-          <a:effectRef idx="1">
-            <a:schemeClr val="accent1"/>
-          </a:effectRef>
-          <a:fontRef idx="minor">
-            <a:schemeClr val="tx1"/>
-          </a:fontRef>
-        </p:style>
-      </p:cxnSp>
-      <p:cxnSp>
-        <p:nvCxnSpPr>
-          <p:cNvPr id="210" name="Straight Connector 209"/>
-          <p:cNvCxnSpPr/>
-          <p:nvPr/>
-        </p:nvCxnSpPr>
-        <p:spPr>
-          <a:xfrm>
-            <a:off x="752880" y="2797343"/>
-            <a:ext cx="4851748" cy="0"/>
+            <a:off x="4560340" y="322515"/>
+            <a:ext cx="0" cy="2587469"/>
           </a:xfrm>
           <a:prstGeom prst="line">
             <a:avLst/>
@@ -19980,8 +19927,8 @@
         </p:nvCxnSpPr>
         <p:spPr>
           <a:xfrm>
-            <a:off x="3170607" y="318368"/>
-            <a:ext cx="0" cy="2267306"/>
+            <a:off x="2206156" y="322515"/>
+            <a:ext cx="0" cy="2587469"/>
           </a:xfrm>
           <a:prstGeom prst="line">
             <a:avLst/>
@@ -20017,7 +19964,7 @@
         </p:nvGrpSpPr>
         <p:grpSpPr>
           <a:xfrm>
-            <a:off x="752880" y="28594"/>
+            <a:off x="140299" y="312900"/>
             <a:ext cx="1837228" cy="2502330"/>
             <a:chOff x="752880" y="28594"/>
             <a:chExt cx="1837228" cy="2502330"/>
@@ -20836,7 +20783,7 @@
         </p:nvGrpSpPr>
         <p:grpSpPr>
           <a:xfrm>
-            <a:off x="3817203" y="10190"/>
+            <a:off x="2514028" y="312900"/>
             <a:ext cx="1808821" cy="2485123"/>
             <a:chOff x="3817203" y="10190"/>
             <a:chExt cx="1808821" cy="2485123"/>
@@ -21710,7 +21657,7 @@
         </p:nvGrpSpPr>
         <p:grpSpPr>
           <a:xfrm>
-            <a:off x="802683" y="2992069"/>
+            <a:off x="4859350" y="312900"/>
             <a:ext cx="1793437" cy="2448422"/>
             <a:chOff x="6796172" y="63548"/>
             <a:chExt cx="1793437" cy="2448422"/>
@@ -22332,18 +22279,66 @@
           </p:style>
         </p:cxnSp>
       </p:grpSp>
+      <p:sp>
+        <p:nvSpPr>
+          <p:cNvPr id="29" name="TextBox 28"/>
+          <p:cNvSpPr txBox="1"/>
+          <p:nvPr/>
+        </p:nvSpPr>
+        <p:spPr>
+          <a:xfrm>
+            <a:off x="6003364" y="5972729"/>
+            <a:ext cx="2077875" cy="646331"/>
+          </a:xfrm>
+          <a:prstGeom prst="rect">
+            <a:avLst/>
+          </a:prstGeom>
+          <a:noFill/>
+        </p:spPr>
+        <p:txBody>
+          <a:bodyPr wrap="none" rtlCol="0">
+            <a:spAutoFit/>
+          </a:bodyPr>
+          <a:lstStyle/>
+          <a:p>
+            <a:r>
+              <a:rPr lang="en-US" dirty="0" err="1" smtClean="0"/>
+              <a:t>TSelect</a:t>
+            </a:r>
+            <a:r>
+              <a:rPr lang="en-US" dirty="0" smtClean="0"/>
+              <a:t> Any V; Any E</a:t>
+            </a:r>
+          </a:p>
+          <a:p>
+            <a:r>
+              <a:rPr lang="en-US" dirty="0" smtClean="0"/>
+              <a:t>From    T1 </a:t>
+            </a:r>
+            <a:r>
+              <a:rPr lang="en-US" dirty="0" err="1" smtClean="0"/>
+              <a:t>TAnd</a:t>
+            </a:r>
+            <a:r>
+              <a:rPr lang="en-US" dirty="0" smtClean="0"/>
+              <a:t> T2</a:t>
+            </a:r>
+            <a:endParaRPr lang="en-US" dirty="0"/>
+          </a:p>
+        </p:txBody>
+      </p:sp>
       <p:grpSp>
         <p:nvGrpSpPr>
-          <p:cNvPr id="17" name="Group 16"/>
+          <p:cNvPr id="5" name="Group 4"/>
           <p:cNvGrpSpPr/>
           <p:nvPr/>
         </p:nvGrpSpPr>
         <p:grpSpPr>
           <a:xfrm>
-            <a:off x="3873019" y="2872279"/>
-            <a:ext cx="1793437" cy="2597084"/>
-            <a:chOff x="774828" y="2872279"/>
-            <a:chExt cx="1793437" cy="2597084"/>
+            <a:off x="6914525" y="330025"/>
+            <a:ext cx="2068199" cy="2579959"/>
+            <a:chOff x="6914525" y="330025"/>
+            <a:chExt cx="2068199" cy="2579959"/>
           </a:xfrm>
         </p:grpSpPr>
         <p:grpSp>
@@ -22354,7 +22349,7 @@
           </p:nvGrpSpPr>
           <p:grpSpPr>
             <a:xfrm>
-              <a:off x="774828" y="3405964"/>
+              <a:off x="7189287" y="667293"/>
               <a:ext cx="1793437" cy="2063399"/>
               <a:chOff x="774828" y="3405964"/>
               <a:chExt cx="1793437" cy="2063399"/>
@@ -22974,7 +22969,7 @@
           </p:nvSpPr>
           <p:spPr>
             <a:xfrm>
-              <a:off x="954048" y="2872279"/>
+              <a:off x="7368507" y="330025"/>
               <a:ext cx="1371176" cy="369332"/>
             </a:xfrm>
             <a:prstGeom prst="rect">
@@ -23006,7 +23001,7 @@
           </p:nvCxnSpPr>
           <p:spPr>
             <a:xfrm flipV="1">
-              <a:off x="1183176" y="4423692"/>
+              <a:off x="7597635" y="1685021"/>
               <a:ext cx="982753" cy="2297"/>
             </a:xfrm>
             <a:prstGeom prst="straightConnector1">
@@ -23043,7 +23038,7 @@
           </p:nvSpPr>
           <p:spPr>
             <a:xfrm>
-              <a:off x="780840" y="4224747"/>
+              <a:off x="7195299" y="1486076"/>
               <a:ext cx="402336" cy="402483"/>
             </a:xfrm>
             <a:prstGeom prst="ellipse">
@@ -23090,7 +23085,7 @@
           </p:nvCxnSpPr>
           <p:spPr>
             <a:xfrm>
-              <a:off x="982008" y="3827319"/>
+              <a:off x="7396467" y="1088648"/>
               <a:ext cx="0" cy="397428"/>
             </a:xfrm>
             <a:prstGeom prst="straightConnector1">
@@ -23127,7 +23122,7 @@
           </p:nvCxnSpPr>
           <p:spPr>
             <a:xfrm>
-              <a:off x="2367097" y="4624933"/>
+              <a:off x="8781556" y="1886262"/>
               <a:ext cx="6012" cy="439568"/>
             </a:xfrm>
             <a:prstGeom prst="straightConnector1">
@@ -23164,7 +23159,7 @@
           </p:nvSpPr>
           <p:spPr>
             <a:xfrm>
-              <a:off x="830852" y="4216280"/>
+              <a:off x="7245311" y="1477609"/>
               <a:ext cx="273353" cy="369332"/>
             </a:xfrm>
             <a:prstGeom prst="rect">
@@ -23185,55 +23180,44 @@
             </a:p>
           </p:txBody>
         </p:sp>
+        <p:cxnSp>
+          <p:nvCxnSpPr>
+            <p:cNvPr id="105" name="Straight Connector 104"/>
+            <p:cNvCxnSpPr/>
+            <p:nvPr/>
+          </p:nvCxnSpPr>
+          <p:spPr>
+            <a:xfrm>
+              <a:off x="6914525" y="400882"/>
+              <a:ext cx="0" cy="2509102"/>
+            </a:xfrm>
+            <a:prstGeom prst="line">
+              <a:avLst/>
+            </a:prstGeom>
+            <a:ln>
+              <a:solidFill>
+                <a:schemeClr val="tx1"/>
+              </a:solidFill>
+              <a:prstDash val="dash"/>
+            </a:ln>
+            <a:effectLst/>
+          </p:spPr>
+          <p:style>
+            <a:lnRef idx="2">
+              <a:schemeClr val="accent1"/>
+            </a:lnRef>
+            <a:fillRef idx="0">
+              <a:schemeClr val="accent1"/>
+            </a:fillRef>
+            <a:effectRef idx="1">
+              <a:schemeClr val="accent1"/>
+            </a:effectRef>
+            <a:fontRef idx="minor">
+              <a:schemeClr val="tx1"/>
+            </a:fontRef>
+          </p:style>
+        </p:cxnSp>
       </p:grpSp>
-      <p:sp>
-        <p:nvSpPr>
-          <p:cNvPr id="29" name="TextBox 28"/>
-          <p:cNvSpPr txBox="1"/>
-          <p:nvPr/>
-        </p:nvSpPr>
-        <p:spPr>
-          <a:xfrm>
-            <a:off x="6705600" y="2551200"/>
-            <a:ext cx="2077875" cy="646331"/>
-          </a:xfrm>
-          <a:prstGeom prst="rect">
-            <a:avLst/>
-          </a:prstGeom>
-          <a:noFill/>
-        </p:spPr>
-        <p:txBody>
-          <a:bodyPr wrap="none" rtlCol="0">
-            <a:spAutoFit/>
-          </a:bodyPr>
-          <a:lstStyle/>
-          <a:p>
-            <a:r>
-              <a:rPr lang="en-US" dirty="0" err="1" smtClean="0"/>
-              <a:t>TSelect</a:t>
-            </a:r>
-            <a:r>
-              <a:rPr lang="en-US" dirty="0" smtClean="0"/>
-              <a:t> Any V; Any E</a:t>
-            </a:r>
-          </a:p>
-          <a:p>
-            <a:r>
-              <a:rPr lang="en-US" dirty="0" smtClean="0"/>
-              <a:t>From    T1 </a:t>
-            </a:r>
-            <a:r>
-              <a:rPr lang="en-US" dirty="0" err="1" smtClean="0"/>
-              <a:t>TAnd</a:t>
-            </a:r>
-            <a:r>
-              <a:rPr lang="en-US" dirty="0" smtClean="0"/>
-              <a:t> T2</a:t>
-            </a:r>
-            <a:endParaRPr lang="en-US" dirty="0"/>
-          </a:p>
-        </p:txBody>
-      </p:sp>
     </p:spTree>
     <p:extLst>
       <p:ext uri="{BB962C8B-B14F-4D97-AF65-F5344CB8AC3E}">

</xml_diff>

<commit_message>
fixed error with q6 in paper, updated talk to remove INTO and add union compatibility
</commit_message>
<xml_diff>
--- a/paper/sigmod2016/figs/figures.pptx
+++ b/paper/sigmod2016/figs/figures.pptx
@@ -297,7 +297,7 @@
           <a:p>
             <a:fld id="{2A3C5F88-9950-2441-8A51-A5268CD91903}" type="datetimeFigureOut">
               <a:rPr lang="en-US" smtClean="0"/>
-              <a:t>11/18/15</a:t>
+              <a:t>12/14/15</a:t>
             </a:fld>
             <a:endParaRPr lang="en-US"/>
           </a:p>
@@ -467,7 +467,7 @@
           <a:p>
             <a:fld id="{2A3C5F88-9950-2441-8A51-A5268CD91903}" type="datetimeFigureOut">
               <a:rPr lang="en-US" smtClean="0"/>
-              <a:t>11/18/15</a:t>
+              <a:t>12/14/15</a:t>
             </a:fld>
             <a:endParaRPr lang="en-US"/>
           </a:p>
@@ -647,7 +647,7 @@
           <a:p>
             <a:fld id="{2A3C5F88-9950-2441-8A51-A5268CD91903}" type="datetimeFigureOut">
               <a:rPr lang="en-US" smtClean="0"/>
-              <a:t>11/18/15</a:t>
+              <a:t>12/14/15</a:t>
             </a:fld>
             <a:endParaRPr lang="en-US"/>
           </a:p>
@@ -817,7 +817,7 @@
           <a:p>
             <a:fld id="{2A3C5F88-9950-2441-8A51-A5268CD91903}" type="datetimeFigureOut">
               <a:rPr lang="en-US" smtClean="0"/>
-              <a:t>11/18/15</a:t>
+              <a:t>12/14/15</a:t>
             </a:fld>
             <a:endParaRPr lang="en-US"/>
           </a:p>
@@ -1063,7 +1063,7 @@
           <a:p>
             <a:fld id="{2A3C5F88-9950-2441-8A51-A5268CD91903}" type="datetimeFigureOut">
               <a:rPr lang="en-US" smtClean="0"/>
-              <a:t>11/18/15</a:t>
+              <a:t>12/14/15</a:t>
             </a:fld>
             <a:endParaRPr lang="en-US"/>
           </a:p>
@@ -1351,7 +1351,7 @@
           <a:p>
             <a:fld id="{2A3C5F88-9950-2441-8A51-A5268CD91903}" type="datetimeFigureOut">
               <a:rPr lang="en-US" smtClean="0"/>
-              <a:t>11/18/15</a:t>
+              <a:t>12/14/15</a:t>
             </a:fld>
             <a:endParaRPr lang="en-US"/>
           </a:p>
@@ -1773,7 +1773,7 @@
           <a:p>
             <a:fld id="{2A3C5F88-9950-2441-8A51-A5268CD91903}" type="datetimeFigureOut">
               <a:rPr lang="en-US" smtClean="0"/>
-              <a:t>11/18/15</a:t>
+              <a:t>12/14/15</a:t>
             </a:fld>
             <a:endParaRPr lang="en-US"/>
           </a:p>
@@ -1891,7 +1891,7 @@
           <a:p>
             <a:fld id="{2A3C5F88-9950-2441-8A51-A5268CD91903}" type="datetimeFigureOut">
               <a:rPr lang="en-US" smtClean="0"/>
-              <a:t>11/18/15</a:t>
+              <a:t>12/14/15</a:t>
             </a:fld>
             <a:endParaRPr lang="en-US"/>
           </a:p>
@@ -1986,7 +1986,7 @@
           <a:p>
             <a:fld id="{2A3C5F88-9950-2441-8A51-A5268CD91903}" type="datetimeFigureOut">
               <a:rPr lang="en-US" smtClean="0"/>
-              <a:t>11/18/15</a:t>
+              <a:t>12/14/15</a:t>
             </a:fld>
             <a:endParaRPr lang="en-US"/>
           </a:p>
@@ -2263,7 +2263,7 @@
           <a:p>
             <a:fld id="{2A3C5F88-9950-2441-8A51-A5268CD91903}" type="datetimeFigureOut">
               <a:rPr lang="en-US" smtClean="0"/>
-              <a:t>11/18/15</a:t>
+              <a:t>12/14/15</a:t>
             </a:fld>
             <a:endParaRPr lang="en-US"/>
           </a:p>
@@ -2516,7 +2516,7 @@
           <a:p>
             <a:fld id="{2A3C5F88-9950-2441-8A51-A5268CD91903}" type="datetimeFigureOut">
               <a:rPr lang="en-US" smtClean="0"/>
-              <a:t>11/18/15</a:t>
+              <a:t>12/14/15</a:t>
             </a:fld>
             <a:endParaRPr lang="en-US"/>
           </a:p>
@@ -2729,7 +2729,7 @@
           <a:p>
             <a:fld id="{2A3C5F88-9950-2441-8A51-A5268CD91903}" type="datetimeFigureOut">
               <a:rPr lang="en-US" smtClean="0"/>
-              <a:t>11/18/15</a:t>
+              <a:t>12/14/15</a:t>
             </a:fld>
             <a:endParaRPr lang="en-US"/>
           </a:p>
@@ -15397,7 +15397,7 @@
           <p:nvPr>
             <p:extLst>
               <p:ext uri="{D42A27DB-BD31-4B8C-83A1-F6EECF244321}">
-                <p14:modId xmlns:p14="http://schemas.microsoft.com/office/powerpoint/2010/main" val="2708325322"/>
+                <p14:modId xmlns:p14="http://schemas.microsoft.com/office/powerpoint/2010/main" val="1209009238"/>
               </p:ext>
             </p:extLst>
           </p:nvPr>
@@ -16839,6 +16839,253 @@
           </a:p>
         </p:txBody>
       </p:sp>
+      <p:graphicFrame>
+        <p:nvGraphicFramePr>
+          <p:cNvPr id="25" name="Table 24"/>
+          <p:cNvGraphicFramePr>
+            <a:graphicFrameLocks noGrp="1"/>
+          </p:cNvGraphicFramePr>
+          <p:nvPr>
+            <p:extLst>
+              <p:ext uri="{D42A27DB-BD31-4B8C-83A1-F6EECF244321}">
+                <p14:modId xmlns:p14="http://schemas.microsoft.com/office/powerpoint/2010/main" val="3884390941"/>
+              </p:ext>
+            </p:extLst>
+          </p:nvPr>
+        </p:nvGraphicFramePr>
+        <p:xfrm>
+          <a:off x="7141882" y="3053757"/>
+          <a:ext cx="1927411" cy="643466"/>
+        </p:xfrm>
+        <a:graphic>
+          <a:graphicData uri="http://schemas.openxmlformats.org/drawingml/2006/table">
+            <a:tbl>
+              <a:tblPr firstRow="1" bandRow="1">
+                <a:tableStyleId>{5940675A-B579-460E-94D1-54222C63F5DA}</a:tableStyleId>
+              </a:tblPr>
+              <a:tblGrid>
+                <a:gridCol w="462884"/>
+                <a:gridCol w="492738"/>
+                <a:gridCol w="971789"/>
+              </a:tblGrid>
+              <a:tr h="338667">
+                <a:tc>
+                  <a:txBody>
+                    <a:bodyPr/>
+                    <a:lstStyle/>
+                    <a:p>
+                      <a:pPr algn="ctr"/>
+                      <a:r>
+                        <a:rPr lang="en-US" sz="1400" b="1" u="none" dirty="0" smtClean="0"/>
+                        <a:t>vid</a:t>
+                      </a:r>
+                      <a:r>
+                        <a:rPr lang="en-US" sz="1400" b="1" u="none" baseline="-25000" dirty="0" smtClean="0"/>
+                        <a:t>1</a:t>
+                      </a:r>
+                      <a:endParaRPr lang="en-US" sz="1400" b="1" u="none" baseline="-25000" dirty="0"/>
+                    </a:p>
+                  </a:txBody>
+                  <a:tcPr>
+                    <a:lnB w="12700" cap="flat" cmpd="sng" algn="ctr">
+                      <a:solidFill>
+                        <a:scrgbClr r="0" g="0" b="0"/>
+                      </a:solidFill>
+                      <a:prstDash val="solid"/>
+                      <a:round/>
+                      <a:headEnd type="none" w="med" len="med"/>
+                      <a:tailEnd type="none" w="med" len="med"/>
+                    </a:lnB>
+                    <a:solidFill>
+                      <a:schemeClr val="bg1">
+                        <a:lumMod val="85000"/>
+                      </a:schemeClr>
+                    </a:solidFill>
+                  </a:tcPr>
+                </a:tc>
+                <a:tc>
+                  <a:txBody>
+                    <a:bodyPr/>
+                    <a:lstStyle/>
+                    <a:p>
+                      <a:pPr algn="ctr"/>
+                      <a:r>
+                        <a:rPr lang="en-US" sz="1400" b="1" u="none" dirty="0" smtClean="0"/>
+                        <a:t>vid</a:t>
+                      </a:r>
+                      <a:r>
+                        <a:rPr lang="en-US" sz="1400" b="1" u="none" baseline="-25000" dirty="0" smtClean="0"/>
+                        <a:t>2</a:t>
+                      </a:r>
+                      <a:endParaRPr lang="en-US" sz="1400" b="1" u="none" baseline="-25000" dirty="0"/>
+                    </a:p>
+                  </a:txBody>
+                  <a:tcPr>
+                    <a:lnB w="12700" cap="flat" cmpd="sng" algn="ctr">
+                      <a:solidFill>
+                        <a:scrgbClr r="0" g="0" b="0"/>
+                      </a:solidFill>
+                      <a:prstDash val="solid"/>
+                      <a:round/>
+                      <a:headEnd type="none" w="med" len="med"/>
+                      <a:tailEnd type="none" w="med" len="med"/>
+                    </a:lnB>
+                    <a:solidFill>
+                      <a:schemeClr val="bg1">
+                        <a:lumMod val="85000"/>
+                      </a:schemeClr>
+                    </a:solidFill>
+                  </a:tcPr>
+                </a:tc>
+                <a:tc>
+                  <a:txBody>
+                    <a:bodyPr/>
+                    <a:lstStyle/>
+                    <a:p>
+                      <a:pPr algn="ctr"/>
+                      <a:r>
+                        <a:rPr lang="en-US" sz="1400" b="1" dirty="0" smtClean="0"/>
+                        <a:t>sum(</a:t>
+                      </a:r>
+                      <a:r>
+                        <a:rPr lang="en-US" sz="1400" b="1" dirty="0" err="1" smtClean="0"/>
+                        <a:t>cnt</a:t>
+                      </a:r>
+                      <a:r>
+                        <a:rPr lang="en-US" sz="1400" b="1" dirty="0" smtClean="0"/>
+                        <a:t>)</a:t>
+                      </a:r>
+                      <a:endParaRPr lang="en-US" sz="1400" b="1" dirty="0"/>
+                    </a:p>
+                  </a:txBody>
+                  <a:tcPr>
+                    <a:lnB w="12700" cap="flat" cmpd="sng" algn="ctr">
+                      <a:solidFill>
+                        <a:scrgbClr r="0" g="0" b="0"/>
+                      </a:solidFill>
+                      <a:prstDash val="solid"/>
+                      <a:round/>
+                      <a:headEnd type="none" w="med" len="med"/>
+                      <a:tailEnd type="none" w="med" len="med"/>
+                    </a:lnB>
+                    <a:solidFill>
+                      <a:schemeClr val="bg1">
+                        <a:lumMod val="85000"/>
+                      </a:schemeClr>
+                    </a:solidFill>
+                  </a:tcPr>
+                </a:tc>
+              </a:tr>
+              <a:tr h="237089">
+                <a:tc>
+                  <a:txBody>
+                    <a:bodyPr/>
+                    <a:lstStyle/>
+                    <a:p>
+                      <a:pPr algn="r"/>
+                      <a:r>
+                        <a:rPr lang="en-US" sz="1400" dirty="0" smtClean="0"/>
+                        <a:t>1</a:t>
+                      </a:r>
+                      <a:endParaRPr lang="en-US" sz="1400" dirty="0"/>
+                    </a:p>
+                  </a:txBody>
+                  <a:tcPr>
+                    <a:lnT w="12700" cap="flat" cmpd="sng" algn="ctr">
+                      <a:solidFill>
+                        <a:scrgbClr r="0" g="0" b="0"/>
+                      </a:solidFill>
+                      <a:prstDash val="solid"/>
+                      <a:round/>
+                      <a:headEnd type="none" w="med" len="med"/>
+                      <a:tailEnd type="none" w="med" len="med"/>
+                    </a:lnT>
+                  </a:tcPr>
+                </a:tc>
+                <a:tc>
+                  <a:txBody>
+                    <a:bodyPr/>
+                    <a:lstStyle/>
+                    <a:p>
+                      <a:pPr algn="r"/>
+                      <a:r>
+                        <a:rPr lang="en-US" sz="1400" dirty="0" smtClean="0"/>
+                        <a:t>2</a:t>
+                      </a:r>
+                      <a:endParaRPr lang="en-US" sz="1400" dirty="0"/>
+                    </a:p>
+                  </a:txBody>
+                  <a:tcPr>
+                    <a:lnT w="12700" cap="flat" cmpd="sng" algn="ctr">
+                      <a:solidFill>
+                        <a:scrgbClr r="0" g="0" b="0"/>
+                      </a:solidFill>
+                      <a:prstDash val="solid"/>
+                      <a:round/>
+                      <a:headEnd type="none" w="med" len="med"/>
+                      <a:tailEnd type="none" w="med" len="med"/>
+                    </a:lnT>
+                  </a:tcPr>
+                </a:tc>
+                <a:tc>
+                  <a:txBody>
+                    <a:bodyPr/>
+                    <a:lstStyle/>
+                    <a:p>
+                      <a:pPr algn="r"/>
+                      <a:r>
+                        <a:rPr lang="en-US" sz="1400" dirty="0" smtClean="0"/>
+                        <a:t>6</a:t>
+                      </a:r>
+                      <a:endParaRPr lang="en-US" sz="1400" dirty="0"/>
+                    </a:p>
+                  </a:txBody>
+                  <a:tcPr>
+                    <a:lnT w="12700" cap="flat" cmpd="sng" algn="ctr">
+                      <a:solidFill>
+                        <a:scrgbClr r="0" g="0" b="0"/>
+                      </a:solidFill>
+                      <a:prstDash val="solid"/>
+                      <a:round/>
+                      <a:headEnd type="none" w="med" len="med"/>
+                      <a:tailEnd type="none" w="med" len="med"/>
+                    </a:lnT>
+                  </a:tcPr>
+                </a:tc>
+              </a:tr>
+            </a:tbl>
+          </a:graphicData>
+        </a:graphic>
+      </p:graphicFrame>
+      <p:sp>
+        <p:nvSpPr>
+          <p:cNvPr id="26" name="Rectangle 25"/>
+          <p:cNvSpPr/>
+          <p:nvPr/>
+        </p:nvSpPr>
+        <p:spPr>
+          <a:xfrm>
+            <a:off x="6639686" y="2939934"/>
+            <a:ext cx="334797" cy="461665"/>
+          </a:xfrm>
+          <a:prstGeom prst="rect">
+            <a:avLst/>
+          </a:prstGeom>
+        </p:spPr>
+        <p:txBody>
+          <a:bodyPr wrap="none">
+            <a:spAutoFit/>
+          </a:bodyPr>
+          <a:lstStyle/>
+          <a:p>
+            <a:r>
+              <a:rPr lang="en-US" sz="2400" b="1" dirty="0" smtClean="0"/>
+              <a:t>E</a:t>
+            </a:r>
+            <a:endParaRPr lang="en-US" sz="2400" b="1" dirty="0"/>
+          </a:p>
+        </p:txBody>
+      </p:sp>
     </p:spTree>
     <p:extLst>
       <p:ext uri="{BB962C8B-B14F-4D97-AF65-F5344CB8AC3E}">
@@ -28430,8 +28677,8 @@
         </p:nvSpPr>
         <p:spPr>
           <a:xfrm>
-            <a:off x="0" y="178408"/>
-            <a:ext cx="1239342" cy="338554"/>
+            <a:off x="-59764" y="178408"/>
+            <a:ext cx="1173424" cy="323165"/>
           </a:xfrm>
           <a:prstGeom prst="rect">
             <a:avLst/>
@@ -28445,10 +28692,10 @@
           <a:lstStyle/>
           <a:p>
             <a:r>
-              <a:rPr lang="en-US" sz="1600" dirty="0" smtClean="0"/>
+              <a:rPr lang="en-US" sz="1500" dirty="0" smtClean="0"/>
               <a:t>[2008, 2009)</a:t>
             </a:r>
-            <a:endParaRPr lang="en-US" sz="1600" dirty="0"/>
+            <a:endParaRPr lang="en-US" sz="1500" dirty="0"/>
           </a:p>
         </p:txBody>
       </p:sp>
@@ -28460,7 +28707,7 @@
         </p:nvCxnSpPr>
         <p:spPr>
           <a:xfrm>
-            <a:off x="3838751" y="85577"/>
+            <a:off x="3330757" y="85577"/>
             <a:ext cx="0" cy="1973573"/>
           </a:xfrm>
           <a:prstGeom prst="line">
@@ -28497,8 +28744,8 @@
         </p:nvSpPr>
         <p:spPr>
           <a:xfrm>
-            <a:off x="1295471" y="178408"/>
-            <a:ext cx="1239342" cy="338554"/>
+            <a:off x="1056415" y="178408"/>
+            <a:ext cx="1173424" cy="323165"/>
           </a:xfrm>
           <a:prstGeom prst="rect">
             <a:avLst/>
@@ -28512,10 +28759,10 @@
           <a:lstStyle/>
           <a:p>
             <a:r>
-              <a:rPr lang="en-US" sz="1600" dirty="0" smtClean="0"/>
+              <a:rPr lang="en-US" sz="1500" dirty="0" smtClean="0"/>
               <a:t>[2009, 2010)</a:t>
             </a:r>
-            <a:endParaRPr lang="en-US" sz="1600" dirty="0"/>
+            <a:endParaRPr lang="en-US" sz="1500" dirty="0"/>
           </a:p>
         </p:txBody>
       </p:sp>
@@ -28527,8 +28774,8 @@
         </p:nvSpPr>
         <p:spPr>
           <a:xfrm>
-            <a:off x="2590942" y="178408"/>
-            <a:ext cx="1239342" cy="338554"/>
+            <a:off x="2172594" y="178408"/>
+            <a:ext cx="1173424" cy="323165"/>
           </a:xfrm>
           <a:prstGeom prst="rect">
             <a:avLst/>
@@ -28542,10 +28789,10 @@
           <a:lstStyle/>
           <a:p>
             <a:r>
-              <a:rPr lang="en-US" sz="1600" dirty="0" smtClean="0"/>
+              <a:rPr lang="en-US" sz="1500" dirty="0" smtClean="0"/>
               <a:t>[2010, 2011)</a:t>
             </a:r>
-            <a:endParaRPr lang="en-US" sz="1600" dirty="0"/>
+            <a:endParaRPr lang="en-US" sz="1500" dirty="0"/>
           </a:p>
         </p:txBody>
       </p:sp>
@@ -28557,8 +28804,8 @@
         </p:nvSpPr>
         <p:spPr>
           <a:xfrm>
-            <a:off x="3886413" y="178408"/>
-            <a:ext cx="1239342" cy="338554"/>
+            <a:off x="3303714" y="178408"/>
+            <a:ext cx="1173424" cy="323165"/>
           </a:xfrm>
           <a:prstGeom prst="rect">
             <a:avLst/>
@@ -28572,667 +28819,697 @@
           <a:lstStyle/>
           <a:p>
             <a:r>
-              <a:rPr lang="en-US" sz="1600" dirty="0" smtClean="0"/>
+              <a:rPr lang="en-US" sz="1500" dirty="0" smtClean="0"/>
               <a:t>[2011, 2012)</a:t>
             </a:r>
-            <a:endParaRPr lang="en-US" sz="1600" dirty="0"/>
+            <a:endParaRPr lang="en-US" sz="1500" dirty="0"/>
           </a:p>
         </p:txBody>
       </p:sp>
       <p:grpSp>
         <p:nvGrpSpPr>
-          <p:cNvPr id="144" name="Group 143"/>
+          <p:cNvPr id="2" name="Group 1"/>
           <p:cNvGrpSpPr/>
           <p:nvPr/>
         </p:nvGrpSpPr>
         <p:grpSpPr>
           <a:xfrm>
-            <a:off x="2805045" y="486736"/>
-            <a:ext cx="402336" cy="419140"/>
-            <a:chOff x="2941562" y="2797709"/>
-            <a:chExt cx="402336" cy="419140"/>
+            <a:off x="3488817" y="516962"/>
+            <a:ext cx="956309" cy="1555200"/>
+            <a:chOff x="2805045" y="2757768"/>
+            <a:chExt cx="956309" cy="1555200"/>
           </a:xfrm>
         </p:grpSpPr>
-        <p:sp>
-          <p:nvSpPr>
-            <p:cNvPr id="217" name="Rectangle 216"/>
-            <p:cNvSpPr/>
+        <p:grpSp>
+          <p:nvGrpSpPr>
+            <p:cNvPr id="144" name="Group 143"/>
+            <p:cNvGrpSpPr/>
             <p:nvPr/>
-          </p:nvSpPr>
+          </p:nvGrpSpPr>
+          <p:grpSpPr>
+            <a:xfrm>
+              <a:off x="2805045" y="2757768"/>
+              <a:ext cx="402336" cy="419140"/>
+              <a:chOff x="2941562" y="2797709"/>
+              <a:chExt cx="402336" cy="419140"/>
+            </a:xfrm>
+          </p:grpSpPr>
+          <p:sp>
+            <p:nvSpPr>
+              <p:cNvPr id="217" name="Rectangle 216"/>
+              <p:cNvSpPr/>
+              <p:nvPr/>
+            </p:nvSpPr>
+            <p:spPr>
+              <a:xfrm>
+                <a:off x="2991365" y="2797709"/>
+                <a:ext cx="273353" cy="369332"/>
+              </a:xfrm>
+              <a:prstGeom prst="rect">
+                <a:avLst/>
+              </a:prstGeom>
+            </p:spPr>
+            <p:txBody>
+              <a:bodyPr wrap="square">
+                <a:spAutoFit/>
+              </a:bodyPr>
+              <a:lstStyle/>
+              <a:p>
+                <a:r>
+                  <a:rPr lang="en-US" dirty="0" smtClean="0"/>
+                  <a:t>1</a:t>
+                </a:r>
+                <a:endParaRPr lang="en-US" dirty="0"/>
+              </a:p>
+            </p:txBody>
+          </p:sp>
+          <p:sp>
+            <p:nvSpPr>
+              <p:cNvPr id="218" name="Oval 217"/>
+              <p:cNvSpPr/>
+              <p:nvPr/>
+            </p:nvSpPr>
+            <p:spPr>
+              <a:xfrm>
+                <a:off x="2941562" y="2814366"/>
+                <a:ext cx="402336" cy="402483"/>
+              </a:xfrm>
+              <a:prstGeom prst="ellipse">
+                <a:avLst/>
+              </a:prstGeom>
+              <a:noFill/>
+              <a:ln w="28575">
+                <a:solidFill>
+                  <a:schemeClr val="tx1"/>
+                </a:solidFill>
+              </a:ln>
+              <a:effectLst/>
+            </p:spPr>
+            <p:style>
+              <a:lnRef idx="1">
+                <a:schemeClr val="accent1"/>
+              </a:lnRef>
+              <a:fillRef idx="3">
+                <a:schemeClr val="accent1"/>
+              </a:fillRef>
+              <a:effectRef idx="2">
+                <a:schemeClr val="accent1"/>
+              </a:effectRef>
+              <a:fontRef idx="minor">
+                <a:schemeClr val="lt1"/>
+              </a:fontRef>
+            </p:style>
+            <p:txBody>
+              <a:bodyPr rtlCol="0" anchor="ctr"/>
+              <a:lstStyle/>
+              <a:p>
+                <a:pPr algn="ctr"/>
+                <a:endParaRPr lang="en-US"/>
+              </a:p>
+            </p:txBody>
+          </p:sp>
+        </p:grpSp>
+        <p:grpSp>
+          <p:nvGrpSpPr>
+            <p:cNvPr id="145" name="Group 144"/>
+            <p:cNvGrpSpPr/>
+            <p:nvPr/>
+          </p:nvGrpSpPr>
+          <p:grpSpPr>
+            <a:xfrm>
+              <a:off x="3359018" y="3245105"/>
+              <a:ext cx="402336" cy="419140"/>
+              <a:chOff x="2941562" y="2797709"/>
+              <a:chExt cx="402336" cy="419140"/>
+            </a:xfrm>
+          </p:grpSpPr>
+          <p:sp>
+            <p:nvSpPr>
+              <p:cNvPr id="214" name="Rectangle 213"/>
+              <p:cNvSpPr/>
+              <p:nvPr/>
+            </p:nvSpPr>
+            <p:spPr>
+              <a:xfrm>
+                <a:off x="2991365" y="2797709"/>
+                <a:ext cx="273353" cy="369332"/>
+              </a:xfrm>
+              <a:prstGeom prst="rect">
+                <a:avLst/>
+              </a:prstGeom>
+            </p:spPr>
+            <p:txBody>
+              <a:bodyPr wrap="square">
+                <a:spAutoFit/>
+              </a:bodyPr>
+              <a:lstStyle/>
+              <a:p>
+                <a:r>
+                  <a:rPr lang="en-US" dirty="0" smtClean="0"/>
+                  <a:t>4</a:t>
+                </a:r>
+                <a:endParaRPr lang="en-US" dirty="0"/>
+              </a:p>
+            </p:txBody>
+          </p:sp>
+          <p:sp>
+            <p:nvSpPr>
+              <p:cNvPr id="215" name="Oval 214"/>
+              <p:cNvSpPr/>
+              <p:nvPr/>
+            </p:nvSpPr>
+            <p:spPr>
+              <a:xfrm>
+                <a:off x="2941562" y="2814366"/>
+                <a:ext cx="402336" cy="402483"/>
+              </a:xfrm>
+              <a:prstGeom prst="ellipse">
+                <a:avLst/>
+              </a:prstGeom>
+              <a:noFill/>
+              <a:ln w="28575">
+                <a:solidFill>
+                  <a:schemeClr val="tx1"/>
+                </a:solidFill>
+              </a:ln>
+              <a:effectLst/>
+            </p:spPr>
+            <p:style>
+              <a:lnRef idx="1">
+                <a:schemeClr val="accent1"/>
+              </a:lnRef>
+              <a:fillRef idx="3">
+                <a:schemeClr val="accent1"/>
+              </a:fillRef>
+              <a:effectRef idx="2">
+                <a:schemeClr val="accent1"/>
+              </a:effectRef>
+              <a:fontRef idx="minor">
+                <a:schemeClr val="lt1"/>
+              </a:fontRef>
+            </p:style>
+            <p:txBody>
+              <a:bodyPr rtlCol="0" anchor="ctr"/>
+              <a:lstStyle/>
+              <a:p>
+                <a:pPr algn="ctr"/>
+                <a:endParaRPr lang="en-US"/>
+              </a:p>
+            </p:txBody>
+          </p:sp>
+        </p:grpSp>
+        <p:grpSp>
+          <p:nvGrpSpPr>
+            <p:cNvPr id="159" name="Group 158"/>
+            <p:cNvGrpSpPr/>
+            <p:nvPr/>
+          </p:nvGrpSpPr>
+          <p:grpSpPr>
+            <a:xfrm>
+              <a:off x="2868725" y="3893828"/>
+              <a:ext cx="402336" cy="419140"/>
+              <a:chOff x="2941562" y="2797709"/>
+              <a:chExt cx="402336" cy="419140"/>
+            </a:xfrm>
+          </p:grpSpPr>
+          <p:sp>
+            <p:nvSpPr>
+              <p:cNvPr id="212" name="Rectangle 211"/>
+              <p:cNvSpPr/>
+              <p:nvPr/>
+            </p:nvSpPr>
+            <p:spPr>
+              <a:xfrm>
+                <a:off x="2991365" y="2797709"/>
+                <a:ext cx="273353" cy="369332"/>
+              </a:xfrm>
+              <a:prstGeom prst="rect">
+                <a:avLst/>
+              </a:prstGeom>
+            </p:spPr>
+            <p:txBody>
+              <a:bodyPr wrap="square">
+                <a:spAutoFit/>
+              </a:bodyPr>
+              <a:lstStyle/>
+              <a:p>
+                <a:r>
+                  <a:rPr lang="en-US" dirty="0" smtClean="0"/>
+                  <a:t>5</a:t>
+                </a:r>
+                <a:endParaRPr lang="en-US" dirty="0"/>
+              </a:p>
+            </p:txBody>
+          </p:sp>
+          <p:sp>
+            <p:nvSpPr>
+              <p:cNvPr id="213" name="Oval 212"/>
+              <p:cNvSpPr/>
+              <p:nvPr/>
+            </p:nvSpPr>
+            <p:spPr>
+              <a:xfrm>
+                <a:off x="2941562" y="2814366"/>
+                <a:ext cx="402336" cy="402483"/>
+              </a:xfrm>
+              <a:prstGeom prst="ellipse">
+                <a:avLst/>
+              </a:prstGeom>
+              <a:noFill/>
+              <a:ln w="28575">
+                <a:solidFill>
+                  <a:schemeClr val="tx1"/>
+                </a:solidFill>
+              </a:ln>
+              <a:effectLst/>
+            </p:spPr>
+            <p:style>
+              <a:lnRef idx="1">
+                <a:schemeClr val="accent1"/>
+              </a:lnRef>
+              <a:fillRef idx="3">
+                <a:schemeClr val="accent1"/>
+              </a:fillRef>
+              <a:effectRef idx="2">
+                <a:schemeClr val="accent1"/>
+              </a:effectRef>
+              <a:fontRef idx="minor">
+                <a:schemeClr val="lt1"/>
+              </a:fontRef>
+            </p:style>
+            <p:txBody>
+              <a:bodyPr rtlCol="0" anchor="ctr"/>
+              <a:lstStyle/>
+              <a:p>
+                <a:pPr algn="ctr"/>
+                <a:endParaRPr lang="en-US"/>
+              </a:p>
+            </p:txBody>
+          </p:sp>
+        </p:grpSp>
+        <p:cxnSp>
+          <p:nvCxnSpPr>
+            <p:cNvPr id="184" name="Straight Arrow Connector 183"/>
+            <p:cNvCxnSpPr>
+              <a:stCxn id="218" idx="4"/>
+              <a:endCxn id="215" idx="1"/>
+            </p:cNvCxnSpPr>
+            <p:nvPr/>
+          </p:nvCxnSpPr>
           <p:spPr>
             <a:xfrm>
-              <a:off x="2991365" y="2797709"/>
-              <a:ext cx="273353" cy="369332"/>
+              <a:off x="3006213" y="3176908"/>
+              <a:ext cx="411726" cy="143796"/>
             </a:xfrm>
-            <a:prstGeom prst="rect">
+            <a:prstGeom prst="straightConnector1">
               <a:avLst/>
             </a:prstGeom>
-          </p:spPr>
-          <p:txBody>
-            <a:bodyPr wrap="square">
-              <a:spAutoFit/>
-            </a:bodyPr>
-            <a:lstStyle/>
-            <a:p>
-              <a:r>
-                <a:rPr lang="en-US" dirty="0" smtClean="0"/>
-                <a:t>1</a:t>
-              </a:r>
-              <a:endParaRPr lang="en-US" dirty="0"/>
-            </a:p>
-          </p:txBody>
-        </p:sp>
-        <p:sp>
-          <p:nvSpPr>
-            <p:cNvPr id="218" name="Oval 217"/>
-            <p:cNvSpPr/>
-            <p:nvPr/>
-          </p:nvSpPr>
-          <p:spPr>
-            <a:xfrm>
-              <a:off x="2941562" y="2814366"/>
-              <a:ext cx="402336" cy="402483"/>
-            </a:xfrm>
-            <a:prstGeom prst="ellipse">
-              <a:avLst/>
-            </a:prstGeom>
-            <a:noFill/>
-            <a:ln w="28575">
+            <a:ln>
               <a:solidFill>
                 <a:schemeClr val="tx1"/>
               </a:solidFill>
+              <a:tailEnd type="none"/>
             </a:ln>
             <a:effectLst/>
           </p:spPr>
           <p:style>
-            <a:lnRef idx="1">
+            <a:lnRef idx="2">
               <a:schemeClr val="accent1"/>
             </a:lnRef>
-            <a:fillRef idx="3">
+            <a:fillRef idx="0">
               <a:schemeClr val="accent1"/>
             </a:fillRef>
-            <a:effectRef idx="2">
+            <a:effectRef idx="1">
               <a:schemeClr val="accent1"/>
             </a:effectRef>
             <a:fontRef idx="minor">
-              <a:schemeClr val="lt1"/>
+              <a:schemeClr val="tx1"/>
             </a:fontRef>
           </p:style>
-          <p:txBody>
-            <a:bodyPr rtlCol="0" anchor="ctr"/>
-            <a:lstStyle/>
-            <a:p>
-              <a:pPr algn="ctr"/>
-              <a:endParaRPr lang="en-US"/>
-            </a:p>
-          </p:txBody>
-        </p:sp>
+        </p:cxnSp>
       </p:grpSp>
       <p:grpSp>
         <p:nvGrpSpPr>
-          <p:cNvPr id="145" name="Group 144"/>
+          <p:cNvPr id="3" name="Group 2"/>
           <p:cNvGrpSpPr/>
           <p:nvPr/>
         </p:nvGrpSpPr>
         <p:grpSpPr>
           <a:xfrm>
-            <a:off x="3359018" y="974073"/>
-            <a:ext cx="402336" cy="419140"/>
-            <a:chOff x="2941562" y="2797709"/>
-            <a:chExt cx="402336" cy="419140"/>
+            <a:off x="4589898" y="1004299"/>
+            <a:ext cx="1134943" cy="1079293"/>
+            <a:chOff x="4009688" y="977544"/>
+            <a:chExt cx="1134943" cy="1079293"/>
           </a:xfrm>
         </p:grpSpPr>
-        <p:sp>
-          <p:nvSpPr>
-            <p:cNvPr id="214" name="Rectangle 213"/>
-            <p:cNvSpPr/>
+        <p:cxnSp>
+          <p:nvCxnSpPr>
+            <p:cNvPr id="220" name="Straight Arrow Connector 219"/>
+            <p:cNvCxnSpPr>
+              <a:stCxn id="233" idx="6"/>
+              <a:endCxn id="230" idx="2"/>
+            </p:cNvCxnSpPr>
             <p:nvPr/>
-          </p:nvSpPr>
+          </p:nvCxnSpPr>
           <p:spPr>
-            <a:xfrm>
-              <a:off x="2991365" y="2797709"/>
-              <a:ext cx="273353" cy="369332"/>
+            <a:xfrm flipV="1">
+              <a:off x="4412024" y="1195443"/>
+              <a:ext cx="330271" cy="13463"/>
             </a:xfrm>
-            <a:prstGeom prst="rect">
+            <a:prstGeom prst="straightConnector1">
               <a:avLst/>
             </a:prstGeom>
-          </p:spPr>
-          <p:txBody>
-            <a:bodyPr wrap="square">
-              <a:spAutoFit/>
-            </a:bodyPr>
-            <a:lstStyle/>
-            <a:p>
-              <a:r>
-                <a:rPr lang="en-US" dirty="0" smtClean="0"/>
-                <a:t>4</a:t>
-              </a:r>
-              <a:endParaRPr lang="en-US" dirty="0"/>
-            </a:p>
-          </p:txBody>
-        </p:sp>
-        <p:sp>
-          <p:nvSpPr>
-            <p:cNvPr id="215" name="Oval 214"/>
-            <p:cNvSpPr/>
-            <p:nvPr/>
-          </p:nvSpPr>
-          <p:spPr>
-            <a:xfrm>
-              <a:off x="2941562" y="2814366"/>
-              <a:ext cx="402336" cy="402483"/>
-            </a:xfrm>
-            <a:prstGeom prst="ellipse">
-              <a:avLst/>
-            </a:prstGeom>
-            <a:noFill/>
-            <a:ln w="28575">
+            <a:ln>
               <a:solidFill>
                 <a:schemeClr val="tx1"/>
               </a:solidFill>
+              <a:tailEnd type="none"/>
             </a:ln>
             <a:effectLst/>
           </p:spPr>
           <p:style>
-            <a:lnRef idx="1">
+            <a:lnRef idx="2">
               <a:schemeClr val="accent1"/>
             </a:lnRef>
-            <a:fillRef idx="3">
+            <a:fillRef idx="0">
               <a:schemeClr val="accent1"/>
             </a:fillRef>
-            <a:effectRef idx="2">
+            <a:effectRef idx="1">
               <a:schemeClr val="accent1"/>
             </a:effectRef>
             <a:fontRef idx="minor">
-              <a:schemeClr val="lt1"/>
+              <a:schemeClr val="tx1"/>
             </a:fontRef>
           </p:style>
-          <p:txBody>
-            <a:bodyPr rtlCol="0" anchor="ctr"/>
-            <a:lstStyle/>
-            <a:p>
-              <a:pPr algn="ctr"/>
-              <a:endParaRPr lang="en-US"/>
-            </a:p>
-          </p:txBody>
-        </p:sp>
-      </p:grpSp>
-      <p:grpSp>
-        <p:nvGrpSpPr>
-          <p:cNvPr id="159" name="Group 158"/>
-          <p:cNvGrpSpPr/>
-          <p:nvPr/>
-        </p:nvGrpSpPr>
-        <p:grpSpPr>
-          <a:xfrm>
-            <a:off x="2868725" y="1622796"/>
-            <a:ext cx="402336" cy="419140"/>
-            <a:chOff x="2941562" y="2797709"/>
-            <a:chExt cx="402336" cy="419140"/>
-          </a:xfrm>
-        </p:grpSpPr>
-        <p:sp>
-          <p:nvSpPr>
-            <p:cNvPr id="212" name="Rectangle 211"/>
-            <p:cNvSpPr/>
+        </p:cxnSp>
+        <p:grpSp>
+          <p:nvGrpSpPr>
+            <p:cNvPr id="222" name="Group 221"/>
+            <p:cNvGrpSpPr/>
             <p:nvPr/>
-          </p:nvSpPr>
+          </p:nvGrpSpPr>
+          <p:grpSpPr>
+            <a:xfrm>
+              <a:off x="4009688" y="991007"/>
+              <a:ext cx="402336" cy="419140"/>
+              <a:chOff x="2941562" y="2797709"/>
+              <a:chExt cx="402336" cy="419140"/>
+            </a:xfrm>
+          </p:grpSpPr>
+          <p:sp>
+            <p:nvSpPr>
+              <p:cNvPr id="231" name="Rectangle 230"/>
+              <p:cNvSpPr/>
+              <p:nvPr/>
+            </p:nvSpPr>
+            <p:spPr>
+              <a:xfrm>
+                <a:off x="2991366" y="2797709"/>
+                <a:ext cx="273353" cy="369332"/>
+              </a:xfrm>
+              <a:prstGeom prst="rect">
+                <a:avLst/>
+              </a:prstGeom>
+            </p:spPr>
+            <p:txBody>
+              <a:bodyPr wrap="square">
+                <a:spAutoFit/>
+              </a:bodyPr>
+              <a:lstStyle/>
+              <a:p>
+                <a:r>
+                  <a:rPr lang="en-US" dirty="0" smtClean="0"/>
+                  <a:t>3</a:t>
+                </a:r>
+                <a:endParaRPr lang="en-US" dirty="0"/>
+              </a:p>
+            </p:txBody>
+          </p:sp>
+          <p:sp>
+            <p:nvSpPr>
+              <p:cNvPr id="233" name="Oval 232"/>
+              <p:cNvSpPr/>
+              <p:nvPr/>
+            </p:nvSpPr>
+            <p:spPr>
+              <a:xfrm>
+                <a:off x="2941562" y="2814366"/>
+                <a:ext cx="402336" cy="402483"/>
+              </a:xfrm>
+              <a:prstGeom prst="ellipse">
+                <a:avLst/>
+              </a:prstGeom>
+              <a:noFill/>
+              <a:ln w="28575">
+                <a:solidFill>
+                  <a:schemeClr val="tx1"/>
+                </a:solidFill>
+              </a:ln>
+              <a:effectLst/>
+            </p:spPr>
+            <p:style>
+              <a:lnRef idx="1">
+                <a:schemeClr val="accent1"/>
+              </a:lnRef>
+              <a:fillRef idx="3">
+                <a:schemeClr val="accent1"/>
+              </a:fillRef>
+              <a:effectRef idx="2">
+                <a:schemeClr val="accent1"/>
+              </a:effectRef>
+              <a:fontRef idx="minor">
+                <a:schemeClr val="lt1"/>
+              </a:fontRef>
+            </p:style>
+            <p:txBody>
+              <a:bodyPr rtlCol="0" anchor="ctr"/>
+              <a:lstStyle/>
+              <a:p>
+                <a:pPr algn="ctr"/>
+                <a:endParaRPr lang="en-US"/>
+              </a:p>
+            </p:txBody>
+          </p:sp>
+        </p:grpSp>
+        <p:grpSp>
+          <p:nvGrpSpPr>
+            <p:cNvPr id="223" name="Group 222"/>
+            <p:cNvGrpSpPr/>
+            <p:nvPr/>
+          </p:nvGrpSpPr>
+          <p:grpSpPr>
+            <a:xfrm>
+              <a:off x="4742295" y="977544"/>
+              <a:ext cx="402336" cy="419140"/>
+              <a:chOff x="2941562" y="2797709"/>
+              <a:chExt cx="402336" cy="419140"/>
+            </a:xfrm>
+          </p:grpSpPr>
+          <p:sp>
+            <p:nvSpPr>
+              <p:cNvPr id="229" name="Rectangle 228"/>
+              <p:cNvSpPr/>
+              <p:nvPr/>
+            </p:nvSpPr>
+            <p:spPr>
+              <a:xfrm>
+                <a:off x="2991366" y="2797709"/>
+                <a:ext cx="273353" cy="369332"/>
+              </a:xfrm>
+              <a:prstGeom prst="rect">
+                <a:avLst/>
+              </a:prstGeom>
+            </p:spPr>
+            <p:txBody>
+              <a:bodyPr wrap="square">
+                <a:spAutoFit/>
+              </a:bodyPr>
+              <a:lstStyle/>
+              <a:p>
+                <a:r>
+                  <a:rPr lang="en-US" dirty="0" smtClean="0"/>
+                  <a:t>4</a:t>
+                </a:r>
+                <a:endParaRPr lang="en-US" dirty="0"/>
+              </a:p>
+            </p:txBody>
+          </p:sp>
+          <p:sp>
+            <p:nvSpPr>
+              <p:cNvPr id="230" name="Oval 229"/>
+              <p:cNvSpPr/>
+              <p:nvPr/>
+            </p:nvSpPr>
+            <p:spPr>
+              <a:xfrm>
+                <a:off x="2941562" y="2814366"/>
+                <a:ext cx="402336" cy="402483"/>
+              </a:xfrm>
+              <a:prstGeom prst="ellipse">
+                <a:avLst/>
+              </a:prstGeom>
+              <a:noFill/>
+              <a:ln w="28575">
+                <a:solidFill>
+                  <a:schemeClr val="tx1"/>
+                </a:solidFill>
+              </a:ln>
+              <a:effectLst/>
+            </p:spPr>
+            <p:style>
+              <a:lnRef idx="1">
+                <a:schemeClr val="accent1"/>
+              </a:lnRef>
+              <a:fillRef idx="3">
+                <a:schemeClr val="accent1"/>
+              </a:fillRef>
+              <a:effectRef idx="2">
+                <a:schemeClr val="accent1"/>
+              </a:effectRef>
+              <a:fontRef idx="minor">
+                <a:schemeClr val="lt1"/>
+              </a:fontRef>
+            </p:style>
+            <p:txBody>
+              <a:bodyPr rtlCol="0" anchor="ctr"/>
+              <a:lstStyle/>
+              <a:p>
+                <a:pPr algn="ctr"/>
+                <a:endParaRPr lang="en-US"/>
+              </a:p>
+            </p:txBody>
+          </p:sp>
+        </p:grpSp>
+        <p:grpSp>
+          <p:nvGrpSpPr>
+            <p:cNvPr id="224" name="Group 223"/>
+            <p:cNvGrpSpPr/>
+            <p:nvPr/>
+          </p:nvGrpSpPr>
+          <p:grpSpPr>
+            <a:xfrm>
+              <a:off x="4015700" y="1637697"/>
+              <a:ext cx="402336" cy="419140"/>
+              <a:chOff x="2941562" y="2797709"/>
+              <a:chExt cx="402336" cy="419140"/>
+            </a:xfrm>
+          </p:grpSpPr>
+          <p:sp>
+            <p:nvSpPr>
+              <p:cNvPr id="226" name="Rectangle 225"/>
+              <p:cNvSpPr/>
+              <p:nvPr/>
+            </p:nvSpPr>
+            <p:spPr>
+              <a:xfrm>
+                <a:off x="2991366" y="2797709"/>
+                <a:ext cx="273353" cy="369332"/>
+              </a:xfrm>
+              <a:prstGeom prst="rect">
+                <a:avLst/>
+              </a:prstGeom>
+            </p:spPr>
+            <p:txBody>
+              <a:bodyPr wrap="square">
+                <a:spAutoFit/>
+              </a:bodyPr>
+              <a:lstStyle/>
+              <a:p>
+                <a:r>
+                  <a:rPr lang="en-US" dirty="0" smtClean="0"/>
+                  <a:t>5</a:t>
+                </a:r>
+                <a:endParaRPr lang="en-US" dirty="0"/>
+              </a:p>
+            </p:txBody>
+          </p:sp>
+          <p:sp>
+            <p:nvSpPr>
+              <p:cNvPr id="228" name="Oval 227"/>
+              <p:cNvSpPr/>
+              <p:nvPr/>
+            </p:nvSpPr>
+            <p:spPr>
+              <a:xfrm>
+                <a:off x="2941562" y="2814366"/>
+                <a:ext cx="402336" cy="402483"/>
+              </a:xfrm>
+              <a:prstGeom prst="ellipse">
+                <a:avLst/>
+              </a:prstGeom>
+              <a:noFill/>
+              <a:ln w="28575">
+                <a:solidFill>
+                  <a:schemeClr val="tx1"/>
+                </a:solidFill>
+              </a:ln>
+              <a:effectLst/>
+            </p:spPr>
+            <p:style>
+              <a:lnRef idx="1">
+                <a:schemeClr val="accent1"/>
+              </a:lnRef>
+              <a:fillRef idx="3">
+                <a:schemeClr val="accent1"/>
+              </a:fillRef>
+              <a:effectRef idx="2">
+                <a:schemeClr val="accent1"/>
+              </a:effectRef>
+              <a:fontRef idx="minor">
+                <a:schemeClr val="lt1"/>
+              </a:fontRef>
+            </p:style>
+            <p:txBody>
+              <a:bodyPr rtlCol="0" anchor="ctr"/>
+              <a:lstStyle/>
+              <a:p>
+                <a:pPr algn="ctr"/>
+                <a:endParaRPr lang="en-US"/>
+              </a:p>
+            </p:txBody>
+          </p:sp>
+        </p:grpSp>
+        <p:cxnSp>
+          <p:nvCxnSpPr>
+            <p:cNvPr id="225" name="Straight Arrow Connector 224"/>
+            <p:cNvCxnSpPr>
+              <a:stCxn id="233" idx="4"/>
+              <a:endCxn id="226" idx="0"/>
+            </p:cNvCxnSpPr>
+            <p:nvPr/>
+          </p:nvCxnSpPr>
           <p:spPr>
-            <a:xfrm>
-              <a:off x="2991365" y="2797709"/>
-              <a:ext cx="273353" cy="369332"/>
+            <a:xfrm flipH="1">
+              <a:off x="4202181" y="1410147"/>
+              <a:ext cx="8675" cy="227550"/>
             </a:xfrm>
-            <a:prstGeom prst="rect">
+            <a:prstGeom prst="straightConnector1">
               <a:avLst/>
             </a:prstGeom>
-          </p:spPr>
-          <p:txBody>
-            <a:bodyPr wrap="square">
-              <a:spAutoFit/>
-            </a:bodyPr>
-            <a:lstStyle/>
-            <a:p>
-              <a:r>
-                <a:rPr lang="en-US" dirty="0" smtClean="0"/>
-                <a:t>5</a:t>
-              </a:r>
-              <a:endParaRPr lang="en-US" dirty="0"/>
-            </a:p>
-          </p:txBody>
-        </p:sp>
-        <p:sp>
-          <p:nvSpPr>
-            <p:cNvPr id="213" name="Oval 212"/>
-            <p:cNvSpPr/>
-            <p:nvPr/>
-          </p:nvSpPr>
-          <p:spPr>
-            <a:xfrm>
-              <a:off x="2941562" y="2814366"/>
-              <a:ext cx="402336" cy="402483"/>
-            </a:xfrm>
-            <a:prstGeom prst="ellipse">
-              <a:avLst/>
-            </a:prstGeom>
-            <a:noFill/>
-            <a:ln w="28575">
+            <a:ln>
               <a:solidFill>
                 <a:schemeClr val="tx1"/>
               </a:solidFill>
+              <a:tailEnd type="none"/>
             </a:ln>
             <a:effectLst/>
           </p:spPr>
           <p:style>
-            <a:lnRef idx="1">
+            <a:lnRef idx="2">
               <a:schemeClr val="accent1"/>
             </a:lnRef>
-            <a:fillRef idx="3">
+            <a:fillRef idx="0">
               <a:schemeClr val="accent1"/>
             </a:fillRef>
-            <a:effectRef idx="2">
+            <a:effectRef idx="1">
               <a:schemeClr val="accent1"/>
             </a:effectRef>
             <a:fontRef idx="minor">
-              <a:schemeClr val="lt1"/>
+              <a:schemeClr val="tx1"/>
             </a:fontRef>
           </p:style>
-          <p:txBody>
-            <a:bodyPr rtlCol="0" anchor="ctr"/>
-            <a:lstStyle/>
-            <a:p>
-              <a:pPr algn="ctr"/>
-              <a:endParaRPr lang="en-US"/>
-            </a:p>
-          </p:txBody>
-        </p:sp>
+        </p:cxnSp>
       </p:grpSp>
-      <p:cxnSp>
-        <p:nvCxnSpPr>
-          <p:cNvPr id="184" name="Straight Arrow Connector 183"/>
-          <p:cNvCxnSpPr>
-            <a:stCxn id="218" idx="4"/>
-            <a:endCxn id="215" idx="1"/>
-          </p:cNvCxnSpPr>
-          <p:nvPr/>
-        </p:nvCxnSpPr>
-        <p:spPr>
-          <a:xfrm>
-            <a:off x="3006213" y="905876"/>
-            <a:ext cx="411726" cy="143796"/>
-          </a:xfrm>
-          <a:prstGeom prst="straightConnector1">
-            <a:avLst/>
-          </a:prstGeom>
-          <a:ln>
-            <a:solidFill>
-              <a:schemeClr val="tx1"/>
-            </a:solidFill>
-            <a:tailEnd type="none"/>
-          </a:ln>
-          <a:effectLst/>
-        </p:spPr>
-        <p:style>
-          <a:lnRef idx="2">
-            <a:schemeClr val="accent1"/>
-          </a:lnRef>
-          <a:fillRef idx="0">
-            <a:schemeClr val="accent1"/>
-          </a:fillRef>
-          <a:effectRef idx="1">
-            <a:schemeClr val="accent1"/>
-          </a:effectRef>
-          <a:fontRef idx="minor">
-            <a:schemeClr val="tx1"/>
-          </a:fontRef>
-        </p:style>
-      </p:cxnSp>
-      <p:cxnSp>
-        <p:nvCxnSpPr>
-          <p:cNvPr id="220" name="Straight Arrow Connector 219"/>
-          <p:cNvCxnSpPr>
-            <a:stCxn id="233" idx="6"/>
-            <a:endCxn id="230" idx="2"/>
-          </p:cNvCxnSpPr>
-          <p:nvPr/>
-        </p:nvCxnSpPr>
-        <p:spPr>
-          <a:xfrm flipV="1">
-            <a:off x="4412024" y="1195443"/>
-            <a:ext cx="330271" cy="13463"/>
-          </a:xfrm>
-          <a:prstGeom prst="straightConnector1">
-            <a:avLst/>
-          </a:prstGeom>
-          <a:ln>
-            <a:solidFill>
-              <a:schemeClr val="tx1"/>
-            </a:solidFill>
-            <a:tailEnd type="none"/>
-          </a:ln>
-          <a:effectLst/>
-        </p:spPr>
-        <p:style>
-          <a:lnRef idx="2">
-            <a:schemeClr val="accent1"/>
-          </a:lnRef>
-          <a:fillRef idx="0">
-            <a:schemeClr val="accent1"/>
-          </a:fillRef>
-          <a:effectRef idx="1">
-            <a:schemeClr val="accent1"/>
-          </a:effectRef>
-          <a:fontRef idx="minor">
-            <a:schemeClr val="tx1"/>
-          </a:fontRef>
-        </p:style>
-      </p:cxnSp>
-      <p:grpSp>
-        <p:nvGrpSpPr>
-          <p:cNvPr id="222" name="Group 221"/>
-          <p:cNvGrpSpPr/>
-          <p:nvPr/>
-        </p:nvGrpSpPr>
-        <p:grpSpPr>
-          <a:xfrm>
-            <a:off x="4009688" y="991007"/>
-            <a:ext cx="402336" cy="419140"/>
-            <a:chOff x="2941562" y="2797709"/>
-            <a:chExt cx="402336" cy="419140"/>
-          </a:xfrm>
-        </p:grpSpPr>
-        <p:sp>
-          <p:nvSpPr>
-            <p:cNvPr id="231" name="Rectangle 230"/>
-            <p:cNvSpPr/>
-            <p:nvPr/>
-          </p:nvSpPr>
-          <p:spPr>
-            <a:xfrm>
-              <a:off x="2991366" y="2797709"/>
-              <a:ext cx="273353" cy="369332"/>
-            </a:xfrm>
-            <a:prstGeom prst="rect">
-              <a:avLst/>
-            </a:prstGeom>
-          </p:spPr>
-          <p:txBody>
-            <a:bodyPr wrap="square">
-              <a:spAutoFit/>
-            </a:bodyPr>
-            <a:lstStyle/>
-            <a:p>
-              <a:r>
-                <a:rPr lang="en-US" dirty="0" smtClean="0"/>
-                <a:t>3</a:t>
-              </a:r>
-              <a:endParaRPr lang="en-US" dirty="0"/>
-            </a:p>
-          </p:txBody>
-        </p:sp>
-        <p:sp>
-          <p:nvSpPr>
-            <p:cNvPr id="233" name="Oval 232"/>
-            <p:cNvSpPr/>
-            <p:nvPr/>
-          </p:nvSpPr>
-          <p:spPr>
-            <a:xfrm>
-              <a:off x="2941562" y="2814366"/>
-              <a:ext cx="402336" cy="402483"/>
-            </a:xfrm>
-            <a:prstGeom prst="ellipse">
-              <a:avLst/>
-            </a:prstGeom>
-            <a:noFill/>
-            <a:ln w="28575">
-              <a:solidFill>
-                <a:schemeClr val="tx1"/>
-              </a:solidFill>
-            </a:ln>
-            <a:effectLst/>
-          </p:spPr>
-          <p:style>
-            <a:lnRef idx="1">
-              <a:schemeClr val="accent1"/>
-            </a:lnRef>
-            <a:fillRef idx="3">
-              <a:schemeClr val="accent1"/>
-            </a:fillRef>
-            <a:effectRef idx="2">
-              <a:schemeClr val="accent1"/>
-            </a:effectRef>
-            <a:fontRef idx="minor">
-              <a:schemeClr val="lt1"/>
-            </a:fontRef>
-          </p:style>
-          <p:txBody>
-            <a:bodyPr rtlCol="0" anchor="ctr"/>
-            <a:lstStyle/>
-            <a:p>
-              <a:pPr algn="ctr"/>
-              <a:endParaRPr lang="en-US"/>
-            </a:p>
-          </p:txBody>
-        </p:sp>
-      </p:grpSp>
-      <p:grpSp>
-        <p:nvGrpSpPr>
-          <p:cNvPr id="223" name="Group 222"/>
-          <p:cNvGrpSpPr/>
-          <p:nvPr/>
-        </p:nvGrpSpPr>
-        <p:grpSpPr>
-          <a:xfrm>
-            <a:off x="4742295" y="977544"/>
-            <a:ext cx="402336" cy="419140"/>
-            <a:chOff x="2941562" y="2797709"/>
-            <a:chExt cx="402336" cy="419140"/>
-          </a:xfrm>
-        </p:grpSpPr>
-        <p:sp>
-          <p:nvSpPr>
-            <p:cNvPr id="229" name="Rectangle 228"/>
-            <p:cNvSpPr/>
-            <p:nvPr/>
-          </p:nvSpPr>
-          <p:spPr>
-            <a:xfrm>
-              <a:off x="2991366" y="2797709"/>
-              <a:ext cx="273353" cy="369332"/>
-            </a:xfrm>
-            <a:prstGeom prst="rect">
-              <a:avLst/>
-            </a:prstGeom>
-          </p:spPr>
-          <p:txBody>
-            <a:bodyPr wrap="square">
-              <a:spAutoFit/>
-            </a:bodyPr>
-            <a:lstStyle/>
-            <a:p>
-              <a:r>
-                <a:rPr lang="en-US" dirty="0" smtClean="0"/>
-                <a:t>4</a:t>
-              </a:r>
-              <a:endParaRPr lang="en-US" dirty="0"/>
-            </a:p>
-          </p:txBody>
-        </p:sp>
-        <p:sp>
-          <p:nvSpPr>
-            <p:cNvPr id="230" name="Oval 229"/>
-            <p:cNvSpPr/>
-            <p:nvPr/>
-          </p:nvSpPr>
-          <p:spPr>
-            <a:xfrm>
-              <a:off x="2941562" y="2814366"/>
-              <a:ext cx="402336" cy="402483"/>
-            </a:xfrm>
-            <a:prstGeom prst="ellipse">
-              <a:avLst/>
-            </a:prstGeom>
-            <a:noFill/>
-            <a:ln w="28575">
-              <a:solidFill>
-                <a:schemeClr val="tx1"/>
-              </a:solidFill>
-            </a:ln>
-            <a:effectLst/>
-          </p:spPr>
-          <p:style>
-            <a:lnRef idx="1">
-              <a:schemeClr val="accent1"/>
-            </a:lnRef>
-            <a:fillRef idx="3">
-              <a:schemeClr val="accent1"/>
-            </a:fillRef>
-            <a:effectRef idx="2">
-              <a:schemeClr val="accent1"/>
-            </a:effectRef>
-            <a:fontRef idx="minor">
-              <a:schemeClr val="lt1"/>
-            </a:fontRef>
-          </p:style>
-          <p:txBody>
-            <a:bodyPr rtlCol="0" anchor="ctr"/>
-            <a:lstStyle/>
-            <a:p>
-              <a:pPr algn="ctr"/>
-              <a:endParaRPr lang="en-US"/>
-            </a:p>
-          </p:txBody>
-        </p:sp>
-      </p:grpSp>
-      <p:grpSp>
-        <p:nvGrpSpPr>
-          <p:cNvPr id="224" name="Group 223"/>
-          <p:cNvGrpSpPr/>
-          <p:nvPr/>
-        </p:nvGrpSpPr>
-        <p:grpSpPr>
-          <a:xfrm>
-            <a:off x="4015700" y="1637697"/>
-            <a:ext cx="402336" cy="419140"/>
-            <a:chOff x="2941562" y="2797709"/>
-            <a:chExt cx="402336" cy="419140"/>
-          </a:xfrm>
-        </p:grpSpPr>
-        <p:sp>
-          <p:nvSpPr>
-            <p:cNvPr id="226" name="Rectangle 225"/>
-            <p:cNvSpPr/>
-            <p:nvPr/>
-          </p:nvSpPr>
-          <p:spPr>
-            <a:xfrm>
-              <a:off x="2991366" y="2797709"/>
-              <a:ext cx="273353" cy="369332"/>
-            </a:xfrm>
-            <a:prstGeom prst="rect">
-              <a:avLst/>
-            </a:prstGeom>
-          </p:spPr>
-          <p:txBody>
-            <a:bodyPr wrap="square">
-              <a:spAutoFit/>
-            </a:bodyPr>
-            <a:lstStyle/>
-            <a:p>
-              <a:r>
-                <a:rPr lang="en-US" dirty="0" smtClean="0"/>
-                <a:t>5</a:t>
-              </a:r>
-              <a:endParaRPr lang="en-US" dirty="0"/>
-            </a:p>
-          </p:txBody>
-        </p:sp>
-        <p:sp>
-          <p:nvSpPr>
-            <p:cNvPr id="228" name="Oval 227"/>
-            <p:cNvSpPr/>
-            <p:nvPr/>
-          </p:nvSpPr>
-          <p:spPr>
-            <a:xfrm>
-              <a:off x="2941562" y="2814366"/>
-              <a:ext cx="402336" cy="402483"/>
-            </a:xfrm>
-            <a:prstGeom prst="ellipse">
-              <a:avLst/>
-            </a:prstGeom>
-            <a:noFill/>
-            <a:ln w="28575">
-              <a:solidFill>
-                <a:schemeClr val="tx1"/>
-              </a:solidFill>
-            </a:ln>
-            <a:effectLst/>
-          </p:spPr>
-          <p:style>
-            <a:lnRef idx="1">
-              <a:schemeClr val="accent1"/>
-            </a:lnRef>
-            <a:fillRef idx="3">
-              <a:schemeClr val="accent1"/>
-            </a:fillRef>
-            <a:effectRef idx="2">
-              <a:schemeClr val="accent1"/>
-            </a:effectRef>
-            <a:fontRef idx="minor">
-              <a:schemeClr val="lt1"/>
-            </a:fontRef>
-          </p:style>
-          <p:txBody>
-            <a:bodyPr rtlCol="0" anchor="ctr"/>
-            <a:lstStyle/>
-            <a:p>
-              <a:pPr algn="ctr"/>
-              <a:endParaRPr lang="en-US"/>
-            </a:p>
-          </p:txBody>
-        </p:sp>
-      </p:grpSp>
-      <p:cxnSp>
-        <p:nvCxnSpPr>
-          <p:cNvPr id="225" name="Straight Arrow Connector 224"/>
-          <p:cNvCxnSpPr>
-            <a:stCxn id="233" idx="4"/>
-            <a:endCxn id="226" idx="0"/>
-          </p:cNvCxnSpPr>
-          <p:nvPr/>
-        </p:nvCxnSpPr>
-        <p:spPr>
-          <a:xfrm flipH="1">
-            <a:off x="4202181" y="1410147"/>
-            <a:ext cx="8675" cy="227550"/>
-          </a:xfrm>
-          <a:prstGeom prst="straightConnector1">
-            <a:avLst/>
-          </a:prstGeom>
-          <a:ln>
-            <a:solidFill>
-              <a:schemeClr val="tx1"/>
-            </a:solidFill>
-            <a:tailEnd type="none"/>
-          </a:ln>
-          <a:effectLst/>
-        </p:spPr>
-        <p:style>
-          <a:lnRef idx="2">
-            <a:schemeClr val="accent1"/>
-          </a:lnRef>
-          <a:fillRef idx="0">
-            <a:schemeClr val="accent1"/>
-          </a:fillRef>
-          <a:effectRef idx="1">
-            <a:schemeClr val="accent1"/>
-          </a:effectRef>
-          <a:fontRef idx="minor">
-            <a:schemeClr val="tx1"/>
-          </a:fontRef>
-        </p:style>
-      </p:cxnSp>
       <p:sp>
         <p:nvSpPr>
           <p:cNvPr id="257" name="TextBox 256"/>
@@ -29241,8 +29518,8 @@
         </p:nvSpPr>
         <p:spPr>
           <a:xfrm>
-            <a:off x="5181884" y="178408"/>
-            <a:ext cx="1239342" cy="338554"/>
+            <a:off x="4509539" y="178408"/>
+            <a:ext cx="1173424" cy="323165"/>
           </a:xfrm>
           <a:prstGeom prst="rect">
             <a:avLst/>
@@ -29256,10 +29533,10 @@
           <a:lstStyle/>
           <a:p>
             <a:r>
-              <a:rPr lang="en-US" sz="1600" dirty="0" smtClean="0"/>
-              <a:t>[2013, 2014)</a:t>
+              <a:rPr lang="en-US" sz="1500" dirty="0" smtClean="0"/>
+              <a:t>[2012, 2013)</a:t>
             </a:r>
-            <a:endParaRPr lang="en-US" sz="1600" dirty="0"/>
+            <a:endParaRPr lang="en-US" sz="1500" dirty="0"/>
           </a:p>
         </p:txBody>
       </p:sp>
@@ -29271,8 +29548,8 @@
         </p:nvSpPr>
         <p:spPr>
           <a:xfrm>
-            <a:off x="6477355" y="178408"/>
-            <a:ext cx="1239342" cy="338554"/>
+            <a:off x="5745246" y="178408"/>
+            <a:ext cx="1173424" cy="323165"/>
           </a:xfrm>
           <a:prstGeom prst="rect">
             <a:avLst/>
@@ -29286,10 +29563,10 @@
           <a:lstStyle/>
           <a:p>
             <a:r>
-              <a:rPr lang="en-US" sz="1600" dirty="0" smtClean="0"/>
-              <a:t>[2014, 2015)</a:t>
+              <a:rPr lang="en-US" sz="1500" dirty="0" smtClean="0"/>
+              <a:t>[2013, 2014)</a:t>
             </a:r>
-            <a:endParaRPr lang="en-US" sz="1600" dirty="0"/>
+            <a:endParaRPr lang="en-US" sz="1500" dirty="0"/>
           </a:p>
         </p:txBody>
       </p:sp>
@@ -29301,8 +29578,8 @@
         </p:nvSpPr>
         <p:spPr>
           <a:xfrm>
-            <a:off x="7772824" y="178408"/>
-            <a:ext cx="1239342" cy="338554"/>
+            <a:off x="7981998" y="178408"/>
+            <a:ext cx="1173424" cy="323165"/>
           </a:xfrm>
           <a:prstGeom prst="rect">
             <a:avLst/>
@@ -29316,10 +29593,10 @@
           <a:lstStyle/>
           <a:p>
             <a:r>
-              <a:rPr lang="en-US" sz="1600" dirty="0" smtClean="0"/>
+              <a:rPr lang="en-US" sz="1500" dirty="0" smtClean="0"/>
               <a:t>[2015, 2016)</a:t>
             </a:r>
-            <a:endParaRPr lang="en-US" sz="1600" dirty="0"/>
+            <a:endParaRPr lang="en-US" sz="1500" dirty="0"/>
           </a:p>
         </p:txBody>
       </p:sp>
@@ -29331,7 +29608,7 @@
         </p:nvCxnSpPr>
         <p:spPr>
           <a:xfrm>
-            <a:off x="5193702" y="85577"/>
+            <a:off x="4506416" y="85577"/>
             <a:ext cx="0" cy="1973573"/>
           </a:xfrm>
           <a:prstGeom prst="line">
@@ -29368,7 +29645,7 @@
         </p:nvCxnSpPr>
         <p:spPr>
           <a:xfrm>
-            <a:off x="1239342" y="85577"/>
+            <a:off x="1104873" y="85577"/>
             <a:ext cx="0" cy="1973573"/>
           </a:xfrm>
           <a:prstGeom prst="line">
@@ -29405,7 +29682,7 @@
         </p:nvCxnSpPr>
         <p:spPr>
           <a:xfrm>
-            <a:off x="2594293" y="85577"/>
+            <a:off x="2220768" y="85577"/>
             <a:ext cx="0" cy="1973573"/>
           </a:xfrm>
           <a:prstGeom prst="line">
@@ -29442,7 +29719,7 @@
         </p:nvCxnSpPr>
         <p:spPr>
           <a:xfrm>
-            <a:off x="6455376" y="85577"/>
+            <a:off x="5783031" y="85577"/>
             <a:ext cx="0" cy="1973573"/>
           </a:xfrm>
           <a:prstGeom prst="line">
@@ -29479,7 +29756,7 @@
         </p:nvCxnSpPr>
         <p:spPr>
           <a:xfrm>
-            <a:off x="7784926" y="85577"/>
+            <a:off x="6933289" y="85577"/>
             <a:ext cx="0" cy="1973573"/>
           </a:xfrm>
           <a:prstGeom prst="line">
@@ -29510,204 +29787,385 @@
       </p:cxnSp>
       <p:grpSp>
         <p:nvGrpSpPr>
-          <p:cNvPr id="265" name="Group 264"/>
+          <p:cNvPr id="4" name="Group 3"/>
           <p:cNvGrpSpPr/>
           <p:nvPr/>
         </p:nvGrpSpPr>
         <p:grpSpPr>
           <a:xfrm>
-            <a:off x="5446647" y="474347"/>
-            <a:ext cx="402336" cy="419140"/>
-            <a:chOff x="2941562" y="2797709"/>
-            <a:chExt cx="402336" cy="419140"/>
+            <a:off x="5868434" y="580001"/>
+            <a:ext cx="956747" cy="1503591"/>
+            <a:chOff x="5446647" y="474347"/>
+            <a:chExt cx="956747" cy="1503591"/>
           </a:xfrm>
         </p:grpSpPr>
-        <p:sp>
-          <p:nvSpPr>
-            <p:cNvPr id="266" name="Rectangle 265"/>
-            <p:cNvSpPr/>
+        <p:grpSp>
+          <p:nvGrpSpPr>
+            <p:cNvPr id="265" name="Group 264"/>
+            <p:cNvGrpSpPr/>
             <p:nvPr/>
-          </p:nvSpPr>
+          </p:nvGrpSpPr>
+          <p:grpSpPr>
+            <a:xfrm>
+              <a:off x="5446647" y="474347"/>
+              <a:ext cx="402336" cy="419140"/>
+              <a:chOff x="2941562" y="2797709"/>
+              <a:chExt cx="402336" cy="419140"/>
+            </a:xfrm>
+          </p:grpSpPr>
+          <p:sp>
+            <p:nvSpPr>
+              <p:cNvPr id="266" name="Rectangle 265"/>
+              <p:cNvSpPr/>
+              <p:nvPr/>
+            </p:nvSpPr>
+            <p:spPr>
+              <a:xfrm>
+                <a:off x="2991365" y="2797709"/>
+                <a:ext cx="273353" cy="369332"/>
+              </a:xfrm>
+              <a:prstGeom prst="rect">
+                <a:avLst/>
+              </a:prstGeom>
+            </p:spPr>
+            <p:txBody>
+              <a:bodyPr wrap="square">
+                <a:spAutoFit/>
+              </a:bodyPr>
+              <a:lstStyle/>
+              <a:p>
+                <a:r>
+                  <a:rPr lang="en-US" dirty="0" smtClean="0"/>
+                  <a:t>1</a:t>
+                </a:r>
+                <a:endParaRPr lang="en-US" dirty="0"/>
+              </a:p>
+            </p:txBody>
+          </p:sp>
+          <p:sp>
+            <p:nvSpPr>
+              <p:cNvPr id="267" name="Oval 266"/>
+              <p:cNvSpPr/>
+              <p:nvPr/>
+            </p:nvSpPr>
+            <p:spPr>
+              <a:xfrm>
+                <a:off x="2941562" y="2814366"/>
+                <a:ext cx="402336" cy="402483"/>
+              </a:xfrm>
+              <a:prstGeom prst="ellipse">
+                <a:avLst/>
+              </a:prstGeom>
+              <a:noFill/>
+              <a:ln w="28575">
+                <a:solidFill>
+                  <a:schemeClr val="tx1"/>
+                </a:solidFill>
+              </a:ln>
+              <a:effectLst/>
+            </p:spPr>
+            <p:style>
+              <a:lnRef idx="1">
+                <a:schemeClr val="accent1"/>
+              </a:lnRef>
+              <a:fillRef idx="3">
+                <a:schemeClr val="accent1"/>
+              </a:fillRef>
+              <a:effectRef idx="2">
+                <a:schemeClr val="accent1"/>
+              </a:effectRef>
+              <a:fontRef idx="minor">
+                <a:schemeClr val="lt1"/>
+              </a:fontRef>
+            </p:style>
+            <p:txBody>
+              <a:bodyPr rtlCol="0" anchor="ctr"/>
+              <a:lstStyle/>
+              <a:p>
+                <a:pPr algn="ctr"/>
+                <a:endParaRPr lang="en-US"/>
+              </a:p>
+            </p:txBody>
+          </p:sp>
+        </p:grpSp>
+        <p:grpSp>
+          <p:nvGrpSpPr>
+            <p:cNvPr id="268" name="Group 267"/>
+            <p:cNvGrpSpPr/>
+            <p:nvPr/>
+          </p:nvGrpSpPr>
+          <p:grpSpPr>
+            <a:xfrm>
+              <a:off x="6000620" y="961684"/>
+              <a:ext cx="402336" cy="419140"/>
+              <a:chOff x="2941562" y="2797709"/>
+              <a:chExt cx="402336" cy="419140"/>
+            </a:xfrm>
+          </p:grpSpPr>
+          <p:sp>
+            <p:nvSpPr>
+              <p:cNvPr id="269" name="Rectangle 268"/>
+              <p:cNvSpPr/>
+              <p:nvPr/>
+            </p:nvSpPr>
+            <p:spPr>
+              <a:xfrm>
+                <a:off x="2991365" y="2797709"/>
+                <a:ext cx="273353" cy="369332"/>
+              </a:xfrm>
+              <a:prstGeom prst="rect">
+                <a:avLst/>
+              </a:prstGeom>
+            </p:spPr>
+            <p:txBody>
+              <a:bodyPr wrap="square">
+                <a:spAutoFit/>
+              </a:bodyPr>
+              <a:lstStyle/>
+              <a:p>
+                <a:r>
+                  <a:rPr lang="en-US" dirty="0" smtClean="0"/>
+                  <a:t>4</a:t>
+                </a:r>
+                <a:endParaRPr lang="en-US" dirty="0"/>
+              </a:p>
+            </p:txBody>
+          </p:sp>
+          <p:sp>
+            <p:nvSpPr>
+              <p:cNvPr id="270" name="Oval 269"/>
+              <p:cNvSpPr/>
+              <p:nvPr/>
+            </p:nvSpPr>
+            <p:spPr>
+              <a:xfrm>
+                <a:off x="2941562" y="2814366"/>
+                <a:ext cx="402336" cy="402483"/>
+              </a:xfrm>
+              <a:prstGeom prst="ellipse">
+                <a:avLst/>
+              </a:prstGeom>
+              <a:noFill/>
+              <a:ln w="28575">
+                <a:solidFill>
+                  <a:schemeClr val="tx1"/>
+                </a:solidFill>
+              </a:ln>
+              <a:effectLst/>
+            </p:spPr>
+            <p:style>
+              <a:lnRef idx="1">
+                <a:schemeClr val="accent1"/>
+              </a:lnRef>
+              <a:fillRef idx="3">
+                <a:schemeClr val="accent1"/>
+              </a:fillRef>
+              <a:effectRef idx="2">
+                <a:schemeClr val="accent1"/>
+              </a:effectRef>
+              <a:fontRef idx="minor">
+                <a:schemeClr val="lt1"/>
+              </a:fontRef>
+            </p:style>
+            <p:txBody>
+              <a:bodyPr rtlCol="0" anchor="ctr"/>
+              <a:lstStyle/>
+              <a:p>
+                <a:pPr algn="ctr"/>
+                <a:endParaRPr lang="en-US"/>
+              </a:p>
+            </p:txBody>
+          </p:sp>
+        </p:grpSp>
+        <p:cxnSp>
+          <p:nvCxnSpPr>
+            <p:cNvPr id="271" name="Straight Arrow Connector 270"/>
+            <p:cNvCxnSpPr>
+              <a:stCxn id="267" idx="4"/>
+              <a:endCxn id="270" idx="1"/>
+            </p:cNvCxnSpPr>
+            <p:nvPr/>
+          </p:nvCxnSpPr>
           <p:spPr>
             <a:xfrm>
-              <a:off x="2991365" y="2797709"/>
-              <a:ext cx="273353" cy="369332"/>
+              <a:off x="5647815" y="893487"/>
+              <a:ext cx="411726" cy="143796"/>
             </a:xfrm>
-            <a:prstGeom prst="rect">
+            <a:prstGeom prst="straightConnector1">
               <a:avLst/>
             </a:prstGeom>
-          </p:spPr>
-          <p:txBody>
-            <a:bodyPr wrap="square">
-              <a:spAutoFit/>
-            </a:bodyPr>
-            <a:lstStyle/>
-            <a:p>
-              <a:r>
-                <a:rPr lang="en-US" dirty="0" smtClean="0"/>
-                <a:t>1</a:t>
-              </a:r>
-              <a:endParaRPr lang="en-US" dirty="0"/>
-            </a:p>
-          </p:txBody>
-        </p:sp>
-        <p:sp>
-          <p:nvSpPr>
-            <p:cNvPr id="267" name="Oval 266"/>
-            <p:cNvSpPr/>
-            <p:nvPr/>
-          </p:nvSpPr>
-          <p:spPr>
-            <a:xfrm>
-              <a:off x="2941562" y="2814366"/>
-              <a:ext cx="402336" cy="402483"/>
-            </a:xfrm>
-            <a:prstGeom prst="ellipse">
-              <a:avLst/>
-            </a:prstGeom>
-            <a:noFill/>
-            <a:ln w="28575">
+            <a:ln>
               <a:solidFill>
                 <a:schemeClr val="tx1"/>
               </a:solidFill>
+              <a:tailEnd type="none"/>
             </a:ln>
             <a:effectLst/>
           </p:spPr>
           <p:style>
-            <a:lnRef idx="1">
+            <a:lnRef idx="2">
               <a:schemeClr val="accent1"/>
             </a:lnRef>
-            <a:fillRef idx="3">
+            <a:fillRef idx="0">
               <a:schemeClr val="accent1"/>
             </a:fillRef>
-            <a:effectRef idx="2">
+            <a:effectRef idx="1">
               <a:schemeClr val="accent1"/>
             </a:effectRef>
             <a:fontRef idx="minor">
-              <a:schemeClr val="lt1"/>
+              <a:schemeClr val="tx1"/>
             </a:fontRef>
           </p:style>
-          <p:txBody>
-            <a:bodyPr rtlCol="0" anchor="ctr"/>
-            <a:lstStyle/>
-            <a:p>
-              <a:pPr algn="ctr"/>
-              <a:endParaRPr lang="en-US"/>
-            </a:p>
-          </p:txBody>
-        </p:sp>
-      </p:grpSp>
-      <p:grpSp>
-        <p:nvGrpSpPr>
-          <p:cNvPr id="268" name="Group 267"/>
-          <p:cNvGrpSpPr/>
-          <p:nvPr/>
-        </p:nvGrpSpPr>
-        <p:grpSpPr>
-          <a:xfrm>
-            <a:off x="6000620" y="961684"/>
-            <a:ext cx="402336" cy="419140"/>
-            <a:chOff x="2941562" y="2797709"/>
-            <a:chExt cx="402336" cy="419140"/>
-          </a:xfrm>
-        </p:grpSpPr>
-        <p:sp>
-          <p:nvSpPr>
-            <p:cNvPr id="269" name="Rectangle 268"/>
-            <p:cNvSpPr/>
+        </p:cxnSp>
+        <p:grpSp>
+          <p:nvGrpSpPr>
+            <p:cNvPr id="272" name="Group 271"/>
+            <p:cNvGrpSpPr/>
             <p:nvPr/>
-          </p:nvSpPr>
+          </p:nvGrpSpPr>
+          <p:grpSpPr>
+            <a:xfrm>
+              <a:off x="6001058" y="1558798"/>
+              <a:ext cx="402336" cy="419140"/>
+              <a:chOff x="2941562" y="2797709"/>
+              <a:chExt cx="402336" cy="419140"/>
+            </a:xfrm>
+          </p:grpSpPr>
+          <p:sp>
+            <p:nvSpPr>
+              <p:cNvPr id="273" name="Rectangle 272"/>
+              <p:cNvSpPr/>
+              <p:nvPr/>
+            </p:nvSpPr>
+            <p:spPr>
+              <a:xfrm>
+                <a:off x="2991365" y="2797709"/>
+                <a:ext cx="273353" cy="369332"/>
+              </a:xfrm>
+              <a:prstGeom prst="rect">
+                <a:avLst/>
+              </a:prstGeom>
+            </p:spPr>
+            <p:txBody>
+              <a:bodyPr wrap="square">
+                <a:spAutoFit/>
+              </a:bodyPr>
+              <a:lstStyle/>
+              <a:p>
+                <a:r>
+                  <a:rPr lang="en-US" dirty="0" smtClean="0"/>
+                  <a:t>6</a:t>
+                </a:r>
+                <a:endParaRPr lang="en-US" dirty="0"/>
+              </a:p>
+            </p:txBody>
+          </p:sp>
+          <p:sp>
+            <p:nvSpPr>
+              <p:cNvPr id="274" name="Oval 273"/>
+              <p:cNvSpPr/>
+              <p:nvPr/>
+            </p:nvSpPr>
+            <p:spPr>
+              <a:xfrm>
+                <a:off x="2941562" y="2814366"/>
+                <a:ext cx="402336" cy="402483"/>
+              </a:xfrm>
+              <a:prstGeom prst="ellipse">
+                <a:avLst/>
+              </a:prstGeom>
+              <a:noFill/>
+              <a:ln w="28575">
+                <a:solidFill>
+                  <a:schemeClr val="tx1"/>
+                </a:solidFill>
+              </a:ln>
+              <a:effectLst/>
+            </p:spPr>
+            <p:style>
+              <a:lnRef idx="1">
+                <a:schemeClr val="accent1"/>
+              </a:lnRef>
+              <a:fillRef idx="3">
+                <a:schemeClr val="accent1"/>
+              </a:fillRef>
+              <a:effectRef idx="2">
+                <a:schemeClr val="accent1"/>
+              </a:effectRef>
+              <a:fontRef idx="minor">
+                <a:schemeClr val="lt1"/>
+              </a:fontRef>
+            </p:style>
+            <p:txBody>
+              <a:bodyPr rtlCol="0" anchor="ctr"/>
+              <a:lstStyle/>
+              <a:p>
+                <a:pPr algn="ctr"/>
+                <a:endParaRPr lang="en-US"/>
+              </a:p>
+            </p:txBody>
+          </p:sp>
+        </p:grpSp>
+        <p:cxnSp>
+          <p:nvCxnSpPr>
+            <p:cNvPr id="275" name="Straight Arrow Connector 274"/>
+            <p:cNvCxnSpPr>
+              <a:stCxn id="270" idx="4"/>
+              <a:endCxn id="274" idx="0"/>
+            </p:cNvCxnSpPr>
+            <p:nvPr/>
+          </p:nvCxnSpPr>
           <p:spPr>
             <a:xfrm>
-              <a:off x="2991365" y="2797709"/>
-              <a:ext cx="273353" cy="369332"/>
+              <a:off x="6201788" y="1380824"/>
+              <a:ext cx="438" cy="194631"/>
             </a:xfrm>
-            <a:prstGeom prst="rect">
+            <a:prstGeom prst="straightConnector1">
               <a:avLst/>
             </a:prstGeom>
-          </p:spPr>
-          <p:txBody>
-            <a:bodyPr wrap="square">
-              <a:spAutoFit/>
-            </a:bodyPr>
-            <a:lstStyle/>
-            <a:p>
-              <a:r>
-                <a:rPr lang="en-US" dirty="0" smtClean="0"/>
-                <a:t>4</a:t>
-              </a:r>
-              <a:endParaRPr lang="en-US" dirty="0"/>
-            </a:p>
-          </p:txBody>
-        </p:sp>
-        <p:sp>
-          <p:nvSpPr>
-            <p:cNvPr id="270" name="Oval 269"/>
-            <p:cNvSpPr/>
-            <p:nvPr/>
-          </p:nvSpPr>
-          <p:spPr>
-            <a:xfrm>
-              <a:off x="2941562" y="2814366"/>
-              <a:ext cx="402336" cy="402483"/>
-            </a:xfrm>
-            <a:prstGeom prst="ellipse">
-              <a:avLst/>
-            </a:prstGeom>
-            <a:noFill/>
-            <a:ln w="28575">
+            <a:ln>
               <a:solidFill>
                 <a:schemeClr val="tx1"/>
               </a:solidFill>
+              <a:tailEnd type="none"/>
             </a:ln>
             <a:effectLst/>
           </p:spPr>
           <p:style>
-            <a:lnRef idx="1">
+            <a:lnRef idx="2">
               <a:schemeClr val="accent1"/>
             </a:lnRef>
-            <a:fillRef idx="3">
+            <a:fillRef idx="0">
               <a:schemeClr val="accent1"/>
             </a:fillRef>
-            <a:effectRef idx="2">
+            <a:effectRef idx="1">
               <a:schemeClr val="accent1"/>
             </a:effectRef>
             <a:fontRef idx="minor">
-              <a:schemeClr val="lt1"/>
+              <a:schemeClr val="tx1"/>
             </a:fontRef>
           </p:style>
-          <p:txBody>
-            <a:bodyPr rtlCol="0" anchor="ctr"/>
-            <a:lstStyle/>
-            <a:p>
-              <a:pPr algn="ctr"/>
-              <a:endParaRPr lang="en-US"/>
-            </a:p>
-          </p:txBody>
-        </p:sp>
+        </p:cxnSp>
       </p:grpSp>
       <p:cxnSp>
         <p:nvCxnSpPr>
-          <p:cNvPr id="271" name="Straight Arrow Connector 270"/>
-          <p:cNvCxnSpPr>
-            <a:stCxn id="267" idx="4"/>
-            <a:endCxn id="270" idx="1"/>
-          </p:cNvCxnSpPr>
+          <p:cNvPr id="51" name="Straight Connector 50"/>
+          <p:cNvCxnSpPr/>
           <p:nvPr/>
         </p:nvCxnSpPr>
         <p:spPr>
           <a:xfrm>
-            <a:off x="5647815" y="893487"/>
-            <a:ext cx="411726" cy="143796"/>
+            <a:off x="8041913" y="88567"/>
+            <a:ext cx="0" cy="1973573"/>
           </a:xfrm>
-          <a:prstGeom prst="straightConnector1">
+          <a:prstGeom prst="line">
             <a:avLst/>
           </a:prstGeom>
           <a:ln>
             <a:solidFill>
               <a:schemeClr val="tx1"/>
             </a:solidFill>
-            <a:tailEnd type="none"/>
+            <a:prstDash val="dash"/>
           </a:ln>
           <a:effectLst/>
         </p:spPr>
@@ -29726,135 +30184,36 @@
           </a:fontRef>
         </p:style>
       </p:cxnSp>
-      <p:grpSp>
-        <p:nvGrpSpPr>
-          <p:cNvPr id="272" name="Group 271"/>
-          <p:cNvGrpSpPr/>
+      <p:sp>
+        <p:nvSpPr>
+          <p:cNvPr id="52" name="TextBox 51"/>
+          <p:cNvSpPr txBox="1"/>
           <p:nvPr/>
-        </p:nvGrpSpPr>
-        <p:grpSpPr>
-          <a:xfrm>
-            <a:off x="6001058" y="1558798"/>
-            <a:ext cx="402336" cy="419140"/>
-            <a:chOff x="2941562" y="2797709"/>
-            <a:chExt cx="402336" cy="419140"/>
-          </a:xfrm>
-        </p:grpSpPr>
-        <p:sp>
-          <p:nvSpPr>
-            <p:cNvPr id="273" name="Rectangle 272"/>
-            <p:cNvSpPr/>
-            <p:nvPr/>
-          </p:nvSpPr>
-          <p:spPr>
-            <a:xfrm>
-              <a:off x="2991365" y="2797709"/>
-              <a:ext cx="273353" cy="369332"/>
-            </a:xfrm>
-            <a:prstGeom prst="rect">
-              <a:avLst/>
-            </a:prstGeom>
-          </p:spPr>
-          <p:txBody>
-            <a:bodyPr wrap="square">
-              <a:spAutoFit/>
-            </a:bodyPr>
-            <a:lstStyle/>
-            <a:p>
-              <a:r>
-                <a:rPr lang="en-US" dirty="0" smtClean="0"/>
-                <a:t>6</a:t>
-              </a:r>
-              <a:endParaRPr lang="en-US" dirty="0"/>
-            </a:p>
-          </p:txBody>
-        </p:sp>
-        <p:sp>
-          <p:nvSpPr>
-            <p:cNvPr id="274" name="Oval 273"/>
-            <p:cNvSpPr/>
-            <p:nvPr/>
-          </p:nvSpPr>
-          <p:spPr>
-            <a:xfrm>
-              <a:off x="2941562" y="2814366"/>
-              <a:ext cx="402336" cy="402483"/>
-            </a:xfrm>
-            <a:prstGeom prst="ellipse">
-              <a:avLst/>
-            </a:prstGeom>
-            <a:noFill/>
-            <a:ln w="28575">
-              <a:solidFill>
-                <a:schemeClr val="tx1"/>
-              </a:solidFill>
-            </a:ln>
-            <a:effectLst/>
-          </p:spPr>
-          <p:style>
-            <a:lnRef idx="1">
-              <a:schemeClr val="accent1"/>
-            </a:lnRef>
-            <a:fillRef idx="3">
-              <a:schemeClr val="accent1"/>
-            </a:fillRef>
-            <a:effectRef idx="2">
-              <a:schemeClr val="accent1"/>
-            </a:effectRef>
-            <a:fontRef idx="minor">
-              <a:schemeClr val="lt1"/>
-            </a:fontRef>
-          </p:style>
-          <p:txBody>
-            <a:bodyPr rtlCol="0" anchor="ctr"/>
-            <a:lstStyle/>
-            <a:p>
-              <a:pPr algn="ctr"/>
-              <a:endParaRPr lang="en-US"/>
-            </a:p>
-          </p:txBody>
-        </p:sp>
-      </p:grpSp>
-      <p:cxnSp>
-        <p:nvCxnSpPr>
-          <p:cNvPr id="275" name="Straight Arrow Connector 274"/>
-          <p:cNvCxnSpPr>
-            <a:stCxn id="270" idx="4"/>
-            <a:endCxn id="274" idx="0"/>
-          </p:cNvCxnSpPr>
-          <p:nvPr/>
-        </p:nvCxnSpPr>
+        </p:nvSpPr>
         <p:spPr>
           <a:xfrm>
-            <a:off x="6201788" y="1380824"/>
-            <a:ext cx="438" cy="194631"/>
+            <a:off x="6879354" y="181398"/>
+            <a:ext cx="1173424" cy="323165"/>
           </a:xfrm>
-          <a:prstGeom prst="straightConnector1">
+          <a:prstGeom prst="rect">
             <a:avLst/>
           </a:prstGeom>
-          <a:ln>
-            <a:solidFill>
-              <a:schemeClr val="tx1"/>
-            </a:solidFill>
-            <a:tailEnd type="none"/>
-          </a:ln>
-          <a:effectLst/>
+          <a:noFill/>
         </p:spPr>
-        <p:style>
-          <a:lnRef idx="2">
-            <a:schemeClr val="accent1"/>
-          </a:lnRef>
-          <a:fillRef idx="0">
-            <a:schemeClr val="accent1"/>
-          </a:fillRef>
-          <a:effectRef idx="1">
-            <a:schemeClr val="accent1"/>
-          </a:effectRef>
-          <a:fontRef idx="minor">
-            <a:schemeClr val="tx1"/>
-          </a:fontRef>
-        </p:style>
-      </p:cxnSp>
+        <p:txBody>
+          <a:bodyPr wrap="none" rtlCol="0">
+            <a:spAutoFit/>
+          </a:bodyPr>
+          <a:lstStyle/>
+          <a:p>
+            <a:r>
+              <a:rPr lang="en-US" sz="1500" dirty="0" smtClean="0"/>
+              <a:t>[2015, 2016)</a:t>
+            </a:r>
+            <a:endParaRPr lang="en-US" sz="1500" dirty="0"/>
+          </a:p>
+        </p:txBody>
+      </p:sp>
     </p:spTree>
     <p:extLst>
       <p:ext uri="{BB962C8B-B14F-4D97-AF65-F5344CB8AC3E}">

</xml_diff>